<commit_message>
drobne zmiany w prezentacji
</commit_message>
<xml_diff>
--- a/Wieloboki_Voronoi.pptx
+++ b/Wieloboki_Voronoi.pptx
@@ -30,35 +30,38 @@
     <p:sldId id="283" r:id="rId24"/>
     <p:sldId id="286" r:id="rId25"/>
     <p:sldId id="287" r:id="rId26"/>
-    <p:sldId id="288" r:id="rId27"/>
-    <p:sldId id="296" r:id="rId28"/>
-    <p:sldId id="289" r:id="rId29"/>
-    <p:sldId id="290" r:id="rId30"/>
-    <p:sldId id="292" r:id="rId31"/>
-    <p:sldId id="291" r:id="rId32"/>
-    <p:sldId id="293" r:id="rId33"/>
-    <p:sldId id="294" r:id="rId34"/>
-    <p:sldId id="295" r:id="rId35"/>
-    <p:sldId id="303" r:id="rId36"/>
-    <p:sldId id="297" r:id="rId37"/>
-    <p:sldId id="298" r:id="rId38"/>
-    <p:sldId id="299" r:id="rId39"/>
-    <p:sldId id="300" r:id="rId40"/>
-    <p:sldId id="301" r:id="rId41"/>
-    <p:sldId id="302" r:id="rId42"/>
-    <p:sldId id="304" r:id="rId43"/>
-    <p:sldId id="305" r:id="rId44"/>
-    <p:sldId id="306" r:id="rId45"/>
-    <p:sldId id="307" r:id="rId46"/>
-    <p:sldId id="308" r:id="rId47"/>
-    <p:sldId id="309" r:id="rId48"/>
-    <p:sldId id="310" r:id="rId49"/>
-    <p:sldId id="311" r:id="rId50"/>
-    <p:sldId id="312" r:id="rId51"/>
-    <p:sldId id="313" r:id="rId52"/>
-    <p:sldId id="314" r:id="rId53"/>
-    <p:sldId id="315" r:id="rId54"/>
-    <p:sldId id="268" r:id="rId55"/>
+    <p:sldId id="296" r:id="rId27"/>
+    <p:sldId id="316" r:id="rId28"/>
+    <p:sldId id="318" r:id="rId29"/>
+    <p:sldId id="288" r:id="rId30"/>
+    <p:sldId id="317" r:id="rId31"/>
+    <p:sldId id="289" r:id="rId32"/>
+    <p:sldId id="290" r:id="rId33"/>
+    <p:sldId id="292" r:id="rId34"/>
+    <p:sldId id="291" r:id="rId35"/>
+    <p:sldId id="293" r:id="rId36"/>
+    <p:sldId id="294" r:id="rId37"/>
+    <p:sldId id="295" r:id="rId38"/>
+    <p:sldId id="303" r:id="rId39"/>
+    <p:sldId id="297" r:id="rId40"/>
+    <p:sldId id="298" r:id="rId41"/>
+    <p:sldId id="299" r:id="rId42"/>
+    <p:sldId id="300" r:id="rId43"/>
+    <p:sldId id="301" r:id="rId44"/>
+    <p:sldId id="302" r:id="rId45"/>
+    <p:sldId id="304" r:id="rId46"/>
+    <p:sldId id="305" r:id="rId47"/>
+    <p:sldId id="306" r:id="rId48"/>
+    <p:sldId id="307" r:id="rId49"/>
+    <p:sldId id="308" r:id="rId50"/>
+    <p:sldId id="309" r:id="rId51"/>
+    <p:sldId id="310" r:id="rId52"/>
+    <p:sldId id="311" r:id="rId53"/>
+    <p:sldId id="312" r:id="rId54"/>
+    <p:sldId id="313" r:id="rId55"/>
+    <p:sldId id="314" r:id="rId56"/>
+    <p:sldId id="315" r:id="rId57"/>
+    <p:sldId id="268" r:id="rId58"/>
   </p:sldIdLst>
   <p:sldSz cx="12192000" cy="6858000"/>
   <p:notesSz cx="6858000" cy="9144000"/>
@@ -803,7 +806,7 @@
           <p:cNvPr id="2" name="Title 1">
             <a:extLst>
               <a:ext uri="{FF2B5EF4-FFF2-40B4-BE49-F238E27FC236}">
-                <a16:creationId xmlns:a16="http://schemas.microsoft.com/office/drawing/2014/main" xmlns="" id="{541A7134-C5E1-9066-8084-0350E0C3EAC3}"/>
+                <a16:creationId xmlns="" xmlns:a16="http://schemas.microsoft.com/office/drawing/2014/main" id="{541A7134-C5E1-9066-8084-0350E0C3EAC3}"/>
               </a:ext>
             </a:extLst>
           </p:cNvPr>
@@ -841,7 +844,7 @@
           <p:cNvPr id="3" name="Subtitle 2">
             <a:extLst>
               <a:ext uri="{FF2B5EF4-FFF2-40B4-BE49-F238E27FC236}">
-                <a16:creationId xmlns:a16="http://schemas.microsoft.com/office/drawing/2014/main" xmlns="" id="{8376130C-C0AC-A8B2-8FAD-042449DF13A9}"/>
+                <a16:creationId xmlns="" xmlns:a16="http://schemas.microsoft.com/office/drawing/2014/main" id="{8376130C-C0AC-A8B2-8FAD-042449DF13A9}"/>
               </a:ext>
             </a:extLst>
           </p:cNvPr>
@@ -912,7 +915,7 @@
           <p:cNvPr id="4" name="Date Placeholder 3">
             <a:extLst>
               <a:ext uri="{FF2B5EF4-FFF2-40B4-BE49-F238E27FC236}">
-                <a16:creationId xmlns:a16="http://schemas.microsoft.com/office/drawing/2014/main" xmlns="" id="{A317C649-4F4D-A2E4-CF86-14806957F0E5}"/>
+                <a16:creationId xmlns="" xmlns:a16="http://schemas.microsoft.com/office/drawing/2014/main" id="{A317C649-4F4D-A2E4-CF86-14806957F0E5}"/>
               </a:ext>
             </a:extLst>
           </p:cNvPr>
@@ -930,7 +933,7 @@
           <a:p>
             <a:fld id="{56226301-5D8D-4107-9BAD-DDEF00431FD1}" type="datetimeFigureOut">
               <a:rPr lang="pl-PL" smtClean="0"/>
-              <a:t>09.01.2024</a:t>
+              <a:t>10.01.2024</a:t>
             </a:fld>
             <a:endParaRPr lang="pl-PL"/>
           </a:p>
@@ -941,7 +944,7 @@
           <p:cNvPr id="5" name="Footer Placeholder 4">
             <a:extLst>
               <a:ext uri="{FF2B5EF4-FFF2-40B4-BE49-F238E27FC236}">
-                <a16:creationId xmlns:a16="http://schemas.microsoft.com/office/drawing/2014/main" xmlns="" id="{86B4B831-0D25-4D25-3CC3-C6C34C1F6EB6}"/>
+                <a16:creationId xmlns="" xmlns:a16="http://schemas.microsoft.com/office/drawing/2014/main" id="{86B4B831-0D25-4D25-3CC3-C6C34C1F6EB6}"/>
               </a:ext>
             </a:extLst>
           </p:cNvPr>
@@ -966,7 +969,7 @@
           <p:cNvPr id="6" name="Slide Number Placeholder 5">
             <a:extLst>
               <a:ext uri="{FF2B5EF4-FFF2-40B4-BE49-F238E27FC236}">
-                <a16:creationId xmlns:a16="http://schemas.microsoft.com/office/drawing/2014/main" xmlns="" id="{F038A00B-FC7A-2B79-CC68-9249BE38BAFE}"/>
+                <a16:creationId xmlns="" xmlns:a16="http://schemas.microsoft.com/office/drawing/2014/main" id="{F038A00B-FC7A-2B79-CC68-9249BE38BAFE}"/>
               </a:ext>
             </a:extLst>
           </p:cNvPr>
@@ -1025,7 +1028,7 @@
           <p:cNvPr id="2" name="Title 1">
             <a:extLst>
               <a:ext uri="{FF2B5EF4-FFF2-40B4-BE49-F238E27FC236}">
-                <a16:creationId xmlns:a16="http://schemas.microsoft.com/office/drawing/2014/main" xmlns="" id="{F4D84552-A45B-2FC4-6C12-4918AB54AE6C}"/>
+                <a16:creationId xmlns="" xmlns:a16="http://schemas.microsoft.com/office/drawing/2014/main" id="{F4D84552-A45B-2FC4-6C12-4918AB54AE6C}"/>
               </a:ext>
             </a:extLst>
           </p:cNvPr>
@@ -1054,7 +1057,7 @@
           <p:cNvPr id="3" name="Vertical Text Placeholder 2">
             <a:extLst>
               <a:ext uri="{FF2B5EF4-FFF2-40B4-BE49-F238E27FC236}">
-                <a16:creationId xmlns:a16="http://schemas.microsoft.com/office/drawing/2014/main" xmlns="" id="{FD3FE8B4-D86D-E706-BB07-5065CB69B6F4}"/>
+                <a16:creationId xmlns="" xmlns:a16="http://schemas.microsoft.com/office/drawing/2014/main" id="{FD3FE8B4-D86D-E706-BB07-5065CB69B6F4}"/>
               </a:ext>
             </a:extLst>
           </p:cNvPr>
@@ -1112,7 +1115,7 @@
           <p:cNvPr id="4" name="Date Placeholder 3">
             <a:extLst>
               <a:ext uri="{FF2B5EF4-FFF2-40B4-BE49-F238E27FC236}">
-                <a16:creationId xmlns:a16="http://schemas.microsoft.com/office/drawing/2014/main" xmlns="" id="{DA141205-46A8-5CEF-A3D3-607538E729EA}"/>
+                <a16:creationId xmlns="" xmlns:a16="http://schemas.microsoft.com/office/drawing/2014/main" id="{DA141205-46A8-5CEF-A3D3-607538E729EA}"/>
               </a:ext>
             </a:extLst>
           </p:cNvPr>
@@ -1130,7 +1133,7 @@
           <a:p>
             <a:fld id="{56226301-5D8D-4107-9BAD-DDEF00431FD1}" type="datetimeFigureOut">
               <a:rPr lang="pl-PL" smtClean="0"/>
-              <a:t>09.01.2024</a:t>
+              <a:t>10.01.2024</a:t>
             </a:fld>
             <a:endParaRPr lang="pl-PL"/>
           </a:p>
@@ -1141,7 +1144,7 @@
           <p:cNvPr id="5" name="Footer Placeholder 4">
             <a:extLst>
               <a:ext uri="{FF2B5EF4-FFF2-40B4-BE49-F238E27FC236}">
-                <a16:creationId xmlns:a16="http://schemas.microsoft.com/office/drawing/2014/main" xmlns="" id="{5C5B0F24-DD62-A5FC-4115-EB2D1F062368}"/>
+                <a16:creationId xmlns="" xmlns:a16="http://schemas.microsoft.com/office/drawing/2014/main" id="{5C5B0F24-DD62-A5FC-4115-EB2D1F062368}"/>
               </a:ext>
             </a:extLst>
           </p:cNvPr>
@@ -1166,7 +1169,7 @@
           <p:cNvPr id="6" name="Slide Number Placeholder 5">
             <a:extLst>
               <a:ext uri="{FF2B5EF4-FFF2-40B4-BE49-F238E27FC236}">
-                <a16:creationId xmlns:a16="http://schemas.microsoft.com/office/drawing/2014/main" xmlns="" id="{54D03FCB-AB35-C245-8CF5-B8A6C2C62E50}"/>
+                <a16:creationId xmlns="" xmlns:a16="http://schemas.microsoft.com/office/drawing/2014/main" id="{54D03FCB-AB35-C245-8CF5-B8A6C2C62E50}"/>
               </a:ext>
             </a:extLst>
           </p:cNvPr>
@@ -1225,7 +1228,7 @@
           <p:cNvPr id="2" name="Vertical Title 1">
             <a:extLst>
               <a:ext uri="{FF2B5EF4-FFF2-40B4-BE49-F238E27FC236}">
-                <a16:creationId xmlns:a16="http://schemas.microsoft.com/office/drawing/2014/main" xmlns="" id="{340130FD-6B4B-32F9-B509-46368F996392}"/>
+                <a16:creationId xmlns="" xmlns:a16="http://schemas.microsoft.com/office/drawing/2014/main" id="{340130FD-6B4B-32F9-B509-46368F996392}"/>
               </a:ext>
             </a:extLst>
           </p:cNvPr>
@@ -1259,7 +1262,7 @@
           <p:cNvPr id="3" name="Vertical Text Placeholder 2">
             <a:extLst>
               <a:ext uri="{FF2B5EF4-FFF2-40B4-BE49-F238E27FC236}">
-                <a16:creationId xmlns:a16="http://schemas.microsoft.com/office/drawing/2014/main" xmlns="" id="{B8F05C93-2C09-6598-C5F7-12978C00A298}"/>
+                <a16:creationId xmlns="" xmlns:a16="http://schemas.microsoft.com/office/drawing/2014/main" id="{B8F05C93-2C09-6598-C5F7-12978C00A298}"/>
               </a:ext>
             </a:extLst>
           </p:cNvPr>
@@ -1322,7 +1325,7 @@
           <p:cNvPr id="4" name="Date Placeholder 3">
             <a:extLst>
               <a:ext uri="{FF2B5EF4-FFF2-40B4-BE49-F238E27FC236}">
-                <a16:creationId xmlns:a16="http://schemas.microsoft.com/office/drawing/2014/main" xmlns="" id="{6C446BF0-5A2F-5292-8F48-CB6A49E23F8E}"/>
+                <a16:creationId xmlns="" xmlns:a16="http://schemas.microsoft.com/office/drawing/2014/main" id="{6C446BF0-5A2F-5292-8F48-CB6A49E23F8E}"/>
               </a:ext>
             </a:extLst>
           </p:cNvPr>
@@ -1340,7 +1343,7 @@
           <a:p>
             <a:fld id="{56226301-5D8D-4107-9BAD-DDEF00431FD1}" type="datetimeFigureOut">
               <a:rPr lang="pl-PL" smtClean="0"/>
-              <a:t>09.01.2024</a:t>
+              <a:t>10.01.2024</a:t>
             </a:fld>
             <a:endParaRPr lang="pl-PL"/>
           </a:p>
@@ -1351,7 +1354,7 @@
           <p:cNvPr id="5" name="Footer Placeholder 4">
             <a:extLst>
               <a:ext uri="{FF2B5EF4-FFF2-40B4-BE49-F238E27FC236}">
-                <a16:creationId xmlns:a16="http://schemas.microsoft.com/office/drawing/2014/main" xmlns="" id="{CC57B6C5-2210-4F32-DA53-13C3C884F729}"/>
+                <a16:creationId xmlns="" xmlns:a16="http://schemas.microsoft.com/office/drawing/2014/main" id="{CC57B6C5-2210-4F32-DA53-13C3C884F729}"/>
               </a:ext>
             </a:extLst>
           </p:cNvPr>
@@ -1376,7 +1379,7 @@
           <p:cNvPr id="6" name="Slide Number Placeholder 5">
             <a:extLst>
               <a:ext uri="{FF2B5EF4-FFF2-40B4-BE49-F238E27FC236}">
-                <a16:creationId xmlns:a16="http://schemas.microsoft.com/office/drawing/2014/main" xmlns="" id="{E41BF5CF-1904-5CC4-4A28-8990843D7CF0}"/>
+                <a16:creationId xmlns="" xmlns:a16="http://schemas.microsoft.com/office/drawing/2014/main" id="{E41BF5CF-1904-5CC4-4A28-8990843D7CF0}"/>
               </a:ext>
             </a:extLst>
           </p:cNvPr>
@@ -1435,7 +1438,7 @@
           <p:cNvPr id="2" name="Title 1">
             <a:extLst>
               <a:ext uri="{FF2B5EF4-FFF2-40B4-BE49-F238E27FC236}">
-                <a16:creationId xmlns:a16="http://schemas.microsoft.com/office/drawing/2014/main" xmlns="" id="{FE9C16F6-747C-E55B-0D0D-379213661743}"/>
+                <a16:creationId xmlns="" xmlns:a16="http://schemas.microsoft.com/office/drawing/2014/main" id="{FE9C16F6-747C-E55B-0D0D-379213661743}"/>
               </a:ext>
             </a:extLst>
           </p:cNvPr>
@@ -1464,7 +1467,7 @@
           <p:cNvPr id="3" name="Content Placeholder 2">
             <a:extLst>
               <a:ext uri="{FF2B5EF4-FFF2-40B4-BE49-F238E27FC236}">
-                <a16:creationId xmlns:a16="http://schemas.microsoft.com/office/drawing/2014/main" xmlns="" id="{F8621784-2831-458A-2E41-1B59B3736F58}"/>
+                <a16:creationId xmlns="" xmlns:a16="http://schemas.microsoft.com/office/drawing/2014/main" id="{F8621784-2831-458A-2E41-1B59B3736F58}"/>
               </a:ext>
             </a:extLst>
           </p:cNvPr>
@@ -1522,7 +1525,7 @@
           <p:cNvPr id="4" name="Date Placeholder 3">
             <a:extLst>
               <a:ext uri="{FF2B5EF4-FFF2-40B4-BE49-F238E27FC236}">
-                <a16:creationId xmlns:a16="http://schemas.microsoft.com/office/drawing/2014/main" xmlns="" id="{46AAB217-6418-2491-D83B-CAF45BB1E7A8}"/>
+                <a16:creationId xmlns="" xmlns:a16="http://schemas.microsoft.com/office/drawing/2014/main" id="{46AAB217-6418-2491-D83B-CAF45BB1E7A8}"/>
               </a:ext>
             </a:extLst>
           </p:cNvPr>
@@ -1540,7 +1543,7 @@
           <a:p>
             <a:fld id="{56226301-5D8D-4107-9BAD-DDEF00431FD1}" type="datetimeFigureOut">
               <a:rPr lang="pl-PL" smtClean="0"/>
-              <a:t>09.01.2024</a:t>
+              <a:t>10.01.2024</a:t>
             </a:fld>
             <a:endParaRPr lang="pl-PL"/>
           </a:p>
@@ -1551,7 +1554,7 @@
           <p:cNvPr id="5" name="Footer Placeholder 4">
             <a:extLst>
               <a:ext uri="{FF2B5EF4-FFF2-40B4-BE49-F238E27FC236}">
-                <a16:creationId xmlns:a16="http://schemas.microsoft.com/office/drawing/2014/main" xmlns="" id="{E87346B9-781A-AAE3-552A-2B5429EC94FD}"/>
+                <a16:creationId xmlns="" xmlns:a16="http://schemas.microsoft.com/office/drawing/2014/main" id="{E87346B9-781A-AAE3-552A-2B5429EC94FD}"/>
               </a:ext>
             </a:extLst>
           </p:cNvPr>
@@ -1576,7 +1579,7 @@
           <p:cNvPr id="6" name="Slide Number Placeholder 5">
             <a:extLst>
               <a:ext uri="{FF2B5EF4-FFF2-40B4-BE49-F238E27FC236}">
-                <a16:creationId xmlns:a16="http://schemas.microsoft.com/office/drawing/2014/main" xmlns="" id="{15339B32-2F0D-F0AC-0610-F425A536A9C1}"/>
+                <a16:creationId xmlns="" xmlns:a16="http://schemas.microsoft.com/office/drawing/2014/main" id="{15339B32-2F0D-F0AC-0610-F425A536A9C1}"/>
               </a:ext>
             </a:extLst>
           </p:cNvPr>
@@ -1635,7 +1638,7 @@
           <p:cNvPr id="2" name="Title 1">
             <a:extLst>
               <a:ext uri="{FF2B5EF4-FFF2-40B4-BE49-F238E27FC236}">
-                <a16:creationId xmlns:a16="http://schemas.microsoft.com/office/drawing/2014/main" xmlns="" id="{8813968F-E633-998F-4C22-93E6F554FDA0}"/>
+                <a16:creationId xmlns="" xmlns:a16="http://schemas.microsoft.com/office/drawing/2014/main" id="{8813968F-E633-998F-4C22-93E6F554FDA0}"/>
               </a:ext>
             </a:extLst>
           </p:cNvPr>
@@ -1673,7 +1676,7 @@
           <p:cNvPr id="3" name="Text Placeholder 2">
             <a:extLst>
               <a:ext uri="{FF2B5EF4-FFF2-40B4-BE49-F238E27FC236}">
-                <a16:creationId xmlns:a16="http://schemas.microsoft.com/office/drawing/2014/main" xmlns="" id="{DFF6B9CB-4C7B-94CC-050D-AF0152F3A7D4}"/>
+                <a16:creationId xmlns="" xmlns:a16="http://schemas.microsoft.com/office/drawing/2014/main" id="{DFF6B9CB-4C7B-94CC-050D-AF0152F3A7D4}"/>
               </a:ext>
             </a:extLst>
           </p:cNvPr>
@@ -1798,7 +1801,7 @@
           <p:cNvPr id="4" name="Date Placeholder 3">
             <a:extLst>
               <a:ext uri="{FF2B5EF4-FFF2-40B4-BE49-F238E27FC236}">
-                <a16:creationId xmlns:a16="http://schemas.microsoft.com/office/drawing/2014/main" xmlns="" id="{14237DE1-E9AF-B1C6-D4B7-4D4A9D92736A}"/>
+                <a16:creationId xmlns="" xmlns:a16="http://schemas.microsoft.com/office/drawing/2014/main" id="{14237DE1-E9AF-B1C6-D4B7-4D4A9D92736A}"/>
               </a:ext>
             </a:extLst>
           </p:cNvPr>
@@ -1816,7 +1819,7 @@
           <a:p>
             <a:fld id="{56226301-5D8D-4107-9BAD-DDEF00431FD1}" type="datetimeFigureOut">
               <a:rPr lang="pl-PL" smtClean="0"/>
-              <a:t>09.01.2024</a:t>
+              <a:t>10.01.2024</a:t>
             </a:fld>
             <a:endParaRPr lang="pl-PL"/>
           </a:p>
@@ -1827,7 +1830,7 @@
           <p:cNvPr id="5" name="Footer Placeholder 4">
             <a:extLst>
               <a:ext uri="{FF2B5EF4-FFF2-40B4-BE49-F238E27FC236}">
-                <a16:creationId xmlns:a16="http://schemas.microsoft.com/office/drawing/2014/main" xmlns="" id="{66A65784-6F7C-85C2-CAEB-484D0782AF71}"/>
+                <a16:creationId xmlns="" xmlns:a16="http://schemas.microsoft.com/office/drawing/2014/main" id="{66A65784-6F7C-85C2-CAEB-484D0782AF71}"/>
               </a:ext>
             </a:extLst>
           </p:cNvPr>
@@ -1852,7 +1855,7 @@
           <p:cNvPr id="6" name="Slide Number Placeholder 5">
             <a:extLst>
               <a:ext uri="{FF2B5EF4-FFF2-40B4-BE49-F238E27FC236}">
-                <a16:creationId xmlns:a16="http://schemas.microsoft.com/office/drawing/2014/main" xmlns="" id="{0CFE103E-577A-BD41-A548-CC12B109EEB9}"/>
+                <a16:creationId xmlns="" xmlns:a16="http://schemas.microsoft.com/office/drawing/2014/main" id="{0CFE103E-577A-BD41-A548-CC12B109EEB9}"/>
               </a:ext>
             </a:extLst>
           </p:cNvPr>
@@ -1911,7 +1914,7 @@
           <p:cNvPr id="2" name="Title 1">
             <a:extLst>
               <a:ext uri="{FF2B5EF4-FFF2-40B4-BE49-F238E27FC236}">
-                <a16:creationId xmlns:a16="http://schemas.microsoft.com/office/drawing/2014/main" xmlns="" id="{2D326AA7-48A7-C584-EB10-FB2EEE275CBD}"/>
+                <a16:creationId xmlns="" xmlns:a16="http://schemas.microsoft.com/office/drawing/2014/main" id="{2D326AA7-48A7-C584-EB10-FB2EEE275CBD}"/>
               </a:ext>
             </a:extLst>
           </p:cNvPr>
@@ -1940,7 +1943,7 @@
           <p:cNvPr id="3" name="Content Placeholder 2">
             <a:extLst>
               <a:ext uri="{FF2B5EF4-FFF2-40B4-BE49-F238E27FC236}">
-                <a16:creationId xmlns:a16="http://schemas.microsoft.com/office/drawing/2014/main" xmlns="" id="{1894C6A4-3164-C637-D949-59D399CC7872}"/>
+                <a16:creationId xmlns="" xmlns:a16="http://schemas.microsoft.com/office/drawing/2014/main" id="{1894C6A4-3164-C637-D949-59D399CC7872}"/>
               </a:ext>
             </a:extLst>
           </p:cNvPr>
@@ -2003,7 +2006,7 @@
           <p:cNvPr id="4" name="Content Placeholder 3">
             <a:extLst>
               <a:ext uri="{FF2B5EF4-FFF2-40B4-BE49-F238E27FC236}">
-                <a16:creationId xmlns:a16="http://schemas.microsoft.com/office/drawing/2014/main" xmlns="" id="{8478F268-F5AD-8F40-E455-3E62B495BAFC}"/>
+                <a16:creationId xmlns="" xmlns:a16="http://schemas.microsoft.com/office/drawing/2014/main" id="{8478F268-F5AD-8F40-E455-3E62B495BAFC}"/>
               </a:ext>
             </a:extLst>
           </p:cNvPr>
@@ -2066,7 +2069,7 @@
           <p:cNvPr id="5" name="Date Placeholder 4">
             <a:extLst>
               <a:ext uri="{FF2B5EF4-FFF2-40B4-BE49-F238E27FC236}">
-                <a16:creationId xmlns:a16="http://schemas.microsoft.com/office/drawing/2014/main" xmlns="" id="{BF728CFA-8F03-8C2C-C4B4-4DEAF99D2204}"/>
+                <a16:creationId xmlns="" xmlns:a16="http://schemas.microsoft.com/office/drawing/2014/main" id="{BF728CFA-8F03-8C2C-C4B4-4DEAF99D2204}"/>
               </a:ext>
             </a:extLst>
           </p:cNvPr>
@@ -2084,7 +2087,7 @@
           <a:p>
             <a:fld id="{56226301-5D8D-4107-9BAD-DDEF00431FD1}" type="datetimeFigureOut">
               <a:rPr lang="pl-PL" smtClean="0"/>
-              <a:t>09.01.2024</a:t>
+              <a:t>10.01.2024</a:t>
             </a:fld>
             <a:endParaRPr lang="pl-PL"/>
           </a:p>
@@ -2095,7 +2098,7 @@
           <p:cNvPr id="6" name="Footer Placeholder 5">
             <a:extLst>
               <a:ext uri="{FF2B5EF4-FFF2-40B4-BE49-F238E27FC236}">
-                <a16:creationId xmlns:a16="http://schemas.microsoft.com/office/drawing/2014/main" xmlns="" id="{845F15C3-4B7C-FAB7-D449-DB7A6121A47C}"/>
+                <a16:creationId xmlns="" xmlns:a16="http://schemas.microsoft.com/office/drawing/2014/main" id="{845F15C3-4B7C-FAB7-D449-DB7A6121A47C}"/>
               </a:ext>
             </a:extLst>
           </p:cNvPr>
@@ -2120,7 +2123,7 @@
           <p:cNvPr id="7" name="Slide Number Placeholder 6">
             <a:extLst>
               <a:ext uri="{FF2B5EF4-FFF2-40B4-BE49-F238E27FC236}">
-                <a16:creationId xmlns:a16="http://schemas.microsoft.com/office/drawing/2014/main" xmlns="" id="{8E0CFA68-3659-9646-82F7-68CF7718A3EF}"/>
+                <a16:creationId xmlns="" xmlns:a16="http://schemas.microsoft.com/office/drawing/2014/main" id="{8E0CFA68-3659-9646-82F7-68CF7718A3EF}"/>
               </a:ext>
             </a:extLst>
           </p:cNvPr>
@@ -2179,7 +2182,7 @@
           <p:cNvPr id="2" name="Title 1">
             <a:extLst>
               <a:ext uri="{FF2B5EF4-FFF2-40B4-BE49-F238E27FC236}">
-                <a16:creationId xmlns:a16="http://schemas.microsoft.com/office/drawing/2014/main" xmlns="" id="{EF0E2FA3-F7F9-852B-8375-47EA9C30A19A}"/>
+                <a16:creationId xmlns="" xmlns:a16="http://schemas.microsoft.com/office/drawing/2014/main" id="{EF0E2FA3-F7F9-852B-8375-47EA9C30A19A}"/>
               </a:ext>
             </a:extLst>
           </p:cNvPr>
@@ -2213,7 +2216,7 @@
           <p:cNvPr id="3" name="Text Placeholder 2">
             <a:extLst>
               <a:ext uri="{FF2B5EF4-FFF2-40B4-BE49-F238E27FC236}">
-                <a16:creationId xmlns:a16="http://schemas.microsoft.com/office/drawing/2014/main" xmlns="" id="{2049AE30-0936-6304-98C8-32D8FFBB2B8C}"/>
+                <a16:creationId xmlns="" xmlns:a16="http://schemas.microsoft.com/office/drawing/2014/main" id="{2049AE30-0936-6304-98C8-32D8FFBB2B8C}"/>
               </a:ext>
             </a:extLst>
           </p:cNvPr>
@@ -2284,7 +2287,7 @@
           <p:cNvPr id="4" name="Content Placeholder 3">
             <a:extLst>
               <a:ext uri="{FF2B5EF4-FFF2-40B4-BE49-F238E27FC236}">
-                <a16:creationId xmlns:a16="http://schemas.microsoft.com/office/drawing/2014/main" xmlns="" id="{1713A900-BC24-1778-3214-B09DC852C2C2}"/>
+                <a16:creationId xmlns="" xmlns:a16="http://schemas.microsoft.com/office/drawing/2014/main" id="{1713A900-BC24-1778-3214-B09DC852C2C2}"/>
               </a:ext>
             </a:extLst>
           </p:cNvPr>
@@ -2347,7 +2350,7 @@
           <p:cNvPr id="5" name="Text Placeholder 4">
             <a:extLst>
               <a:ext uri="{FF2B5EF4-FFF2-40B4-BE49-F238E27FC236}">
-                <a16:creationId xmlns:a16="http://schemas.microsoft.com/office/drawing/2014/main" xmlns="" id="{8368043B-C7FC-9646-5AD3-271A5FA2C656}"/>
+                <a16:creationId xmlns="" xmlns:a16="http://schemas.microsoft.com/office/drawing/2014/main" id="{8368043B-C7FC-9646-5AD3-271A5FA2C656}"/>
               </a:ext>
             </a:extLst>
           </p:cNvPr>
@@ -2418,7 +2421,7 @@
           <p:cNvPr id="6" name="Content Placeholder 5">
             <a:extLst>
               <a:ext uri="{FF2B5EF4-FFF2-40B4-BE49-F238E27FC236}">
-                <a16:creationId xmlns:a16="http://schemas.microsoft.com/office/drawing/2014/main" xmlns="" id="{CB83399B-E7E7-F2FA-8590-46A2AE94D533}"/>
+                <a16:creationId xmlns="" xmlns:a16="http://schemas.microsoft.com/office/drawing/2014/main" id="{CB83399B-E7E7-F2FA-8590-46A2AE94D533}"/>
               </a:ext>
             </a:extLst>
           </p:cNvPr>
@@ -2481,7 +2484,7 @@
           <p:cNvPr id="7" name="Date Placeholder 6">
             <a:extLst>
               <a:ext uri="{FF2B5EF4-FFF2-40B4-BE49-F238E27FC236}">
-                <a16:creationId xmlns:a16="http://schemas.microsoft.com/office/drawing/2014/main" xmlns="" id="{D503EFE8-E470-BC9A-B80B-C850BBDB2423}"/>
+                <a16:creationId xmlns="" xmlns:a16="http://schemas.microsoft.com/office/drawing/2014/main" id="{D503EFE8-E470-BC9A-B80B-C850BBDB2423}"/>
               </a:ext>
             </a:extLst>
           </p:cNvPr>
@@ -2499,7 +2502,7 @@
           <a:p>
             <a:fld id="{56226301-5D8D-4107-9BAD-DDEF00431FD1}" type="datetimeFigureOut">
               <a:rPr lang="pl-PL" smtClean="0"/>
-              <a:t>09.01.2024</a:t>
+              <a:t>10.01.2024</a:t>
             </a:fld>
             <a:endParaRPr lang="pl-PL"/>
           </a:p>
@@ -2510,7 +2513,7 @@
           <p:cNvPr id="8" name="Footer Placeholder 7">
             <a:extLst>
               <a:ext uri="{FF2B5EF4-FFF2-40B4-BE49-F238E27FC236}">
-                <a16:creationId xmlns:a16="http://schemas.microsoft.com/office/drawing/2014/main" xmlns="" id="{34DE0786-E8F5-B2B5-7C98-60BF97D5A8CD}"/>
+                <a16:creationId xmlns="" xmlns:a16="http://schemas.microsoft.com/office/drawing/2014/main" id="{34DE0786-E8F5-B2B5-7C98-60BF97D5A8CD}"/>
               </a:ext>
             </a:extLst>
           </p:cNvPr>
@@ -2535,7 +2538,7 @@
           <p:cNvPr id="9" name="Slide Number Placeholder 8">
             <a:extLst>
               <a:ext uri="{FF2B5EF4-FFF2-40B4-BE49-F238E27FC236}">
-                <a16:creationId xmlns:a16="http://schemas.microsoft.com/office/drawing/2014/main" xmlns="" id="{DB4284C6-90D2-A2AE-C7F8-A869CB4BCEEA}"/>
+                <a16:creationId xmlns="" xmlns:a16="http://schemas.microsoft.com/office/drawing/2014/main" id="{DB4284C6-90D2-A2AE-C7F8-A869CB4BCEEA}"/>
               </a:ext>
             </a:extLst>
           </p:cNvPr>
@@ -2594,7 +2597,7 @@
           <p:cNvPr id="2" name="Title 1">
             <a:extLst>
               <a:ext uri="{FF2B5EF4-FFF2-40B4-BE49-F238E27FC236}">
-                <a16:creationId xmlns:a16="http://schemas.microsoft.com/office/drawing/2014/main" xmlns="" id="{34B3CA61-240D-D544-A95B-6B10679CD518}"/>
+                <a16:creationId xmlns="" xmlns:a16="http://schemas.microsoft.com/office/drawing/2014/main" id="{34B3CA61-240D-D544-A95B-6B10679CD518}"/>
               </a:ext>
             </a:extLst>
           </p:cNvPr>
@@ -2623,7 +2626,7 @@
           <p:cNvPr id="3" name="Date Placeholder 2">
             <a:extLst>
               <a:ext uri="{FF2B5EF4-FFF2-40B4-BE49-F238E27FC236}">
-                <a16:creationId xmlns:a16="http://schemas.microsoft.com/office/drawing/2014/main" xmlns="" id="{EE760131-26C0-EBBF-329E-3D41BBCD42F8}"/>
+                <a16:creationId xmlns="" xmlns:a16="http://schemas.microsoft.com/office/drawing/2014/main" id="{EE760131-26C0-EBBF-329E-3D41BBCD42F8}"/>
               </a:ext>
             </a:extLst>
           </p:cNvPr>
@@ -2641,7 +2644,7 @@
           <a:p>
             <a:fld id="{56226301-5D8D-4107-9BAD-DDEF00431FD1}" type="datetimeFigureOut">
               <a:rPr lang="pl-PL" smtClean="0"/>
-              <a:t>09.01.2024</a:t>
+              <a:t>10.01.2024</a:t>
             </a:fld>
             <a:endParaRPr lang="pl-PL"/>
           </a:p>
@@ -2652,7 +2655,7 @@
           <p:cNvPr id="4" name="Footer Placeholder 3">
             <a:extLst>
               <a:ext uri="{FF2B5EF4-FFF2-40B4-BE49-F238E27FC236}">
-                <a16:creationId xmlns:a16="http://schemas.microsoft.com/office/drawing/2014/main" xmlns="" id="{C39A785D-2673-5ECC-4387-88A5FEF880EE}"/>
+                <a16:creationId xmlns="" xmlns:a16="http://schemas.microsoft.com/office/drawing/2014/main" id="{C39A785D-2673-5ECC-4387-88A5FEF880EE}"/>
               </a:ext>
             </a:extLst>
           </p:cNvPr>
@@ -2677,7 +2680,7 @@
           <p:cNvPr id="5" name="Slide Number Placeholder 4">
             <a:extLst>
               <a:ext uri="{FF2B5EF4-FFF2-40B4-BE49-F238E27FC236}">
-                <a16:creationId xmlns:a16="http://schemas.microsoft.com/office/drawing/2014/main" xmlns="" id="{F076CE58-21F4-E0C6-05B1-E429F88838CA}"/>
+                <a16:creationId xmlns="" xmlns:a16="http://schemas.microsoft.com/office/drawing/2014/main" id="{F076CE58-21F4-E0C6-05B1-E429F88838CA}"/>
               </a:ext>
             </a:extLst>
           </p:cNvPr>
@@ -2736,7 +2739,7 @@
           <p:cNvPr id="2" name="Date Placeholder 1">
             <a:extLst>
               <a:ext uri="{FF2B5EF4-FFF2-40B4-BE49-F238E27FC236}">
-                <a16:creationId xmlns:a16="http://schemas.microsoft.com/office/drawing/2014/main" xmlns="" id="{B6F43EBE-F0A2-6871-4DB2-DE61350E2279}"/>
+                <a16:creationId xmlns="" xmlns:a16="http://schemas.microsoft.com/office/drawing/2014/main" id="{B6F43EBE-F0A2-6871-4DB2-DE61350E2279}"/>
               </a:ext>
             </a:extLst>
           </p:cNvPr>
@@ -2754,7 +2757,7 @@
           <a:p>
             <a:fld id="{56226301-5D8D-4107-9BAD-DDEF00431FD1}" type="datetimeFigureOut">
               <a:rPr lang="pl-PL" smtClean="0"/>
-              <a:t>09.01.2024</a:t>
+              <a:t>10.01.2024</a:t>
             </a:fld>
             <a:endParaRPr lang="pl-PL"/>
           </a:p>
@@ -2765,7 +2768,7 @@
           <p:cNvPr id="3" name="Footer Placeholder 2">
             <a:extLst>
               <a:ext uri="{FF2B5EF4-FFF2-40B4-BE49-F238E27FC236}">
-                <a16:creationId xmlns:a16="http://schemas.microsoft.com/office/drawing/2014/main" xmlns="" id="{CB14F204-B444-C689-F0E5-BF58FBC41E67}"/>
+                <a16:creationId xmlns="" xmlns:a16="http://schemas.microsoft.com/office/drawing/2014/main" id="{CB14F204-B444-C689-F0E5-BF58FBC41E67}"/>
               </a:ext>
             </a:extLst>
           </p:cNvPr>
@@ -2790,7 +2793,7 @@
           <p:cNvPr id="4" name="Slide Number Placeholder 3">
             <a:extLst>
               <a:ext uri="{FF2B5EF4-FFF2-40B4-BE49-F238E27FC236}">
-                <a16:creationId xmlns:a16="http://schemas.microsoft.com/office/drawing/2014/main" xmlns="" id="{33603264-D7F7-612B-A7A4-96708B4B8A8A}"/>
+                <a16:creationId xmlns="" xmlns:a16="http://schemas.microsoft.com/office/drawing/2014/main" id="{33603264-D7F7-612B-A7A4-96708B4B8A8A}"/>
               </a:ext>
             </a:extLst>
           </p:cNvPr>
@@ -2849,7 +2852,7 @@
           <p:cNvPr id="2" name="Title 1">
             <a:extLst>
               <a:ext uri="{FF2B5EF4-FFF2-40B4-BE49-F238E27FC236}">
-                <a16:creationId xmlns:a16="http://schemas.microsoft.com/office/drawing/2014/main" xmlns="" id="{D1F8071D-325E-1A4E-4949-AB806309D7B6}"/>
+                <a16:creationId xmlns="" xmlns:a16="http://schemas.microsoft.com/office/drawing/2014/main" id="{D1F8071D-325E-1A4E-4949-AB806309D7B6}"/>
               </a:ext>
             </a:extLst>
           </p:cNvPr>
@@ -2887,7 +2890,7 @@
           <p:cNvPr id="3" name="Content Placeholder 2">
             <a:extLst>
               <a:ext uri="{FF2B5EF4-FFF2-40B4-BE49-F238E27FC236}">
-                <a16:creationId xmlns:a16="http://schemas.microsoft.com/office/drawing/2014/main" xmlns="" id="{F0845417-3D44-B22E-D152-B569193A8632}"/>
+                <a16:creationId xmlns="" xmlns:a16="http://schemas.microsoft.com/office/drawing/2014/main" id="{F0845417-3D44-B22E-D152-B569193A8632}"/>
               </a:ext>
             </a:extLst>
           </p:cNvPr>
@@ -2978,7 +2981,7 @@
           <p:cNvPr id="4" name="Text Placeholder 3">
             <a:extLst>
               <a:ext uri="{FF2B5EF4-FFF2-40B4-BE49-F238E27FC236}">
-                <a16:creationId xmlns:a16="http://schemas.microsoft.com/office/drawing/2014/main" xmlns="" id="{29A8406E-D796-712F-7543-04AB8667E4F5}"/>
+                <a16:creationId xmlns="" xmlns:a16="http://schemas.microsoft.com/office/drawing/2014/main" id="{29A8406E-D796-712F-7543-04AB8667E4F5}"/>
               </a:ext>
             </a:extLst>
           </p:cNvPr>
@@ -3049,7 +3052,7 @@
           <p:cNvPr id="5" name="Date Placeholder 4">
             <a:extLst>
               <a:ext uri="{FF2B5EF4-FFF2-40B4-BE49-F238E27FC236}">
-                <a16:creationId xmlns:a16="http://schemas.microsoft.com/office/drawing/2014/main" xmlns="" id="{CC2277AF-ADD7-3809-A7CD-204B6BA809F6}"/>
+                <a16:creationId xmlns="" xmlns:a16="http://schemas.microsoft.com/office/drawing/2014/main" id="{CC2277AF-ADD7-3809-A7CD-204B6BA809F6}"/>
               </a:ext>
             </a:extLst>
           </p:cNvPr>
@@ -3067,7 +3070,7 @@
           <a:p>
             <a:fld id="{56226301-5D8D-4107-9BAD-DDEF00431FD1}" type="datetimeFigureOut">
               <a:rPr lang="pl-PL" smtClean="0"/>
-              <a:t>09.01.2024</a:t>
+              <a:t>10.01.2024</a:t>
             </a:fld>
             <a:endParaRPr lang="pl-PL"/>
           </a:p>
@@ -3078,7 +3081,7 @@
           <p:cNvPr id="6" name="Footer Placeholder 5">
             <a:extLst>
               <a:ext uri="{FF2B5EF4-FFF2-40B4-BE49-F238E27FC236}">
-                <a16:creationId xmlns:a16="http://schemas.microsoft.com/office/drawing/2014/main" xmlns="" id="{B1AA2F66-8B1E-D724-E8BD-E624776AE715}"/>
+                <a16:creationId xmlns="" xmlns:a16="http://schemas.microsoft.com/office/drawing/2014/main" id="{B1AA2F66-8B1E-D724-E8BD-E624776AE715}"/>
               </a:ext>
             </a:extLst>
           </p:cNvPr>
@@ -3103,7 +3106,7 @@
           <p:cNvPr id="7" name="Slide Number Placeholder 6">
             <a:extLst>
               <a:ext uri="{FF2B5EF4-FFF2-40B4-BE49-F238E27FC236}">
-                <a16:creationId xmlns:a16="http://schemas.microsoft.com/office/drawing/2014/main" xmlns="" id="{E8955DAC-A6D0-B051-A34A-8E6523598BB7}"/>
+                <a16:creationId xmlns="" xmlns:a16="http://schemas.microsoft.com/office/drawing/2014/main" id="{E8955DAC-A6D0-B051-A34A-8E6523598BB7}"/>
               </a:ext>
             </a:extLst>
           </p:cNvPr>
@@ -3162,7 +3165,7 @@
           <p:cNvPr id="2" name="Title 1">
             <a:extLst>
               <a:ext uri="{FF2B5EF4-FFF2-40B4-BE49-F238E27FC236}">
-                <a16:creationId xmlns:a16="http://schemas.microsoft.com/office/drawing/2014/main" xmlns="" id="{8A195594-1E43-E39B-EA82-A4D2A038FF00}"/>
+                <a16:creationId xmlns="" xmlns:a16="http://schemas.microsoft.com/office/drawing/2014/main" id="{8A195594-1E43-E39B-EA82-A4D2A038FF00}"/>
               </a:ext>
             </a:extLst>
           </p:cNvPr>
@@ -3200,7 +3203,7 @@
           <p:cNvPr id="3" name="Picture Placeholder 2">
             <a:extLst>
               <a:ext uri="{FF2B5EF4-FFF2-40B4-BE49-F238E27FC236}">
-                <a16:creationId xmlns:a16="http://schemas.microsoft.com/office/drawing/2014/main" xmlns="" id="{A2BEDD65-A312-6B36-1CBD-41D0AC8044D8}"/>
+                <a16:creationId xmlns="" xmlns:a16="http://schemas.microsoft.com/office/drawing/2014/main" id="{A2BEDD65-A312-6B36-1CBD-41D0AC8044D8}"/>
               </a:ext>
             </a:extLst>
           </p:cNvPr>
@@ -3267,7 +3270,7 @@
           <p:cNvPr id="4" name="Text Placeholder 3">
             <a:extLst>
               <a:ext uri="{FF2B5EF4-FFF2-40B4-BE49-F238E27FC236}">
-                <a16:creationId xmlns:a16="http://schemas.microsoft.com/office/drawing/2014/main" xmlns="" id="{D7BF313F-387B-7C2B-52C1-219400D16346}"/>
+                <a16:creationId xmlns="" xmlns:a16="http://schemas.microsoft.com/office/drawing/2014/main" id="{D7BF313F-387B-7C2B-52C1-219400D16346}"/>
               </a:ext>
             </a:extLst>
           </p:cNvPr>
@@ -3338,7 +3341,7 @@
           <p:cNvPr id="5" name="Date Placeholder 4">
             <a:extLst>
               <a:ext uri="{FF2B5EF4-FFF2-40B4-BE49-F238E27FC236}">
-                <a16:creationId xmlns:a16="http://schemas.microsoft.com/office/drawing/2014/main" xmlns="" id="{DCB7237C-B2CA-25B3-8F8A-F1854012D43D}"/>
+                <a16:creationId xmlns="" xmlns:a16="http://schemas.microsoft.com/office/drawing/2014/main" id="{DCB7237C-B2CA-25B3-8F8A-F1854012D43D}"/>
               </a:ext>
             </a:extLst>
           </p:cNvPr>
@@ -3356,7 +3359,7 @@
           <a:p>
             <a:fld id="{56226301-5D8D-4107-9BAD-DDEF00431FD1}" type="datetimeFigureOut">
               <a:rPr lang="pl-PL" smtClean="0"/>
-              <a:t>09.01.2024</a:t>
+              <a:t>10.01.2024</a:t>
             </a:fld>
             <a:endParaRPr lang="pl-PL"/>
           </a:p>
@@ -3367,7 +3370,7 @@
           <p:cNvPr id="6" name="Footer Placeholder 5">
             <a:extLst>
               <a:ext uri="{FF2B5EF4-FFF2-40B4-BE49-F238E27FC236}">
-                <a16:creationId xmlns:a16="http://schemas.microsoft.com/office/drawing/2014/main" xmlns="" id="{461F178F-C90A-EE0B-734B-4CA9A5738017}"/>
+                <a16:creationId xmlns="" xmlns:a16="http://schemas.microsoft.com/office/drawing/2014/main" id="{461F178F-C90A-EE0B-734B-4CA9A5738017}"/>
               </a:ext>
             </a:extLst>
           </p:cNvPr>
@@ -3392,7 +3395,7 @@
           <p:cNvPr id="7" name="Slide Number Placeholder 6">
             <a:extLst>
               <a:ext uri="{FF2B5EF4-FFF2-40B4-BE49-F238E27FC236}">
-                <a16:creationId xmlns:a16="http://schemas.microsoft.com/office/drawing/2014/main" xmlns="" id="{D358B68D-A5C7-AA2A-A4D2-219571DE1E8D}"/>
+                <a16:creationId xmlns="" xmlns:a16="http://schemas.microsoft.com/office/drawing/2014/main" id="{D358B68D-A5C7-AA2A-A4D2-219571DE1E8D}"/>
               </a:ext>
             </a:extLst>
           </p:cNvPr>
@@ -3456,7 +3459,7 @@
           <p:cNvPr id="2" name="Title Placeholder 1">
             <a:extLst>
               <a:ext uri="{FF2B5EF4-FFF2-40B4-BE49-F238E27FC236}">
-                <a16:creationId xmlns:a16="http://schemas.microsoft.com/office/drawing/2014/main" xmlns="" id="{4E399F68-1D9F-6F04-44ED-3FF5605F5381}"/>
+                <a16:creationId xmlns="" xmlns:a16="http://schemas.microsoft.com/office/drawing/2014/main" id="{4E399F68-1D9F-6F04-44ED-3FF5605F5381}"/>
               </a:ext>
             </a:extLst>
           </p:cNvPr>
@@ -3495,7 +3498,7 @@
           <p:cNvPr id="3" name="Text Placeholder 2">
             <a:extLst>
               <a:ext uri="{FF2B5EF4-FFF2-40B4-BE49-F238E27FC236}">
-                <a16:creationId xmlns:a16="http://schemas.microsoft.com/office/drawing/2014/main" xmlns="" id="{1A5D6C6B-7992-B35A-3C9E-DEB36EB1AB87}"/>
+                <a16:creationId xmlns="" xmlns:a16="http://schemas.microsoft.com/office/drawing/2014/main" id="{1A5D6C6B-7992-B35A-3C9E-DEB36EB1AB87}"/>
               </a:ext>
             </a:extLst>
           </p:cNvPr>
@@ -3563,7 +3566,7 @@
           <p:cNvPr id="4" name="Date Placeholder 3">
             <a:extLst>
               <a:ext uri="{FF2B5EF4-FFF2-40B4-BE49-F238E27FC236}">
-                <a16:creationId xmlns:a16="http://schemas.microsoft.com/office/drawing/2014/main" xmlns="" id="{D7769C4F-1965-58FB-3DF4-42B86D859E34}"/>
+                <a16:creationId xmlns="" xmlns:a16="http://schemas.microsoft.com/office/drawing/2014/main" id="{D7769C4F-1965-58FB-3DF4-42B86D859E34}"/>
               </a:ext>
             </a:extLst>
           </p:cNvPr>
@@ -3599,7 +3602,7 @@
           <a:p>
             <a:fld id="{56226301-5D8D-4107-9BAD-DDEF00431FD1}" type="datetimeFigureOut">
               <a:rPr lang="pl-PL" smtClean="0"/>
-              <a:t>09.01.2024</a:t>
+              <a:t>10.01.2024</a:t>
             </a:fld>
             <a:endParaRPr lang="pl-PL"/>
           </a:p>
@@ -3610,7 +3613,7 @@
           <p:cNvPr id="5" name="Footer Placeholder 4">
             <a:extLst>
               <a:ext uri="{FF2B5EF4-FFF2-40B4-BE49-F238E27FC236}">
-                <a16:creationId xmlns:a16="http://schemas.microsoft.com/office/drawing/2014/main" xmlns="" id="{8FB50E99-3CB3-C65B-4CAE-E9931DCFD835}"/>
+                <a16:creationId xmlns="" xmlns:a16="http://schemas.microsoft.com/office/drawing/2014/main" id="{8FB50E99-3CB3-C65B-4CAE-E9931DCFD835}"/>
               </a:ext>
             </a:extLst>
           </p:cNvPr>
@@ -3653,7 +3656,7 @@
           <p:cNvPr id="6" name="Slide Number Placeholder 5">
             <a:extLst>
               <a:ext uri="{FF2B5EF4-FFF2-40B4-BE49-F238E27FC236}">
-                <a16:creationId xmlns:a16="http://schemas.microsoft.com/office/drawing/2014/main" xmlns="" id="{42EF9596-3C95-CC3B-9775-347BC84CEBEA}"/>
+                <a16:creationId xmlns="" xmlns:a16="http://schemas.microsoft.com/office/drawing/2014/main" id="{42EF9596-3C95-CC3B-9775-347BC84CEBEA}"/>
               </a:ext>
             </a:extLst>
           </p:cNvPr>
@@ -4021,7 +4024,7 @@
           <p:cNvPr id="2" name="Title 1">
             <a:extLst>
               <a:ext uri="{FF2B5EF4-FFF2-40B4-BE49-F238E27FC236}">
-                <a16:creationId xmlns:a16="http://schemas.microsoft.com/office/drawing/2014/main" xmlns="" id="{8B23FD79-2A7F-C843-4D49-E55B82A912EA}"/>
+                <a16:creationId xmlns="" xmlns:a16="http://schemas.microsoft.com/office/drawing/2014/main" id="{8B23FD79-2A7F-C843-4D49-E55B82A912EA}"/>
               </a:ext>
             </a:extLst>
           </p:cNvPr>
@@ -4054,7 +4057,7 @@
           <p:cNvPr id="3" name="Subtitle 2">
             <a:extLst>
               <a:ext uri="{FF2B5EF4-FFF2-40B4-BE49-F238E27FC236}">
-                <a16:creationId xmlns:a16="http://schemas.microsoft.com/office/drawing/2014/main" xmlns="" id="{6DA918BB-4C6D-ED82-3A63-526473D748CD}"/>
+                <a16:creationId xmlns="" xmlns:a16="http://schemas.microsoft.com/office/drawing/2014/main" id="{6DA918BB-4C6D-ED82-3A63-526473D748CD}"/>
               </a:ext>
             </a:extLst>
           </p:cNvPr>
@@ -4133,7 +4136,7 @@
           <p:cNvPr id="5" name="Content Placeholder 4">
             <a:extLst>
               <a:ext uri="{FF2B5EF4-FFF2-40B4-BE49-F238E27FC236}">
-                <a16:creationId xmlns:a16="http://schemas.microsoft.com/office/drawing/2014/main" xmlns="" id="{3FEE9EBB-F2A1-7938-918B-B6DBEEA75DD6}"/>
+                <a16:creationId xmlns="" xmlns:a16="http://schemas.microsoft.com/office/drawing/2014/main" id="{3FEE9EBB-F2A1-7938-918B-B6DBEEA75DD6}"/>
               </a:ext>
             </a:extLst>
           </p:cNvPr>
@@ -4210,7 +4213,7 @@
           <p:cNvPr id="9" name="Picture 8" descr="A screen shot of a computer program&#10;&#10;Description automatically generated">
             <a:extLst>
               <a:ext uri="{FF2B5EF4-FFF2-40B4-BE49-F238E27FC236}">
-                <a16:creationId xmlns:a16="http://schemas.microsoft.com/office/drawing/2014/main" xmlns="" id="{53B179B4-DED8-DA0C-43FB-DC2DF2CAA8D2}"/>
+                <a16:creationId xmlns="" xmlns:a16="http://schemas.microsoft.com/office/drawing/2014/main" id="{53B179B4-DED8-DA0C-43FB-DC2DF2CAA8D2}"/>
               </a:ext>
             </a:extLst>
           </p:cNvPr>
@@ -4240,7 +4243,7 @@
           <p:cNvPr id="11" name="Picture 10" descr="A computer screen with text&#10;&#10;Description automatically generated">
             <a:extLst>
               <a:ext uri="{FF2B5EF4-FFF2-40B4-BE49-F238E27FC236}">
-                <a16:creationId xmlns:a16="http://schemas.microsoft.com/office/drawing/2014/main" xmlns="" id="{2E291A84-B725-51B6-24FA-33318C4BA5C2}"/>
+                <a16:creationId xmlns="" xmlns:a16="http://schemas.microsoft.com/office/drawing/2014/main" id="{2E291A84-B725-51B6-24FA-33318C4BA5C2}"/>
               </a:ext>
             </a:extLst>
           </p:cNvPr>
@@ -4307,7 +4310,7 @@
           <p:cNvPr id="2" name="Title 1">
             <a:extLst>
               <a:ext uri="{FF2B5EF4-FFF2-40B4-BE49-F238E27FC236}">
-                <a16:creationId xmlns:a16="http://schemas.microsoft.com/office/drawing/2014/main" xmlns="" id="{C6333130-6CB7-FFDF-AB43-6D61D2F87295}"/>
+                <a16:creationId xmlns="" xmlns:a16="http://schemas.microsoft.com/office/drawing/2014/main" id="{C6333130-6CB7-FFDF-AB43-6D61D2F87295}"/>
               </a:ext>
             </a:extLst>
           </p:cNvPr>
@@ -4335,7 +4338,7 @@
           <p:cNvPr id="3" name="Subtitle 2">
             <a:extLst>
               <a:ext uri="{FF2B5EF4-FFF2-40B4-BE49-F238E27FC236}">
-                <a16:creationId xmlns:a16="http://schemas.microsoft.com/office/drawing/2014/main" xmlns="" id="{FD827903-2C9D-9C28-2BF4-CFA4A096BF72}"/>
+                <a16:creationId xmlns="" xmlns:a16="http://schemas.microsoft.com/office/drawing/2014/main" id="{FD827903-2C9D-9C28-2BF4-CFA4A096BF72}"/>
               </a:ext>
             </a:extLst>
           </p:cNvPr>
@@ -4409,10 +4412,10 @@
           <p:cNvPr id="31" name="Rectangle 30">
             <a:extLst>
               <a:ext uri="{FF2B5EF4-FFF2-40B4-BE49-F238E27FC236}">
-                <a16:creationId xmlns:a16="http://schemas.microsoft.com/office/drawing/2014/main" xmlns="" id="{9E90EB45-EEE9-4563-8179-65EF62AE0978}"/>
+                <a16:creationId xmlns="" xmlns:a16="http://schemas.microsoft.com/office/drawing/2014/main" id="{9E90EB45-EEE9-4563-8179-65EF62AE0978}"/>
               </a:ext>
               <a:ext uri="{C183D7F6-B498-43B3-948B-1728B52AA6E4}">
-                <adec:decorative xmlns:adec="http://schemas.microsoft.com/office/drawing/2017/decorative" xmlns="" val="1"/>
+                <adec:decorative xmlns="" xmlns:adec="http://schemas.microsoft.com/office/drawing/2017/decorative" val="1"/>
               </a:ext>
             </a:extLst>
           </p:cNvPr>
@@ -4422,7 +4425,7 @@
           <p:nvPr>
             <p:extLst>
               <p:ext uri="{386F3935-93C4-4BCD-93E2-E3B085C9AB24}">
-                <p16:designElem xmlns:p16="http://schemas.microsoft.com/office/powerpoint/2015/main" xmlns="" val="1"/>
+                <p16:designElem xmlns="" xmlns:p16="http://schemas.microsoft.com/office/powerpoint/2015/main" val="1"/>
               </p:ext>
             </p:extLst>
           </p:nvPr>
@@ -4472,10 +4475,10 @@
           <p:cNvPr id="33" name="Rectangle 32">
             <a:extLst>
               <a:ext uri="{FF2B5EF4-FFF2-40B4-BE49-F238E27FC236}">
-                <a16:creationId xmlns:a16="http://schemas.microsoft.com/office/drawing/2014/main" xmlns="" id="{23D0EF74-AD1E-4FD9-914D-8EC9058EBBA3}"/>
+                <a16:creationId xmlns="" xmlns:a16="http://schemas.microsoft.com/office/drawing/2014/main" id="{23D0EF74-AD1E-4FD9-914D-8EC9058EBBA3}"/>
               </a:ext>
               <a:ext uri="{C183D7F6-B498-43B3-948B-1728B52AA6E4}">
-                <adec:decorative xmlns:adec="http://schemas.microsoft.com/office/drawing/2017/decorative" xmlns="" val="1"/>
+                <adec:decorative xmlns="" xmlns:adec="http://schemas.microsoft.com/office/drawing/2017/decorative" val="1"/>
               </a:ext>
             </a:extLst>
           </p:cNvPr>
@@ -4485,7 +4488,7 @@
           <p:nvPr>
             <p:extLst>
               <p:ext uri="{386F3935-93C4-4BCD-93E2-E3B085C9AB24}">
-                <p16:designElem xmlns:p16="http://schemas.microsoft.com/office/powerpoint/2015/main" xmlns="" val="1"/>
+                <p16:designElem xmlns="" xmlns:p16="http://schemas.microsoft.com/office/powerpoint/2015/main" val="1"/>
               </p:ext>
             </p:extLst>
           </p:nvPr>
@@ -4535,7 +4538,7 @@
           <p:cNvPr id="10" name="Picture 9">
             <a:extLst>
               <a:ext uri="{FF2B5EF4-FFF2-40B4-BE49-F238E27FC236}">
-                <a16:creationId xmlns:a16="http://schemas.microsoft.com/office/drawing/2014/main" xmlns="" id="{5566D870-B759-AA9F-D18A-71C4AF8007CC}"/>
+                <a16:creationId xmlns="" xmlns:a16="http://schemas.microsoft.com/office/drawing/2014/main" id="{5566D870-B759-AA9F-D18A-71C4AF8007CC}"/>
               </a:ext>
             </a:extLst>
           </p:cNvPr>
@@ -4610,10 +4613,10 @@
           <p:cNvPr id="31" name="Rectangle 30">
             <a:extLst>
               <a:ext uri="{FF2B5EF4-FFF2-40B4-BE49-F238E27FC236}">
-                <a16:creationId xmlns:a16="http://schemas.microsoft.com/office/drawing/2014/main" xmlns="" id="{9E90EB45-EEE9-4563-8179-65EF62AE0978}"/>
+                <a16:creationId xmlns="" xmlns:a16="http://schemas.microsoft.com/office/drawing/2014/main" id="{9E90EB45-EEE9-4563-8179-65EF62AE0978}"/>
               </a:ext>
               <a:ext uri="{C183D7F6-B498-43B3-948B-1728B52AA6E4}">
-                <adec:decorative xmlns:adec="http://schemas.microsoft.com/office/drawing/2017/decorative" xmlns="" val="1"/>
+                <adec:decorative xmlns="" xmlns:adec="http://schemas.microsoft.com/office/drawing/2017/decorative" val="1"/>
               </a:ext>
             </a:extLst>
           </p:cNvPr>
@@ -4623,7 +4626,7 @@
           <p:nvPr>
             <p:extLst>
               <p:ext uri="{386F3935-93C4-4BCD-93E2-E3B085C9AB24}">
-                <p16:designElem xmlns:p16="http://schemas.microsoft.com/office/powerpoint/2015/main" xmlns="" val="1"/>
+                <p16:designElem xmlns="" xmlns:p16="http://schemas.microsoft.com/office/powerpoint/2015/main" val="1"/>
               </p:ext>
             </p:extLst>
           </p:nvPr>
@@ -4673,7 +4676,7 @@
           <p:cNvPr id="12" name="Picture 11">
             <a:extLst>
               <a:ext uri="{FF2B5EF4-FFF2-40B4-BE49-F238E27FC236}">
-                <a16:creationId xmlns:a16="http://schemas.microsoft.com/office/drawing/2014/main" xmlns="" id="{A70E6C03-BE2C-92D6-9DCD-AE3F5B161C2A}"/>
+                <a16:creationId xmlns="" xmlns:a16="http://schemas.microsoft.com/office/drawing/2014/main" id="{A70E6C03-BE2C-92D6-9DCD-AE3F5B161C2A}"/>
               </a:ext>
             </a:extLst>
           </p:cNvPr>
@@ -4703,10 +4706,10 @@
           <p:cNvPr id="33" name="Rectangle 32">
             <a:extLst>
               <a:ext uri="{FF2B5EF4-FFF2-40B4-BE49-F238E27FC236}">
-                <a16:creationId xmlns:a16="http://schemas.microsoft.com/office/drawing/2014/main" xmlns="" id="{23D0EF74-AD1E-4FD9-914D-8EC9058EBBA3}"/>
+                <a16:creationId xmlns="" xmlns:a16="http://schemas.microsoft.com/office/drawing/2014/main" id="{23D0EF74-AD1E-4FD9-914D-8EC9058EBBA3}"/>
               </a:ext>
               <a:ext uri="{C183D7F6-B498-43B3-948B-1728B52AA6E4}">
-                <adec:decorative xmlns:adec="http://schemas.microsoft.com/office/drawing/2017/decorative" xmlns="" val="1"/>
+                <adec:decorative xmlns="" xmlns:adec="http://schemas.microsoft.com/office/drawing/2017/decorative" val="1"/>
               </a:ext>
             </a:extLst>
           </p:cNvPr>
@@ -4716,7 +4719,7 @@
           <p:nvPr>
             <p:extLst>
               <p:ext uri="{386F3935-93C4-4BCD-93E2-E3B085C9AB24}">
-                <p16:designElem xmlns:p16="http://schemas.microsoft.com/office/powerpoint/2015/main" xmlns="" val="1"/>
+                <p16:designElem xmlns="" xmlns:p16="http://schemas.microsoft.com/office/powerpoint/2015/main" val="1"/>
               </p:ext>
             </p:extLst>
           </p:nvPr>
@@ -4766,7 +4769,7 @@
           <p:cNvPr id="2" name="Picture 1">
             <a:extLst>
               <a:ext uri="{FF2B5EF4-FFF2-40B4-BE49-F238E27FC236}">
-                <a16:creationId xmlns:a16="http://schemas.microsoft.com/office/drawing/2014/main" xmlns="" id="{7F91ED9B-CA77-3EF6-DC1F-D06F403038A2}"/>
+                <a16:creationId xmlns="" xmlns:a16="http://schemas.microsoft.com/office/drawing/2014/main" id="{7F91ED9B-CA77-3EF6-DC1F-D06F403038A2}"/>
               </a:ext>
             </a:extLst>
           </p:cNvPr>
@@ -4841,10 +4844,10 @@
           <p:cNvPr id="52" name="Rectangle 51">
             <a:extLst>
               <a:ext uri="{FF2B5EF4-FFF2-40B4-BE49-F238E27FC236}">
-                <a16:creationId xmlns:a16="http://schemas.microsoft.com/office/drawing/2014/main" xmlns="" id="{9E90EB45-EEE9-4563-8179-65EF62AE0978}"/>
+                <a16:creationId xmlns="" xmlns:a16="http://schemas.microsoft.com/office/drawing/2014/main" id="{9E90EB45-EEE9-4563-8179-65EF62AE0978}"/>
               </a:ext>
               <a:ext uri="{C183D7F6-B498-43B3-948B-1728B52AA6E4}">
-                <adec:decorative xmlns:adec="http://schemas.microsoft.com/office/drawing/2017/decorative" xmlns="" val="1"/>
+                <adec:decorative xmlns="" xmlns:adec="http://schemas.microsoft.com/office/drawing/2017/decorative" val="1"/>
               </a:ext>
             </a:extLst>
           </p:cNvPr>
@@ -4854,7 +4857,7 @@
           <p:nvPr>
             <p:extLst>
               <p:ext uri="{386F3935-93C4-4BCD-93E2-E3B085C9AB24}">
-                <p16:designElem xmlns:p16="http://schemas.microsoft.com/office/powerpoint/2015/main" xmlns="" val="1"/>
+                <p16:designElem xmlns="" xmlns:p16="http://schemas.microsoft.com/office/powerpoint/2015/main" val="1"/>
               </p:ext>
             </p:extLst>
           </p:nvPr>
@@ -4904,7 +4907,7 @@
           <p:cNvPr id="12" name="Picture 11">
             <a:extLst>
               <a:ext uri="{FF2B5EF4-FFF2-40B4-BE49-F238E27FC236}">
-                <a16:creationId xmlns:a16="http://schemas.microsoft.com/office/drawing/2014/main" xmlns="" id="{8037E95C-5D2E-4EFB-E1CE-713B54980CC0}"/>
+                <a16:creationId xmlns="" xmlns:a16="http://schemas.microsoft.com/office/drawing/2014/main" id="{8037E95C-5D2E-4EFB-E1CE-713B54980CC0}"/>
               </a:ext>
             </a:extLst>
           </p:cNvPr>
@@ -4934,10 +4937,10 @@
           <p:cNvPr id="54" name="Rectangle 53">
             <a:extLst>
               <a:ext uri="{FF2B5EF4-FFF2-40B4-BE49-F238E27FC236}">
-                <a16:creationId xmlns:a16="http://schemas.microsoft.com/office/drawing/2014/main" xmlns="" id="{23D0EF74-AD1E-4FD9-914D-8EC9058EBBA3}"/>
+                <a16:creationId xmlns="" xmlns:a16="http://schemas.microsoft.com/office/drawing/2014/main" id="{23D0EF74-AD1E-4FD9-914D-8EC9058EBBA3}"/>
               </a:ext>
               <a:ext uri="{C183D7F6-B498-43B3-948B-1728B52AA6E4}">
-                <adec:decorative xmlns:adec="http://schemas.microsoft.com/office/drawing/2017/decorative" xmlns="" val="1"/>
+                <adec:decorative xmlns="" xmlns:adec="http://schemas.microsoft.com/office/drawing/2017/decorative" val="1"/>
               </a:ext>
             </a:extLst>
           </p:cNvPr>
@@ -4947,7 +4950,7 @@
           <p:nvPr>
             <p:extLst>
               <p:ext uri="{386F3935-93C4-4BCD-93E2-E3B085C9AB24}">
-                <p16:designElem xmlns:p16="http://schemas.microsoft.com/office/powerpoint/2015/main" xmlns="" val="1"/>
+                <p16:designElem xmlns="" xmlns:p16="http://schemas.microsoft.com/office/powerpoint/2015/main" val="1"/>
               </p:ext>
             </p:extLst>
           </p:nvPr>
@@ -4997,7 +5000,7 @@
           <p:cNvPr id="11" name="Picture 10">
             <a:extLst>
               <a:ext uri="{FF2B5EF4-FFF2-40B4-BE49-F238E27FC236}">
-                <a16:creationId xmlns:a16="http://schemas.microsoft.com/office/drawing/2014/main" xmlns="" id="{1CBEA8AF-1AFD-1074-797D-578959CEA721}"/>
+                <a16:creationId xmlns="" xmlns:a16="http://schemas.microsoft.com/office/drawing/2014/main" id="{1CBEA8AF-1AFD-1074-797D-578959CEA721}"/>
               </a:ext>
             </a:extLst>
           </p:cNvPr>
@@ -5072,10 +5075,10 @@
           <p:cNvPr id="41" name="Rectangle 40">
             <a:extLst>
               <a:ext uri="{FF2B5EF4-FFF2-40B4-BE49-F238E27FC236}">
-                <a16:creationId xmlns:a16="http://schemas.microsoft.com/office/drawing/2014/main" xmlns="" id="{9E90EB45-EEE9-4563-8179-65EF62AE0978}"/>
+                <a16:creationId xmlns="" xmlns:a16="http://schemas.microsoft.com/office/drawing/2014/main" id="{9E90EB45-EEE9-4563-8179-65EF62AE0978}"/>
               </a:ext>
               <a:ext uri="{C183D7F6-B498-43B3-948B-1728B52AA6E4}">
-                <adec:decorative xmlns:adec="http://schemas.microsoft.com/office/drawing/2017/decorative" xmlns="" val="1"/>
+                <adec:decorative xmlns="" xmlns:adec="http://schemas.microsoft.com/office/drawing/2017/decorative" val="1"/>
               </a:ext>
             </a:extLst>
           </p:cNvPr>
@@ -5085,7 +5088,7 @@
           <p:nvPr>
             <p:extLst>
               <p:ext uri="{386F3935-93C4-4BCD-93E2-E3B085C9AB24}">
-                <p16:designElem xmlns:p16="http://schemas.microsoft.com/office/powerpoint/2015/main" xmlns="" val="1"/>
+                <p16:designElem xmlns="" xmlns:p16="http://schemas.microsoft.com/office/powerpoint/2015/main" val="1"/>
               </p:ext>
             </p:extLst>
           </p:nvPr>
@@ -5135,7 +5138,7 @@
           <p:cNvPr id="12" name="Picture 11">
             <a:extLst>
               <a:ext uri="{FF2B5EF4-FFF2-40B4-BE49-F238E27FC236}">
-                <a16:creationId xmlns:a16="http://schemas.microsoft.com/office/drawing/2014/main" xmlns="" id="{C1DB73AE-E596-52D0-4F67-497A81E0AC79}"/>
+                <a16:creationId xmlns="" xmlns:a16="http://schemas.microsoft.com/office/drawing/2014/main" id="{C1DB73AE-E596-52D0-4F67-497A81E0AC79}"/>
               </a:ext>
             </a:extLst>
           </p:cNvPr>
@@ -5165,10 +5168,10 @@
           <p:cNvPr id="43" name="Rectangle 42">
             <a:extLst>
               <a:ext uri="{FF2B5EF4-FFF2-40B4-BE49-F238E27FC236}">
-                <a16:creationId xmlns:a16="http://schemas.microsoft.com/office/drawing/2014/main" xmlns="" id="{23D0EF74-AD1E-4FD9-914D-8EC9058EBBA3}"/>
+                <a16:creationId xmlns="" xmlns:a16="http://schemas.microsoft.com/office/drawing/2014/main" id="{23D0EF74-AD1E-4FD9-914D-8EC9058EBBA3}"/>
               </a:ext>
               <a:ext uri="{C183D7F6-B498-43B3-948B-1728B52AA6E4}">
-                <adec:decorative xmlns:adec="http://schemas.microsoft.com/office/drawing/2017/decorative" xmlns="" val="1"/>
+                <adec:decorative xmlns="" xmlns:adec="http://schemas.microsoft.com/office/drawing/2017/decorative" val="1"/>
               </a:ext>
             </a:extLst>
           </p:cNvPr>
@@ -5178,7 +5181,7 @@
           <p:nvPr>
             <p:extLst>
               <p:ext uri="{386F3935-93C4-4BCD-93E2-E3B085C9AB24}">
-                <p16:designElem xmlns:p16="http://schemas.microsoft.com/office/powerpoint/2015/main" xmlns="" val="1"/>
+                <p16:designElem xmlns="" xmlns:p16="http://schemas.microsoft.com/office/powerpoint/2015/main" val="1"/>
               </p:ext>
             </p:extLst>
           </p:nvPr>
@@ -5228,7 +5231,7 @@
           <p:cNvPr id="16" name="Picture 15">
             <a:extLst>
               <a:ext uri="{FF2B5EF4-FFF2-40B4-BE49-F238E27FC236}">
-                <a16:creationId xmlns:a16="http://schemas.microsoft.com/office/drawing/2014/main" xmlns="" id="{09D380A8-325A-10A1-1C6E-87CF26672F93}"/>
+                <a16:creationId xmlns="" xmlns:a16="http://schemas.microsoft.com/office/drawing/2014/main" id="{09D380A8-325A-10A1-1C6E-87CF26672F93}"/>
               </a:ext>
             </a:extLst>
           </p:cNvPr>
@@ -5303,10 +5306,10 @@
           <p:cNvPr id="48" name="Rectangle 47">
             <a:extLst>
               <a:ext uri="{FF2B5EF4-FFF2-40B4-BE49-F238E27FC236}">
-                <a16:creationId xmlns:a16="http://schemas.microsoft.com/office/drawing/2014/main" xmlns="" id="{9E90EB45-EEE9-4563-8179-65EF62AE0978}"/>
+                <a16:creationId xmlns="" xmlns:a16="http://schemas.microsoft.com/office/drawing/2014/main" id="{9E90EB45-EEE9-4563-8179-65EF62AE0978}"/>
               </a:ext>
               <a:ext uri="{C183D7F6-B498-43B3-948B-1728B52AA6E4}">
-                <adec:decorative xmlns:adec="http://schemas.microsoft.com/office/drawing/2017/decorative" xmlns="" val="1"/>
+                <adec:decorative xmlns="" xmlns:adec="http://schemas.microsoft.com/office/drawing/2017/decorative" val="1"/>
               </a:ext>
             </a:extLst>
           </p:cNvPr>
@@ -5316,7 +5319,7 @@
           <p:nvPr>
             <p:extLst>
               <p:ext uri="{386F3935-93C4-4BCD-93E2-E3B085C9AB24}">
-                <p16:designElem xmlns:p16="http://schemas.microsoft.com/office/powerpoint/2015/main" xmlns="" val="1"/>
+                <p16:designElem xmlns="" xmlns:p16="http://schemas.microsoft.com/office/powerpoint/2015/main" val="1"/>
               </p:ext>
             </p:extLst>
           </p:nvPr>
@@ -5366,7 +5369,7 @@
           <p:cNvPr id="11" name="Picture 10">
             <a:extLst>
               <a:ext uri="{FF2B5EF4-FFF2-40B4-BE49-F238E27FC236}">
-                <a16:creationId xmlns:a16="http://schemas.microsoft.com/office/drawing/2014/main" xmlns="" id="{83AD9DF1-D359-ED85-3155-A0736E4ECA97}"/>
+                <a16:creationId xmlns="" xmlns:a16="http://schemas.microsoft.com/office/drawing/2014/main" id="{83AD9DF1-D359-ED85-3155-A0736E4ECA97}"/>
               </a:ext>
             </a:extLst>
           </p:cNvPr>
@@ -5396,10 +5399,10 @@
           <p:cNvPr id="50" name="Rectangle 49">
             <a:extLst>
               <a:ext uri="{FF2B5EF4-FFF2-40B4-BE49-F238E27FC236}">
-                <a16:creationId xmlns:a16="http://schemas.microsoft.com/office/drawing/2014/main" xmlns="" id="{23D0EF74-AD1E-4FD9-914D-8EC9058EBBA3}"/>
+                <a16:creationId xmlns="" xmlns:a16="http://schemas.microsoft.com/office/drawing/2014/main" id="{23D0EF74-AD1E-4FD9-914D-8EC9058EBBA3}"/>
               </a:ext>
               <a:ext uri="{C183D7F6-B498-43B3-948B-1728B52AA6E4}">
-                <adec:decorative xmlns:adec="http://schemas.microsoft.com/office/drawing/2017/decorative" xmlns="" val="1"/>
+                <adec:decorative xmlns="" xmlns:adec="http://schemas.microsoft.com/office/drawing/2017/decorative" val="1"/>
               </a:ext>
             </a:extLst>
           </p:cNvPr>
@@ -5409,7 +5412,7 @@
           <p:nvPr>
             <p:extLst>
               <p:ext uri="{386F3935-93C4-4BCD-93E2-E3B085C9AB24}">
-                <p16:designElem xmlns:p16="http://schemas.microsoft.com/office/powerpoint/2015/main" xmlns="" val="1"/>
+                <p16:designElem xmlns="" xmlns:p16="http://schemas.microsoft.com/office/powerpoint/2015/main" val="1"/>
               </p:ext>
             </p:extLst>
           </p:nvPr>
@@ -5459,7 +5462,7 @@
           <p:cNvPr id="9" name="Picture 8">
             <a:extLst>
               <a:ext uri="{FF2B5EF4-FFF2-40B4-BE49-F238E27FC236}">
-                <a16:creationId xmlns:a16="http://schemas.microsoft.com/office/drawing/2014/main" xmlns="" id="{69F66114-6CF8-0D24-0651-35D508887C2E}"/>
+                <a16:creationId xmlns="" xmlns:a16="http://schemas.microsoft.com/office/drawing/2014/main" id="{69F66114-6CF8-0D24-0651-35D508887C2E}"/>
               </a:ext>
             </a:extLst>
           </p:cNvPr>
@@ -5534,10 +5537,10 @@
           <p:cNvPr id="48" name="Rectangle 47">
             <a:extLst>
               <a:ext uri="{FF2B5EF4-FFF2-40B4-BE49-F238E27FC236}">
-                <a16:creationId xmlns:a16="http://schemas.microsoft.com/office/drawing/2014/main" xmlns="" id="{9E90EB45-EEE9-4563-8179-65EF62AE0978}"/>
+                <a16:creationId xmlns="" xmlns:a16="http://schemas.microsoft.com/office/drawing/2014/main" id="{9E90EB45-EEE9-4563-8179-65EF62AE0978}"/>
               </a:ext>
               <a:ext uri="{C183D7F6-B498-43B3-948B-1728B52AA6E4}">
-                <adec:decorative xmlns:adec="http://schemas.microsoft.com/office/drawing/2017/decorative" xmlns="" val="1"/>
+                <adec:decorative xmlns="" xmlns:adec="http://schemas.microsoft.com/office/drawing/2017/decorative" val="1"/>
               </a:ext>
             </a:extLst>
           </p:cNvPr>
@@ -5547,7 +5550,7 @@
           <p:nvPr>
             <p:extLst>
               <p:ext uri="{386F3935-93C4-4BCD-93E2-E3B085C9AB24}">
-                <p16:designElem xmlns:p16="http://schemas.microsoft.com/office/powerpoint/2015/main" xmlns="" val="1"/>
+                <p16:designElem xmlns="" xmlns:p16="http://schemas.microsoft.com/office/powerpoint/2015/main" val="1"/>
               </p:ext>
             </p:extLst>
           </p:nvPr>
@@ -5597,7 +5600,7 @@
           <p:cNvPr id="9" name="Picture 8">
             <a:extLst>
               <a:ext uri="{FF2B5EF4-FFF2-40B4-BE49-F238E27FC236}">
-                <a16:creationId xmlns:a16="http://schemas.microsoft.com/office/drawing/2014/main" xmlns="" id="{C989E38B-7248-9F4C-56D8-9EA19FE3431B}"/>
+                <a16:creationId xmlns="" xmlns:a16="http://schemas.microsoft.com/office/drawing/2014/main" id="{C989E38B-7248-9F4C-56D8-9EA19FE3431B}"/>
               </a:ext>
             </a:extLst>
           </p:cNvPr>
@@ -5627,10 +5630,10 @@
           <p:cNvPr id="50" name="Rectangle 49">
             <a:extLst>
               <a:ext uri="{FF2B5EF4-FFF2-40B4-BE49-F238E27FC236}">
-                <a16:creationId xmlns:a16="http://schemas.microsoft.com/office/drawing/2014/main" xmlns="" id="{23D0EF74-AD1E-4FD9-914D-8EC9058EBBA3}"/>
+                <a16:creationId xmlns="" xmlns:a16="http://schemas.microsoft.com/office/drawing/2014/main" id="{23D0EF74-AD1E-4FD9-914D-8EC9058EBBA3}"/>
               </a:ext>
               <a:ext uri="{C183D7F6-B498-43B3-948B-1728B52AA6E4}">
-                <adec:decorative xmlns:adec="http://schemas.microsoft.com/office/drawing/2017/decorative" xmlns="" val="1"/>
+                <adec:decorative xmlns="" xmlns:adec="http://schemas.microsoft.com/office/drawing/2017/decorative" val="1"/>
               </a:ext>
             </a:extLst>
           </p:cNvPr>
@@ -5640,7 +5643,7 @@
           <p:nvPr>
             <p:extLst>
               <p:ext uri="{386F3935-93C4-4BCD-93E2-E3B085C9AB24}">
-                <p16:designElem xmlns:p16="http://schemas.microsoft.com/office/powerpoint/2015/main" xmlns="" val="1"/>
+                <p16:designElem xmlns="" xmlns:p16="http://schemas.microsoft.com/office/powerpoint/2015/main" val="1"/>
               </p:ext>
             </p:extLst>
           </p:nvPr>
@@ -5690,7 +5693,7 @@
           <p:cNvPr id="7" name="Picture 6">
             <a:extLst>
               <a:ext uri="{FF2B5EF4-FFF2-40B4-BE49-F238E27FC236}">
-                <a16:creationId xmlns:a16="http://schemas.microsoft.com/office/drawing/2014/main" xmlns="" id="{9F4FA470-6BE2-A98A-62EC-B4AAB5A9F8C0}"/>
+                <a16:creationId xmlns="" xmlns:a16="http://schemas.microsoft.com/office/drawing/2014/main" id="{9F4FA470-6BE2-A98A-62EC-B4AAB5A9F8C0}"/>
               </a:ext>
             </a:extLst>
           </p:cNvPr>
@@ -5765,10 +5768,10 @@
           <p:cNvPr id="48" name="Rectangle 47">
             <a:extLst>
               <a:ext uri="{FF2B5EF4-FFF2-40B4-BE49-F238E27FC236}">
-                <a16:creationId xmlns:a16="http://schemas.microsoft.com/office/drawing/2014/main" xmlns="" id="{9E90EB45-EEE9-4563-8179-65EF62AE0978}"/>
+                <a16:creationId xmlns="" xmlns:a16="http://schemas.microsoft.com/office/drawing/2014/main" id="{9E90EB45-EEE9-4563-8179-65EF62AE0978}"/>
               </a:ext>
               <a:ext uri="{C183D7F6-B498-43B3-948B-1728B52AA6E4}">
-                <adec:decorative xmlns:adec="http://schemas.microsoft.com/office/drawing/2017/decorative" xmlns="" val="1"/>
+                <adec:decorative xmlns="" xmlns:adec="http://schemas.microsoft.com/office/drawing/2017/decorative" val="1"/>
               </a:ext>
             </a:extLst>
           </p:cNvPr>
@@ -5778,7 +5781,7 @@
           <p:nvPr>
             <p:extLst>
               <p:ext uri="{386F3935-93C4-4BCD-93E2-E3B085C9AB24}">
-                <p16:designElem xmlns:p16="http://schemas.microsoft.com/office/powerpoint/2015/main" xmlns="" val="1"/>
+                <p16:designElem xmlns="" xmlns:p16="http://schemas.microsoft.com/office/powerpoint/2015/main" val="1"/>
               </p:ext>
             </p:extLst>
           </p:nvPr>
@@ -5828,7 +5831,7 @@
           <p:cNvPr id="9" name="Picture 8">
             <a:extLst>
               <a:ext uri="{FF2B5EF4-FFF2-40B4-BE49-F238E27FC236}">
-                <a16:creationId xmlns:a16="http://schemas.microsoft.com/office/drawing/2014/main" xmlns="" id="{38AA44BC-F4CB-608D-49C7-384F5C241E1A}"/>
+                <a16:creationId xmlns="" xmlns:a16="http://schemas.microsoft.com/office/drawing/2014/main" id="{38AA44BC-F4CB-608D-49C7-384F5C241E1A}"/>
               </a:ext>
             </a:extLst>
           </p:cNvPr>
@@ -5858,10 +5861,10 @@
           <p:cNvPr id="50" name="Rectangle 49">
             <a:extLst>
               <a:ext uri="{FF2B5EF4-FFF2-40B4-BE49-F238E27FC236}">
-                <a16:creationId xmlns:a16="http://schemas.microsoft.com/office/drawing/2014/main" xmlns="" id="{23D0EF74-AD1E-4FD9-914D-8EC9058EBBA3}"/>
+                <a16:creationId xmlns="" xmlns:a16="http://schemas.microsoft.com/office/drawing/2014/main" id="{23D0EF74-AD1E-4FD9-914D-8EC9058EBBA3}"/>
               </a:ext>
               <a:ext uri="{C183D7F6-B498-43B3-948B-1728B52AA6E4}">
-                <adec:decorative xmlns:adec="http://schemas.microsoft.com/office/drawing/2017/decorative" xmlns="" val="1"/>
+                <adec:decorative xmlns="" xmlns:adec="http://schemas.microsoft.com/office/drawing/2017/decorative" val="1"/>
               </a:ext>
             </a:extLst>
           </p:cNvPr>
@@ -5871,7 +5874,7 @@
           <p:nvPr>
             <p:extLst>
               <p:ext uri="{386F3935-93C4-4BCD-93E2-E3B085C9AB24}">
-                <p16:designElem xmlns:p16="http://schemas.microsoft.com/office/powerpoint/2015/main" xmlns="" val="1"/>
+                <p16:designElem xmlns="" xmlns:p16="http://schemas.microsoft.com/office/powerpoint/2015/main" val="1"/>
               </p:ext>
             </p:extLst>
           </p:nvPr>
@@ -5921,7 +5924,7 @@
           <p:cNvPr id="7" name="Picture 6">
             <a:extLst>
               <a:ext uri="{FF2B5EF4-FFF2-40B4-BE49-F238E27FC236}">
-                <a16:creationId xmlns:a16="http://schemas.microsoft.com/office/drawing/2014/main" xmlns="" id="{CC0AD45C-A4B3-E0F9-6BAB-4E270A55E634}"/>
+                <a16:creationId xmlns="" xmlns:a16="http://schemas.microsoft.com/office/drawing/2014/main" id="{CC0AD45C-A4B3-E0F9-6BAB-4E270A55E634}"/>
               </a:ext>
             </a:extLst>
           </p:cNvPr>
@@ -5988,7 +5991,7 @@
           <p:cNvPr id="2" name="Title 1">
             <a:extLst>
               <a:ext uri="{FF2B5EF4-FFF2-40B4-BE49-F238E27FC236}">
-                <a16:creationId xmlns:a16="http://schemas.microsoft.com/office/drawing/2014/main" xmlns="" id="{36E77018-4969-BE45-0F12-FF54157C4B6D}"/>
+                <a16:creationId xmlns="" xmlns:a16="http://schemas.microsoft.com/office/drawing/2014/main" id="{36E77018-4969-BE45-0F12-FF54157C4B6D}"/>
               </a:ext>
             </a:extLst>
           </p:cNvPr>
@@ -6017,7 +6020,7 @@
           <p:cNvPr id="5" name="Content Placeholder 4">
             <a:extLst>
               <a:ext uri="{FF2B5EF4-FFF2-40B4-BE49-F238E27FC236}">
-                <a16:creationId xmlns:a16="http://schemas.microsoft.com/office/drawing/2014/main" xmlns="" id="{1843ABC1-4CB6-5326-4746-2ABE3D9E9105}"/>
+                <a16:creationId xmlns="" xmlns:a16="http://schemas.microsoft.com/office/drawing/2014/main" id="{1843ABC1-4CB6-5326-4746-2ABE3D9E9105}"/>
               </a:ext>
             </a:extLst>
           </p:cNvPr>
@@ -6046,7 +6049,7 @@
           <p:cNvPr id="6" name="TextBox 5">
             <a:extLst>
               <a:ext uri="{FF2B5EF4-FFF2-40B4-BE49-F238E27FC236}">
-                <a16:creationId xmlns:a16="http://schemas.microsoft.com/office/drawing/2014/main" xmlns="" id="{23834D75-3488-A878-D722-8DF04B15669A}"/>
+                <a16:creationId xmlns="" xmlns:a16="http://schemas.microsoft.com/office/drawing/2014/main" id="{23834D75-3488-A878-D722-8DF04B15669A}"/>
               </a:ext>
             </a:extLst>
           </p:cNvPr>
@@ -6161,10 +6164,10 @@
           <p:cNvPr id="48" name="Rectangle 47">
             <a:extLst>
               <a:ext uri="{FF2B5EF4-FFF2-40B4-BE49-F238E27FC236}">
-                <a16:creationId xmlns:a16="http://schemas.microsoft.com/office/drawing/2014/main" xmlns="" id="{9E90EB45-EEE9-4563-8179-65EF62AE0978}"/>
+                <a16:creationId xmlns="" xmlns:a16="http://schemas.microsoft.com/office/drawing/2014/main" id="{9E90EB45-EEE9-4563-8179-65EF62AE0978}"/>
               </a:ext>
               <a:ext uri="{C183D7F6-B498-43B3-948B-1728B52AA6E4}">
-                <adec:decorative xmlns:adec="http://schemas.microsoft.com/office/drawing/2017/decorative" xmlns="" val="1"/>
+                <adec:decorative xmlns="" xmlns:adec="http://schemas.microsoft.com/office/drawing/2017/decorative" val="1"/>
               </a:ext>
             </a:extLst>
           </p:cNvPr>
@@ -6174,7 +6177,7 @@
           <p:nvPr>
             <p:extLst>
               <p:ext uri="{386F3935-93C4-4BCD-93E2-E3B085C9AB24}">
-                <p16:designElem xmlns:p16="http://schemas.microsoft.com/office/powerpoint/2015/main" xmlns="" val="1"/>
+                <p16:designElem xmlns="" xmlns:p16="http://schemas.microsoft.com/office/powerpoint/2015/main" val="1"/>
               </p:ext>
             </p:extLst>
           </p:nvPr>
@@ -6224,7 +6227,7 @@
           <p:cNvPr id="9" name="Picture 8">
             <a:extLst>
               <a:ext uri="{FF2B5EF4-FFF2-40B4-BE49-F238E27FC236}">
-                <a16:creationId xmlns:a16="http://schemas.microsoft.com/office/drawing/2014/main" xmlns="" id="{C31CC77C-BEB7-C08F-C765-68F0D39CE5C9}"/>
+                <a16:creationId xmlns="" xmlns:a16="http://schemas.microsoft.com/office/drawing/2014/main" id="{C31CC77C-BEB7-C08F-C765-68F0D39CE5C9}"/>
               </a:ext>
             </a:extLst>
           </p:cNvPr>
@@ -6254,10 +6257,10 @@
           <p:cNvPr id="50" name="Rectangle 49">
             <a:extLst>
               <a:ext uri="{FF2B5EF4-FFF2-40B4-BE49-F238E27FC236}">
-                <a16:creationId xmlns:a16="http://schemas.microsoft.com/office/drawing/2014/main" xmlns="" id="{23D0EF74-AD1E-4FD9-914D-8EC9058EBBA3}"/>
+                <a16:creationId xmlns="" xmlns:a16="http://schemas.microsoft.com/office/drawing/2014/main" id="{23D0EF74-AD1E-4FD9-914D-8EC9058EBBA3}"/>
               </a:ext>
               <a:ext uri="{C183D7F6-B498-43B3-948B-1728B52AA6E4}">
-                <adec:decorative xmlns:adec="http://schemas.microsoft.com/office/drawing/2017/decorative" xmlns="" val="1"/>
+                <adec:decorative xmlns="" xmlns:adec="http://schemas.microsoft.com/office/drawing/2017/decorative" val="1"/>
               </a:ext>
             </a:extLst>
           </p:cNvPr>
@@ -6267,7 +6270,7 @@
           <p:nvPr>
             <p:extLst>
               <p:ext uri="{386F3935-93C4-4BCD-93E2-E3B085C9AB24}">
-                <p16:designElem xmlns:p16="http://schemas.microsoft.com/office/powerpoint/2015/main" xmlns="" val="1"/>
+                <p16:designElem xmlns="" xmlns:p16="http://schemas.microsoft.com/office/powerpoint/2015/main" val="1"/>
               </p:ext>
             </p:extLst>
           </p:nvPr>
@@ -6317,7 +6320,7 @@
           <p:cNvPr id="7" name="Picture 6">
             <a:extLst>
               <a:ext uri="{FF2B5EF4-FFF2-40B4-BE49-F238E27FC236}">
-                <a16:creationId xmlns:a16="http://schemas.microsoft.com/office/drawing/2014/main" xmlns="" id="{FBABCDCA-3B1F-4EC6-24CB-A17796F27C15}"/>
+                <a16:creationId xmlns="" xmlns:a16="http://schemas.microsoft.com/office/drawing/2014/main" id="{FBABCDCA-3B1F-4EC6-24CB-A17796F27C15}"/>
               </a:ext>
             </a:extLst>
           </p:cNvPr>
@@ -6392,10 +6395,10 @@
           <p:cNvPr id="55" name="Rectangle 54">
             <a:extLst>
               <a:ext uri="{FF2B5EF4-FFF2-40B4-BE49-F238E27FC236}">
-                <a16:creationId xmlns:a16="http://schemas.microsoft.com/office/drawing/2014/main" xmlns="" id="{32BC26D8-82FB-445E-AA49-62A77D7C1EE0}"/>
+                <a16:creationId xmlns="" xmlns:a16="http://schemas.microsoft.com/office/drawing/2014/main" id="{32BC26D8-82FB-445E-AA49-62A77D7C1EE0}"/>
               </a:ext>
               <a:ext uri="{C183D7F6-B498-43B3-948B-1728B52AA6E4}">
-                <adec:decorative xmlns:adec="http://schemas.microsoft.com/office/drawing/2017/decorative" xmlns="" val="1"/>
+                <adec:decorative xmlns="" xmlns:adec="http://schemas.microsoft.com/office/drawing/2017/decorative" val="1"/>
               </a:ext>
             </a:extLst>
           </p:cNvPr>
@@ -6405,7 +6408,7 @@
           <p:nvPr>
             <p:extLst>
               <p:ext uri="{386F3935-93C4-4BCD-93E2-E3B085C9AB24}">
-                <p16:designElem xmlns:p16="http://schemas.microsoft.com/office/powerpoint/2015/main" xmlns="" val="1"/>
+                <p16:designElem xmlns="" xmlns:p16="http://schemas.microsoft.com/office/powerpoint/2015/main" val="1"/>
               </p:ext>
             </p:extLst>
           </p:nvPr>
@@ -6458,10 +6461,10 @@
           <p:cNvPr id="57" name="Rectangle 56">
             <a:extLst>
               <a:ext uri="{FF2B5EF4-FFF2-40B4-BE49-F238E27FC236}">
-                <a16:creationId xmlns:a16="http://schemas.microsoft.com/office/drawing/2014/main" xmlns="" id="{CB44330D-EA18-4254-AA95-EB49948539B8}"/>
+                <a16:creationId xmlns="" xmlns:a16="http://schemas.microsoft.com/office/drawing/2014/main" id="{CB44330D-EA18-4254-AA95-EB49948539B8}"/>
               </a:ext>
               <a:ext uri="{C183D7F6-B498-43B3-948B-1728B52AA6E4}">
-                <adec:decorative xmlns:adec="http://schemas.microsoft.com/office/drawing/2017/decorative" xmlns="" val="1"/>
+                <adec:decorative xmlns="" xmlns:adec="http://schemas.microsoft.com/office/drawing/2017/decorative" val="1"/>
               </a:ext>
             </a:extLst>
           </p:cNvPr>
@@ -6471,7 +6474,7 @@
           <p:nvPr>
             <p:extLst>
               <p:ext uri="{386F3935-93C4-4BCD-93E2-E3B085C9AB24}">
-                <p16:designElem xmlns:p16="http://schemas.microsoft.com/office/powerpoint/2015/main" xmlns="" val="1"/>
+                <p16:designElem xmlns="" xmlns:p16="http://schemas.microsoft.com/office/powerpoint/2015/main" val="1"/>
               </p:ext>
             </p:extLst>
           </p:nvPr>
@@ -6521,7 +6524,7 @@
           <p:cNvPr id="31" name="Picture 30">
             <a:extLst>
               <a:ext uri="{FF2B5EF4-FFF2-40B4-BE49-F238E27FC236}">
-                <a16:creationId xmlns:a16="http://schemas.microsoft.com/office/drawing/2014/main" xmlns="" id="{46DE8AF6-5EA5-A304-E987-0A54D353F05C}"/>
+                <a16:creationId xmlns="" xmlns:a16="http://schemas.microsoft.com/office/drawing/2014/main" id="{46DE8AF6-5EA5-A304-E987-0A54D353F05C}"/>
               </a:ext>
             </a:extLst>
           </p:cNvPr>
@@ -6551,7 +6554,7 @@
           <p:cNvPr id="42" name="Group 41">
             <a:extLst>
               <a:ext uri="{FF2B5EF4-FFF2-40B4-BE49-F238E27FC236}">
-                <a16:creationId xmlns:a16="http://schemas.microsoft.com/office/drawing/2014/main" xmlns="" id="{441BB549-9EFF-41FF-2B8A-E018EC1DD753}"/>
+                <a16:creationId xmlns="" xmlns:a16="http://schemas.microsoft.com/office/drawing/2014/main" id="{441BB549-9EFF-41FF-2B8A-E018EC1DD753}"/>
               </a:ext>
             </a:extLst>
           </p:cNvPr>
@@ -6573,7 +6576,7 @@
                 <p14:cNvPr id="34" name="Ink 33">
                   <a:extLst>
                     <a:ext uri="{FF2B5EF4-FFF2-40B4-BE49-F238E27FC236}">
-                      <a16:creationId xmlns:a16="http://schemas.microsoft.com/office/drawing/2014/main" xmlns="" id="{0802194E-E619-7BCA-F7E6-3BA4000E5342}"/>
+                      <a16:creationId xmlns="" xmlns:a16="http://schemas.microsoft.com/office/drawing/2014/main" id="{0802194E-E619-7BCA-F7E6-3BA4000E5342}"/>
                     </a:ext>
                   </a:extLst>
                 </p14:cNvPr>
@@ -6624,7 +6627,7 @@
                 <p14:cNvPr id="35" name="Ink 34">
                   <a:extLst>
                     <a:ext uri="{FF2B5EF4-FFF2-40B4-BE49-F238E27FC236}">
-                      <a16:creationId xmlns:a16="http://schemas.microsoft.com/office/drawing/2014/main" xmlns="" id="{CE663C6E-1FF1-2897-782B-0EC42870CD10}"/>
+                      <a16:creationId xmlns="" xmlns:a16="http://schemas.microsoft.com/office/drawing/2014/main" id="{CE663C6E-1FF1-2897-782B-0EC42870CD10}"/>
                     </a:ext>
                   </a:extLst>
                 </p14:cNvPr>
@@ -6674,7 +6677,7 @@
           <p:cNvPr id="41" name="Group 40">
             <a:extLst>
               <a:ext uri="{FF2B5EF4-FFF2-40B4-BE49-F238E27FC236}">
-                <a16:creationId xmlns:a16="http://schemas.microsoft.com/office/drawing/2014/main" xmlns="" id="{3130D385-AE6A-EA49-B032-9DABBF315ACF}"/>
+                <a16:creationId xmlns="" xmlns:a16="http://schemas.microsoft.com/office/drawing/2014/main" id="{3130D385-AE6A-EA49-B032-9DABBF315ACF}"/>
               </a:ext>
             </a:extLst>
           </p:cNvPr>
@@ -6696,7 +6699,7 @@
                 <p14:cNvPr id="36" name="Ink 35">
                   <a:extLst>
                     <a:ext uri="{FF2B5EF4-FFF2-40B4-BE49-F238E27FC236}">
-                      <a16:creationId xmlns:a16="http://schemas.microsoft.com/office/drawing/2014/main" xmlns="" id="{7B2BC853-6A2C-27D4-CE0D-9863E52D77FF}"/>
+                      <a16:creationId xmlns="" xmlns:a16="http://schemas.microsoft.com/office/drawing/2014/main" id="{7B2BC853-6A2C-27D4-CE0D-9863E52D77FF}"/>
                     </a:ext>
                   </a:extLst>
                 </p14:cNvPr>
@@ -6747,7 +6750,7 @@
                 <p14:cNvPr id="37" name="Ink 36">
                   <a:extLst>
                     <a:ext uri="{FF2B5EF4-FFF2-40B4-BE49-F238E27FC236}">
-                      <a16:creationId xmlns:a16="http://schemas.microsoft.com/office/drawing/2014/main" xmlns="" id="{3EBFC42C-980A-7231-FA1C-E0C31368EBF0}"/>
+                      <a16:creationId xmlns="" xmlns:a16="http://schemas.microsoft.com/office/drawing/2014/main" id="{3EBFC42C-980A-7231-FA1C-E0C31368EBF0}"/>
                     </a:ext>
                   </a:extLst>
                 </p14:cNvPr>
@@ -6797,7 +6800,7 @@
           <p:cNvPr id="45" name="Group 44">
             <a:extLst>
               <a:ext uri="{FF2B5EF4-FFF2-40B4-BE49-F238E27FC236}">
-                <a16:creationId xmlns:a16="http://schemas.microsoft.com/office/drawing/2014/main" xmlns="" id="{29025E9A-2B79-239E-EC11-FD79EB549079}"/>
+                <a16:creationId xmlns="" xmlns:a16="http://schemas.microsoft.com/office/drawing/2014/main" id="{29025E9A-2B79-239E-EC11-FD79EB549079}"/>
               </a:ext>
             </a:extLst>
           </p:cNvPr>
@@ -6819,7 +6822,7 @@
                 <p14:cNvPr id="38" name="Ink 37">
                   <a:extLst>
                     <a:ext uri="{FF2B5EF4-FFF2-40B4-BE49-F238E27FC236}">
-                      <a16:creationId xmlns:a16="http://schemas.microsoft.com/office/drawing/2014/main" xmlns="" id="{D1D783BE-A8A9-8BA5-DFC4-233BBF44E435}"/>
+                      <a16:creationId xmlns="" xmlns:a16="http://schemas.microsoft.com/office/drawing/2014/main" id="{D1D783BE-A8A9-8BA5-DFC4-233BBF44E435}"/>
                     </a:ext>
                   </a:extLst>
                 </p14:cNvPr>
@@ -6870,7 +6873,7 @@
                 <p14:cNvPr id="39" name="Ink 38">
                   <a:extLst>
                     <a:ext uri="{FF2B5EF4-FFF2-40B4-BE49-F238E27FC236}">
-                      <a16:creationId xmlns:a16="http://schemas.microsoft.com/office/drawing/2014/main" xmlns="" id="{0CDC1CA7-96DC-7C04-5005-D49A1BB305B6}"/>
+                      <a16:creationId xmlns="" xmlns:a16="http://schemas.microsoft.com/office/drawing/2014/main" id="{0CDC1CA7-96DC-7C04-5005-D49A1BB305B6}"/>
                     </a:ext>
                   </a:extLst>
                 </p14:cNvPr>
@@ -6921,7 +6924,7 @@
                 <p14:cNvPr id="43" name="Ink 42">
                   <a:extLst>
                     <a:ext uri="{FF2B5EF4-FFF2-40B4-BE49-F238E27FC236}">
-                      <a16:creationId xmlns:a16="http://schemas.microsoft.com/office/drawing/2014/main" xmlns="" id="{FFAC8CBE-ED8B-4047-104E-4B6B740A52F4}"/>
+                      <a16:creationId xmlns="" xmlns:a16="http://schemas.microsoft.com/office/drawing/2014/main" id="{FFAC8CBE-ED8B-4047-104E-4B6B740A52F4}"/>
                     </a:ext>
                   </a:extLst>
                 </p14:cNvPr>
@@ -6972,7 +6975,7 @@
                 <p14:cNvPr id="44" name="Ink 43">
                   <a:extLst>
                     <a:ext uri="{FF2B5EF4-FFF2-40B4-BE49-F238E27FC236}">
-                      <a16:creationId xmlns:a16="http://schemas.microsoft.com/office/drawing/2014/main" xmlns="" id="{A2E981AF-C77A-BAA4-75D8-072A6C3932E6}"/>
+                      <a16:creationId xmlns="" xmlns:a16="http://schemas.microsoft.com/office/drawing/2014/main" id="{A2E981AF-C77A-BAA4-75D8-072A6C3932E6}"/>
                     </a:ext>
                   </a:extLst>
                 </p14:cNvPr>
@@ -7022,7 +7025,7 @@
           <p:cNvPr id="56" name="Group 55">
             <a:extLst>
               <a:ext uri="{FF2B5EF4-FFF2-40B4-BE49-F238E27FC236}">
-                <a16:creationId xmlns:a16="http://schemas.microsoft.com/office/drawing/2014/main" xmlns="" id="{1413BEEA-AF5A-235D-9E6F-DC40C3A499C9}"/>
+                <a16:creationId xmlns="" xmlns:a16="http://schemas.microsoft.com/office/drawing/2014/main" id="{1413BEEA-AF5A-235D-9E6F-DC40C3A499C9}"/>
               </a:ext>
             </a:extLst>
           </p:cNvPr>
@@ -7044,7 +7047,7 @@
                 <p14:cNvPr id="46" name="Ink 45">
                   <a:extLst>
                     <a:ext uri="{FF2B5EF4-FFF2-40B4-BE49-F238E27FC236}">
-                      <a16:creationId xmlns:a16="http://schemas.microsoft.com/office/drawing/2014/main" xmlns="" id="{5F0B270A-6CCC-55B7-A2F9-83907A3C46F0}"/>
+                      <a16:creationId xmlns="" xmlns:a16="http://schemas.microsoft.com/office/drawing/2014/main" id="{5F0B270A-6CCC-55B7-A2F9-83907A3C46F0}"/>
                     </a:ext>
                   </a:extLst>
                 </p14:cNvPr>
@@ -7095,7 +7098,7 @@
                 <p14:cNvPr id="47" name="Ink 46">
                   <a:extLst>
                     <a:ext uri="{FF2B5EF4-FFF2-40B4-BE49-F238E27FC236}">
-                      <a16:creationId xmlns:a16="http://schemas.microsoft.com/office/drawing/2014/main" xmlns="" id="{1F7070A3-8367-E211-9C2F-76B8FB199520}"/>
+                      <a16:creationId xmlns="" xmlns:a16="http://schemas.microsoft.com/office/drawing/2014/main" id="{1F7070A3-8367-E211-9C2F-76B8FB199520}"/>
                     </a:ext>
                   </a:extLst>
                 </p14:cNvPr>
@@ -7146,7 +7149,7 @@
                 <p14:cNvPr id="51" name="Ink 50">
                   <a:extLst>
                     <a:ext uri="{FF2B5EF4-FFF2-40B4-BE49-F238E27FC236}">
-                      <a16:creationId xmlns:a16="http://schemas.microsoft.com/office/drawing/2014/main" xmlns="" id="{C0F5DFE4-311D-927F-8897-08A16E3A8BCF}"/>
+                      <a16:creationId xmlns="" xmlns:a16="http://schemas.microsoft.com/office/drawing/2014/main" id="{C0F5DFE4-311D-927F-8897-08A16E3A8BCF}"/>
                     </a:ext>
                   </a:extLst>
                 </p14:cNvPr>
@@ -7197,7 +7200,7 @@
                 <p14:cNvPr id="52" name="Ink 51">
                   <a:extLst>
                     <a:ext uri="{FF2B5EF4-FFF2-40B4-BE49-F238E27FC236}">
-                      <a16:creationId xmlns:a16="http://schemas.microsoft.com/office/drawing/2014/main" xmlns="" id="{EA7F4BF8-E8C5-C5FC-4E7C-C0AF8AC4390F}"/>
+                      <a16:creationId xmlns="" xmlns:a16="http://schemas.microsoft.com/office/drawing/2014/main" id="{EA7F4BF8-E8C5-C5FC-4E7C-C0AF8AC4390F}"/>
                     </a:ext>
                   </a:extLst>
                 </p14:cNvPr>
@@ -7248,7 +7251,7 @@
                 <p14:cNvPr id="53" name="Ink 52">
                   <a:extLst>
                     <a:ext uri="{FF2B5EF4-FFF2-40B4-BE49-F238E27FC236}">
-                      <a16:creationId xmlns:a16="http://schemas.microsoft.com/office/drawing/2014/main" xmlns="" id="{CE37ADC0-BCC9-7D5B-3F42-942CC11811B5}"/>
+                      <a16:creationId xmlns="" xmlns:a16="http://schemas.microsoft.com/office/drawing/2014/main" id="{CE37ADC0-BCC9-7D5B-3F42-942CC11811B5}"/>
                     </a:ext>
                   </a:extLst>
                 </p14:cNvPr>
@@ -7299,7 +7302,7 @@
                 <p14:cNvPr id="54" name="Ink 53">
                   <a:extLst>
                     <a:ext uri="{FF2B5EF4-FFF2-40B4-BE49-F238E27FC236}">
-                      <a16:creationId xmlns:a16="http://schemas.microsoft.com/office/drawing/2014/main" xmlns="" id="{426B0ECD-1FC3-9AD1-DC4A-CFA951DA4855}"/>
+                      <a16:creationId xmlns="" xmlns:a16="http://schemas.microsoft.com/office/drawing/2014/main" id="{426B0ECD-1FC3-9AD1-DC4A-CFA951DA4855}"/>
                     </a:ext>
                   </a:extLst>
                 </p14:cNvPr>
@@ -7349,7 +7352,7 @@
           <p:cNvPr id="63" name="Group 62">
             <a:extLst>
               <a:ext uri="{FF2B5EF4-FFF2-40B4-BE49-F238E27FC236}">
-                <a16:creationId xmlns:a16="http://schemas.microsoft.com/office/drawing/2014/main" xmlns="" id="{878E965F-43D1-5460-7F0E-6D5841D43525}"/>
+                <a16:creationId xmlns="" xmlns:a16="http://schemas.microsoft.com/office/drawing/2014/main" id="{878E965F-43D1-5460-7F0E-6D5841D43525}"/>
               </a:ext>
             </a:extLst>
           </p:cNvPr>
@@ -7371,7 +7374,7 @@
                 <p14:cNvPr id="58" name="Ink 57">
                   <a:extLst>
                     <a:ext uri="{FF2B5EF4-FFF2-40B4-BE49-F238E27FC236}">
-                      <a16:creationId xmlns:a16="http://schemas.microsoft.com/office/drawing/2014/main" xmlns="" id="{11F4C5E0-F84B-F68A-3E45-3CF0BA8B5BC3}"/>
+                      <a16:creationId xmlns="" xmlns:a16="http://schemas.microsoft.com/office/drawing/2014/main" id="{11F4C5E0-F84B-F68A-3E45-3CF0BA8B5BC3}"/>
                     </a:ext>
                   </a:extLst>
                 </p14:cNvPr>
@@ -7422,7 +7425,7 @@
                 <p14:cNvPr id="59" name="Ink 58">
                   <a:extLst>
                     <a:ext uri="{FF2B5EF4-FFF2-40B4-BE49-F238E27FC236}">
-                      <a16:creationId xmlns:a16="http://schemas.microsoft.com/office/drawing/2014/main" xmlns="" id="{4B5CFD31-249E-4163-742F-5B96C6A14A22}"/>
+                      <a16:creationId xmlns="" xmlns:a16="http://schemas.microsoft.com/office/drawing/2014/main" id="{4B5CFD31-249E-4163-742F-5B96C6A14A22}"/>
                     </a:ext>
                   </a:extLst>
                 </p14:cNvPr>
@@ -7473,7 +7476,7 @@
                 <p14:cNvPr id="61" name="Ink 60">
                   <a:extLst>
                     <a:ext uri="{FF2B5EF4-FFF2-40B4-BE49-F238E27FC236}">
-                      <a16:creationId xmlns:a16="http://schemas.microsoft.com/office/drawing/2014/main" xmlns="" id="{88BA0C94-5500-320E-A399-122E2B6CF627}"/>
+                      <a16:creationId xmlns="" xmlns:a16="http://schemas.microsoft.com/office/drawing/2014/main" id="{88BA0C94-5500-320E-A399-122E2B6CF627}"/>
                     </a:ext>
                   </a:extLst>
                 </p14:cNvPr>
@@ -7524,7 +7527,7 @@
                 <p14:cNvPr id="62" name="Ink 61">
                   <a:extLst>
                     <a:ext uri="{FF2B5EF4-FFF2-40B4-BE49-F238E27FC236}">
-                      <a16:creationId xmlns:a16="http://schemas.microsoft.com/office/drawing/2014/main" xmlns="" id="{690C9451-717C-53D2-A47A-981F5997FE88}"/>
+                      <a16:creationId xmlns="" xmlns:a16="http://schemas.microsoft.com/office/drawing/2014/main" id="{690C9451-717C-53D2-A47A-981F5997FE88}"/>
                     </a:ext>
                   </a:extLst>
                 </p14:cNvPr>
@@ -7576,7 +7579,7 @@
               <p14:cNvPr id="65" name="Ink 64">
                 <a:extLst>
                   <a:ext uri="{FF2B5EF4-FFF2-40B4-BE49-F238E27FC236}">
-                    <a16:creationId xmlns:a16="http://schemas.microsoft.com/office/drawing/2014/main" xmlns="" id="{8060818A-3028-6756-9604-9A19E0B5BB86}"/>
+                    <a16:creationId xmlns="" xmlns:a16="http://schemas.microsoft.com/office/drawing/2014/main" id="{8060818A-3028-6756-9604-9A19E0B5BB86}"/>
                   </a:ext>
                 </a:extLst>
               </p14:cNvPr>
@@ -7627,7 +7630,7 @@
               <p14:cNvPr id="66" name="Ink 65">
                 <a:extLst>
                   <a:ext uri="{FF2B5EF4-FFF2-40B4-BE49-F238E27FC236}">
-                    <a16:creationId xmlns:a16="http://schemas.microsoft.com/office/drawing/2014/main" xmlns="" id="{9A5D286F-2045-6986-6E01-FBCCBFFB2C9F}"/>
+                    <a16:creationId xmlns="" xmlns:a16="http://schemas.microsoft.com/office/drawing/2014/main" id="{9A5D286F-2045-6986-6E01-FBCCBFFB2C9F}"/>
                   </a:ext>
                 </a:extLst>
               </p14:cNvPr>
@@ -7678,7 +7681,7 @@
               <p14:cNvPr id="67" name="Ink 66">
                 <a:extLst>
                   <a:ext uri="{FF2B5EF4-FFF2-40B4-BE49-F238E27FC236}">
-                    <a16:creationId xmlns:a16="http://schemas.microsoft.com/office/drawing/2014/main" xmlns="" id="{4B116FDB-E9CA-59DB-F565-B242612B09B3}"/>
+                    <a16:creationId xmlns="" xmlns:a16="http://schemas.microsoft.com/office/drawing/2014/main" id="{4B116FDB-E9CA-59DB-F565-B242612B09B3}"/>
                   </a:ext>
                 </a:extLst>
               </p14:cNvPr>
@@ -7729,7 +7732,7 @@
               <p14:cNvPr id="68" name="Ink 67">
                 <a:extLst>
                   <a:ext uri="{FF2B5EF4-FFF2-40B4-BE49-F238E27FC236}">
-                    <a16:creationId xmlns:a16="http://schemas.microsoft.com/office/drawing/2014/main" xmlns="" id="{6293FAB4-9BD3-F736-88A5-6ADED0155856}"/>
+                    <a16:creationId xmlns="" xmlns:a16="http://schemas.microsoft.com/office/drawing/2014/main" id="{6293FAB4-9BD3-F736-88A5-6ADED0155856}"/>
                   </a:ext>
                 </a:extLst>
               </p14:cNvPr>
@@ -7823,10 +7826,10 @@
           <p:cNvPr id="48" name="Rectangle 47">
             <a:extLst>
               <a:ext uri="{FF2B5EF4-FFF2-40B4-BE49-F238E27FC236}">
-                <a16:creationId xmlns:a16="http://schemas.microsoft.com/office/drawing/2014/main" xmlns="" id="{32BC26D8-82FB-445E-AA49-62A77D7C1EE0}"/>
+                <a16:creationId xmlns="" xmlns:a16="http://schemas.microsoft.com/office/drawing/2014/main" id="{32BC26D8-82FB-445E-AA49-62A77D7C1EE0}"/>
               </a:ext>
               <a:ext uri="{C183D7F6-B498-43B3-948B-1728B52AA6E4}">
-                <adec:decorative xmlns:adec="http://schemas.microsoft.com/office/drawing/2017/decorative" xmlns="" val="1"/>
+                <adec:decorative xmlns="" xmlns:adec="http://schemas.microsoft.com/office/drawing/2017/decorative" val="1"/>
               </a:ext>
             </a:extLst>
           </p:cNvPr>
@@ -7836,7 +7839,7 @@
           <p:nvPr>
             <p:extLst>
               <p:ext uri="{386F3935-93C4-4BCD-93E2-E3B085C9AB24}">
-                <p16:designElem xmlns:p16="http://schemas.microsoft.com/office/powerpoint/2015/main" xmlns="" val="1"/>
+                <p16:designElem xmlns="" xmlns:p16="http://schemas.microsoft.com/office/powerpoint/2015/main" val="1"/>
               </p:ext>
             </p:extLst>
           </p:nvPr>
@@ -7889,10 +7892,10 @@
           <p:cNvPr id="50" name="Rectangle 49">
             <a:extLst>
               <a:ext uri="{FF2B5EF4-FFF2-40B4-BE49-F238E27FC236}">
-                <a16:creationId xmlns:a16="http://schemas.microsoft.com/office/drawing/2014/main" xmlns="" id="{CB44330D-EA18-4254-AA95-EB49948539B8}"/>
+                <a16:creationId xmlns="" xmlns:a16="http://schemas.microsoft.com/office/drawing/2014/main" id="{CB44330D-EA18-4254-AA95-EB49948539B8}"/>
               </a:ext>
               <a:ext uri="{C183D7F6-B498-43B3-948B-1728B52AA6E4}">
-                <adec:decorative xmlns:adec="http://schemas.microsoft.com/office/drawing/2017/decorative" xmlns="" val="1"/>
+                <adec:decorative xmlns="" xmlns:adec="http://schemas.microsoft.com/office/drawing/2017/decorative" val="1"/>
               </a:ext>
             </a:extLst>
           </p:cNvPr>
@@ -7902,7 +7905,7 @@
           <p:nvPr>
             <p:extLst>
               <p:ext uri="{386F3935-93C4-4BCD-93E2-E3B085C9AB24}">
-                <p16:designElem xmlns:p16="http://schemas.microsoft.com/office/powerpoint/2015/main" xmlns="" val="1"/>
+                <p16:designElem xmlns="" xmlns:p16="http://schemas.microsoft.com/office/powerpoint/2015/main" val="1"/>
               </p:ext>
             </p:extLst>
           </p:nvPr>
@@ -7952,7 +7955,7 @@
           <p:cNvPr id="7" name="Picture 6">
             <a:extLst>
               <a:ext uri="{FF2B5EF4-FFF2-40B4-BE49-F238E27FC236}">
-                <a16:creationId xmlns:a16="http://schemas.microsoft.com/office/drawing/2014/main" xmlns="" id="{3C513A13-6774-F34D-BF5D-AD983136A8AF}"/>
+                <a16:creationId xmlns="" xmlns:a16="http://schemas.microsoft.com/office/drawing/2014/main" id="{3C513A13-6774-F34D-BF5D-AD983136A8AF}"/>
               </a:ext>
             </a:extLst>
           </p:cNvPr>
@@ -8027,10 +8030,10 @@
           <p:cNvPr id="48" name="Rectangle 47">
             <a:extLst>
               <a:ext uri="{FF2B5EF4-FFF2-40B4-BE49-F238E27FC236}">
-                <a16:creationId xmlns:a16="http://schemas.microsoft.com/office/drawing/2014/main" xmlns="" id="{32BC26D8-82FB-445E-AA49-62A77D7C1EE0}"/>
+                <a16:creationId xmlns="" xmlns:a16="http://schemas.microsoft.com/office/drawing/2014/main" id="{32BC26D8-82FB-445E-AA49-62A77D7C1EE0}"/>
               </a:ext>
               <a:ext uri="{C183D7F6-B498-43B3-948B-1728B52AA6E4}">
-                <adec:decorative xmlns:adec="http://schemas.microsoft.com/office/drawing/2017/decorative" xmlns="" val="1"/>
+                <adec:decorative xmlns="" xmlns:adec="http://schemas.microsoft.com/office/drawing/2017/decorative" val="1"/>
               </a:ext>
             </a:extLst>
           </p:cNvPr>
@@ -8040,7 +8043,7 @@
           <p:nvPr>
             <p:extLst>
               <p:ext uri="{386F3935-93C4-4BCD-93E2-E3B085C9AB24}">
-                <p16:designElem xmlns:p16="http://schemas.microsoft.com/office/powerpoint/2015/main" xmlns="" val="1"/>
+                <p16:designElem xmlns="" xmlns:p16="http://schemas.microsoft.com/office/powerpoint/2015/main" val="1"/>
               </p:ext>
             </p:extLst>
           </p:nvPr>
@@ -8093,10 +8096,10 @@
           <p:cNvPr id="50" name="Rectangle 49">
             <a:extLst>
               <a:ext uri="{FF2B5EF4-FFF2-40B4-BE49-F238E27FC236}">
-                <a16:creationId xmlns:a16="http://schemas.microsoft.com/office/drawing/2014/main" xmlns="" id="{CB44330D-EA18-4254-AA95-EB49948539B8}"/>
+                <a16:creationId xmlns="" xmlns:a16="http://schemas.microsoft.com/office/drawing/2014/main" id="{CB44330D-EA18-4254-AA95-EB49948539B8}"/>
               </a:ext>
               <a:ext uri="{C183D7F6-B498-43B3-948B-1728B52AA6E4}">
-                <adec:decorative xmlns:adec="http://schemas.microsoft.com/office/drawing/2017/decorative" xmlns="" val="1"/>
+                <adec:decorative xmlns="" xmlns:adec="http://schemas.microsoft.com/office/drawing/2017/decorative" val="1"/>
               </a:ext>
             </a:extLst>
           </p:cNvPr>
@@ -8106,7 +8109,7 @@
           <p:nvPr>
             <p:extLst>
               <p:ext uri="{386F3935-93C4-4BCD-93E2-E3B085C9AB24}">
-                <p16:designElem xmlns:p16="http://schemas.microsoft.com/office/powerpoint/2015/main" xmlns="" val="1"/>
+                <p16:designElem xmlns="" xmlns:p16="http://schemas.microsoft.com/office/powerpoint/2015/main" val="1"/>
               </p:ext>
             </p:extLst>
           </p:nvPr>
@@ -8156,7 +8159,7 @@
           <p:cNvPr id="3" name="Picture 2">
             <a:extLst>
               <a:ext uri="{FF2B5EF4-FFF2-40B4-BE49-F238E27FC236}">
-                <a16:creationId xmlns:a16="http://schemas.microsoft.com/office/drawing/2014/main" xmlns="" id="{6213DF9F-30A3-2A77-B740-71234FA59A53}"/>
+                <a16:creationId xmlns="" xmlns:a16="http://schemas.microsoft.com/office/drawing/2014/main" id="{6213DF9F-30A3-2A77-B740-71234FA59A53}"/>
               </a:ext>
             </a:extLst>
           </p:cNvPr>
@@ -8490,56 +8493,40 @@
           <a:p>
             <a:r>
               <a:rPr lang="pl-PL" dirty="0" smtClean="0"/>
-              <a:t>Struktury Danych</a:t>
+              <a:t>Schemat Algorytmu</a:t>
             </a:r>
             <a:endParaRPr lang="pl-PL" dirty="0"/>
           </a:p>
         </p:txBody>
       </p:sp>
-      <p:sp>
-        <p:nvSpPr>
-          <p:cNvPr id="3" name="Symbol zastępczy zawartości 2"/>
-          <p:cNvSpPr>
-            <a:spLocks noGrp="1"/>
-          </p:cNvSpPr>
-          <p:nvPr>
-            <p:ph idx="1"/>
-          </p:nvPr>
-        </p:nvSpPr>
-        <p:spPr/>
-        <p:txBody>
-          <a:bodyPr/>
-          <a:lstStyle/>
-          <a:p>
-            <a:r>
-              <a:rPr lang="pl-PL" dirty="0" smtClean="0"/>
-              <a:t>Kolejka priorytetowa (struktura zdarzeń)</a:t>
-            </a:r>
-          </a:p>
-          <a:p>
-            <a:r>
-              <a:rPr lang="pl-PL" dirty="0" smtClean="0"/>
-              <a:t>Drzewo AVL (struktura brzegu)</a:t>
-            </a:r>
-          </a:p>
-          <a:p>
-            <a:r>
-              <a:rPr lang="pl-PL" dirty="0" smtClean="0"/>
-              <a:t>Podwójnie łączona lista krawędzi (struktura wyznaczonego już diagramu)</a:t>
-            </a:r>
-          </a:p>
-          <a:p>
-            <a:pPr marL="0" indent="0">
-              <a:buNone/>
-            </a:pPr>
-            <a:endParaRPr lang="pl-PL" dirty="0"/>
-          </a:p>
-        </p:txBody>
-      </p:sp>
+      <p:pic>
+        <p:nvPicPr>
+          <p:cNvPr id="4" name="Obraz 3"/>
+          <p:cNvPicPr>
+            <a:picLocks noChangeAspect="1"/>
+          </p:cNvPicPr>
+          <p:nvPr/>
+        </p:nvPicPr>
+        <p:blipFill>
+          <a:blip r:embed="rId2"/>
+          <a:stretch>
+            <a:fillRect/>
+          </a:stretch>
+        </p:blipFill>
+        <p:spPr>
+          <a:xfrm>
+            <a:off x="838200" y="1569738"/>
+            <a:ext cx="8258175" cy="4943475"/>
+          </a:xfrm>
+          <a:prstGeom prst="rect">
+            <a:avLst/>
+          </a:prstGeom>
+        </p:spPr>
+      </p:pic>
     </p:spTree>
     <p:extLst>
       <p:ext uri="{BB962C8B-B14F-4D97-AF65-F5344CB8AC3E}">
-        <p14:creationId xmlns:p14="http://schemas.microsoft.com/office/powerpoint/2010/main" val="3738701036"/>
+        <p14:creationId xmlns:p14="http://schemas.microsoft.com/office/powerpoint/2010/main" val="946089646"/>
       </p:ext>
     </p:extLst>
   </p:cSld>
@@ -8590,7 +8577,48 @@
           <a:p>
             <a:r>
               <a:rPr lang="pl-PL" dirty="0" smtClean="0"/>
-              <a:t>Schemat Algorytmu</a:t>
+              <a:t>Zarządzanie zdarzeniami punktowymi</a:t>
+            </a:r>
+            <a:endParaRPr lang="pl-PL" dirty="0"/>
+          </a:p>
+        </p:txBody>
+      </p:sp>
+      <p:sp>
+        <p:nvSpPr>
+          <p:cNvPr id="3" name="Symbol zastępczy zawartości 2"/>
+          <p:cNvSpPr>
+            <a:spLocks noGrp="1"/>
+          </p:cNvSpPr>
+          <p:nvPr>
+            <p:ph idx="1"/>
+          </p:nvPr>
+        </p:nvSpPr>
+        <p:spPr/>
+        <p:txBody>
+          <a:bodyPr/>
+          <a:lstStyle/>
+          <a:p>
+            <a:r>
+              <a:rPr lang="pl-PL" dirty="0" smtClean="0"/>
+              <a:t>Odszukanie łuku ponad nowym łukiem</a:t>
+            </a:r>
+          </a:p>
+          <a:p>
+            <a:r>
+              <a:rPr lang="pl-PL" dirty="0" smtClean="0"/>
+              <a:t>Podział łuku (odpowiednia reprezentacja tego w strukturze brzegu)</a:t>
+            </a:r>
+          </a:p>
+          <a:p>
+            <a:r>
+              <a:rPr lang="pl-PL" dirty="0" smtClean="0"/>
+              <a:t>Powstaje nowa krawędź diagramu</a:t>
+            </a:r>
+          </a:p>
+          <a:p>
+            <a:r>
+              <a:rPr lang="pl-PL" dirty="0" smtClean="0"/>
+              <a:t>Wyszukanie potencjalnych zdarzeń okręgowych.</a:t>
             </a:r>
             <a:endParaRPr lang="pl-PL" dirty="0"/>
           </a:p>
@@ -8612,8 +8640,8 @@
         </p:blipFill>
         <p:spPr>
           <a:xfrm>
-            <a:off x="838200" y="1569738"/>
-            <a:ext cx="8258175" cy="4943475"/>
+            <a:off x="1121434" y="4001294"/>
+            <a:ext cx="9044526" cy="2528164"/>
           </a:xfrm>
           <a:prstGeom prst="rect">
             <a:avLst/>
@@ -8623,166 +8651,19 @@
     </p:spTree>
     <p:extLst>
       <p:ext uri="{BB962C8B-B14F-4D97-AF65-F5344CB8AC3E}">
-        <p14:creationId xmlns:p14="http://schemas.microsoft.com/office/powerpoint/2010/main" val="946089646"/>
+        <p14:creationId xmlns:p14="http://schemas.microsoft.com/office/powerpoint/2010/main" val="508177699"/>
       </p:ext>
     </p:extLst>
   </p:cSld>
   <p:clrMapOvr>
     <a:masterClrMapping/>
   </p:clrMapOvr>
-  <p:timing>
-    <p:tnLst>
-      <p:par>
-        <p:cTn id="1" dur="indefinite" restart="never" nodeType="tmRoot"/>
-      </p:par>
-    </p:tnLst>
-  </p:timing>
 </p:sld>
 </file>
 
 <file path=ppt/slides/slide28.xml><?xml version="1.0" encoding="utf-8"?>
 <p:sld xmlns:a="http://schemas.openxmlformats.org/drawingml/2006/main" xmlns:r="http://schemas.openxmlformats.org/officeDocument/2006/relationships" xmlns:p="http://schemas.openxmlformats.org/presentationml/2006/main">
   <p:cSld>
-    <p:bg>
-      <p:bgPr>
-        <a:solidFill>
-          <a:srgbClr val="1F1F1F"/>
-        </a:solidFill>
-        <a:effectLst/>
-      </p:bgPr>
-    </p:bg>
-    <p:spTree>
-      <p:nvGrpSpPr>
-        <p:cNvPr id="1" name=""/>
-        <p:cNvGrpSpPr/>
-        <p:nvPr/>
-      </p:nvGrpSpPr>
-      <p:grpSpPr>
-        <a:xfrm>
-          <a:off x="0" y="0"/>
-          <a:ext cx="0" cy="0"/>
-          <a:chOff x="0" y="0"/>
-          <a:chExt cx="0" cy="0"/>
-        </a:xfrm>
-      </p:grpSpPr>
-      <p:sp>
-        <p:nvSpPr>
-          <p:cNvPr id="2" name="Tytuł 1"/>
-          <p:cNvSpPr>
-            <a:spLocks noGrp="1"/>
-          </p:cNvSpPr>
-          <p:nvPr>
-            <p:ph type="title"/>
-          </p:nvPr>
-        </p:nvSpPr>
-        <p:spPr>
-          <a:xfrm>
-            <a:off x="838200" y="-92075"/>
-            <a:ext cx="10515600" cy="1325563"/>
-          </a:xfrm>
-          <a:solidFill>
-            <a:srgbClr val="1F1F1F"/>
-          </a:solidFill>
-        </p:spPr>
-        <p:txBody>
-          <a:bodyPr/>
-          <a:lstStyle/>
-          <a:p>
-            <a:r>
-              <a:rPr lang="pl-PL" dirty="0" smtClean="0">
-                <a:solidFill>
-                  <a:schemeClr val="bg1"/>
-                </a:solidFill>
-              </a:rPr>
-              <a:t>Dodatkowe metody w drzewie AVL</a:t>
-            </a:r>
-            <a:endParaRPr lang="pl-PL" dirty="0">
-              <a:solidFill>
-                <a:schemeClr val="bg1"/>
-              </a:solidFill>
-            </a:endParaRPr>
-          </a:p>
-        </p:txBody>
-      </p:sp>
-      <p:pic>
-        <p:nvPicPr>
-          <p:cNvPr id="4" name="Obraz 3"/>
-          <p:cNvPicPr>
-            <a:picLocks noChangeAspect="1"/>
-          </p:cNvPicPr>
-          <p:nvPr/>
-        </p:nvPicPr>
-        <p:blipFill>
-          <a:blip r:embed="rId2"/>
-          <a:stretch>
-            <a:fillRect/>
-          </a:stretch>
-        </p:blipFill>
-        <p:spPr>
-          <a:xfrm>
-            <a:off x="3150078" y="1233488"/>
-            <a:ext cx="5157158" cy="2595003"/>
-          </a:xfrm>
-          <a:prstGeom prst="rect">
-            <a:avLst/>
-          </a:prstGeom>
-        </p:spPr>
-      </p:pic>
-      <p:pic>
-        <p:nvPicPr>
-          <p:cNvPr id="5" name="Obraz 4"/>
-          <p:cNvPicPr>
-            <a:picLocks noChangeAspect="1"/>
-          </p:cNvPicPr>
-          <p:nvPr/>
-        </p:nvPicPr>
-        <p:blipFill>
-          <a:blip r:embed="rId3"/>
-          <a:stretch>
-            <a:fillRect/>
-          </a:stretch>
-        </p:blipFill>
-        <p:spPr>
-          <a:xfrm>
-            <a:off x="2917164" y="4044152"/>
-            <a:ext cx="5622985" cy="2616551"/>
-          </a:xfrm>
-          <a:prstGeom prst="rect">
-            <a:avLst/>
-          </a:prstGeom>
-        </p:spPr>
-      </p:pic>
-    </p:spTree>
-    <p:extLst>
-      <p:ext uri="{BB962C8B-B14F-4D97-AF65-F5344CB8AC3E}">
-        <p14:creationId xmlns:p14="http://schemas.microsoft.com/office/powerpoint/2010/main" val="491088759"/>
-      </p:ext>
-    </p:extLst>
-  </p:cSld>
-  <p:clrMapOvr>
-    <a:masterClrMapping/>
-  </p:clrMapOvr>
-  <p:timing>
-    <p:tnLst>
-      <p:par>
-        <p:cTn id="1" dur="indefinite" restart="never" nodeType="tmRoot"/>
-      </p:par>
-    </p:tnLst>
-  </p:timing>
-</p:sld>
-</file>
-
-<file path=ppt/slides/slide29.xml><?xml version="1.0" encoding="utf-8"?>
-<p:sld xmlns:a="http://schemas.openxmlformats.org/drawingml/2006/main" xmlns:r="http://schemas.openxmlformats.org/officeDocument/2006/relationships" xmlns:p="http://schemas.openxmlformats.org/presentationml/2006/main">
-  <p:cSld>
-    <p:bg>
-      <p:bgPr>
-        <a:solidFill>
-          <a:srgbClr val="1F1F1F"/>
-        </a:solidFill>
-        <a:effectLst/>
-      </p:bgPr>
-    </p:bg>
     <p:spTree>
       <p:nvGrpSpPr>
         <p:cNvPr id="1" name=""/>
@@ -8813,49 +8694,151 @@
           <a:lstStyle/>
           <a:p>
             <a:r>
-              <a:rPr lang="pl-PL" dirty="0" smtClean="0">
-                <a:solidFill>
-                  <a:schemeClr val="bg1"/>
-                </a:solidFill>
-              </a:rPr>
-              <a:t>Dodatkowe metody w drzewie AVL</a:t>
-            </a:r>
-            <a:endParaRPr lang="pl-PL" dirty="0">
-              <a:solidFill>
-                <a:schemeClr val="bg1"/>
-              </a:solidFill>
-            </a:endParaRPr>
+              <a:rPr lang="pl-PL" dirty="0" smtClean="0"/>
+              <a:t>Zarządzanie zdarzeniem okręgowym</a:t>
+            </a:r>
+            <a:endParaRPr lang="pl-PL" dirty="0"/>
           </a:p>
         </p:txBody>
       </p:sp>
-      <p:pic>
-        <p:nvPicPr>
-          <p:cNvPr id="4" name="Obraz 3"/>
-          <p:cNvPicPr>
-            <a:picLocks noChangeAspect="1"/>
-          </p:cNvPicPr>
-          <p:nvPr/>
-        </p:nvPicPr>
-        <p:blipFill>
-          <a:blip r:embed="rId2"/>
-          <a:stretch>
-            <a:fillRect/>
-          </a:stretch>
-        </p:blipFill>
-        <p:spPr>
-          <a:xfrm>
-            <a:off x="2881402" y="2130274"/>
-            <a:ext cx="6153150" cy="3667125"/>
-          </a:xfrm>
-          <a:prstGeom prst="rect">
-            <a:avLst/>
-          </a:prstGeom>
-        </p:spPr>
-      </p:pic>
+      <p:sp>
+        <p:nvSpPr>
+          <p:cNvPr id="3" name="Symbol zastępczy zawartości 2"/>
+          <p:cNvSpPr>
+            <a:spLocks noGrp="1"/>
+          </p:cNvSpPr>
+          <p:nvPr>
+            <p:ph idx="1"/>
+          </p:nvPr>
+        </p:nvSpPr>
+        <p:spPr/>
+        <p:txBody>
+          <a:bodyPr/>
+          <a:lstStyle/>
+          <a:p>
+            <a:r>
+              <a:rPr lang="pl-PL" dirty="0" smtClean="0"/>
+              <a:t>Dodanie nowego wierzchołka (środek okręgu) do diagramu</a:t>
+            </a:r>
+          </a:p>
+          <a:p>
+            <a:r>
+              <a:rPr lang="pl-PL" dirty="0" smtClean="0"/>
+              <a:t>Usunięcie z linii brzegowej zanikającej paraboli</a:t>
+            </a:r>
+          </a:p>
+          <a:p>
+            <a:r>
+              <a:rPr lang="pl-PL" dirty="0" smtClean="0"/>
+              <a:t>Dodanie nowej krawędzi do diagramu</a:t>
+            </a:r>
+          </a:p>
+          <a:p>
+            <a:r>
+              <a:rPr lang="pl-PL" dirty="0" smtClean="0"/>
+              <a:t>Sprawdzenie na nowych sąsiadach czy nie zachodzi nowe zdarzenie okręgowe</a:t>
+            </a:r>
+            <a:endParaRPr lang="pl-PL" dirty="0"/>
+          </a:p>
+        </p:txBody>
+      </p:sp>
     </p:spTree>
     <p:extLst>
       <p:ext uri="{BB962C8B-B14F-4D97-AF65-F5344CB8AC3E}">
-        <p14:creationId xmlns:p14="http://schemas.microsoft.com/office/powerpoint/2010/main" val="602935250"/>
+        <p14:creationId xmlns:p14="http://schemas.microsoft.com/office/powerpoint/2010/main" val="2091174480"/>
+      </p:ext>
+    </p:extLst>
+  </p:cSld>
+  <p:clrMapOvr>
+    <a:masterClrMapping/>
+  </p:clrMapOvr>
+</p:sld>
+</file>
+
+<file path=ppt/slides/slide29.xml><?xml version="1.0" encoding="utf-8"?>
+<p:sld xmlns:a="http://schemas.openxmlformats.org/drawingml/2006/main" xmlns:r="http://schemas.openxmlformats.org/officeDocument/2006/relationships" xmlns:p="http://schemas.openxmlformats.org/presentationml/2006/main">
+  <p:cSld>
+    <p:spTree>
+      <p:nvGrpSpPr>
+        <p:cNvPr id="1" name=""/>
+        <p:cNvGrpSpPr/>
+        <p:nvPr/>
+      </p:nvGrpSpPr>
+      <p:grpSpPr>
+        <a:xfrm>
+          <a:off x="0" y="0"/>
+          <a:ext cx="0" cy="0"/>
+          <a:chOff x="0" y="0"/>
+          <a:chExt cx="0" cy="0"/>
+        </a:xfrm>
+      </p:grpSpPr>
+      <p:sp>
+        <p:nvSpPr>
+          <p:cNvPr id="2" name="Tytuł 1"/>
+          <p:cNvSpPr>
+            <a:spLocks noGrp="1"/>
+          </p:cNvSpPr>
+          <p:nvPr>
+            <p:ph type="title"/>
+          </p:nvPr>
+        </p:nvSpPr>
+        <p:spPr/>
+        <p:txBody>
+          <a:bodyPr/>
+          <a:lstStyle/>
+          <a:p>
+            <a:r>
+              <a:rPr lang="pl-PL" dirty="0" smtClean="0"/>
+              <a:t>Struktury Danych</a:t>
+            </a:r>
+            <a:endParaRPr lang="pl-PL" dirty="0"/>
+          </a:p>
+        </p:txBody>
+      </p:sp>
+      <p:sp>
+        <p:nvSpPr>
+          <p:cNvPr id="3" name="Symbol zastępczy zawartości 2"/>
+          <p:cNvSpPr>
+            <a:spLocks noGrp="1"/>
+          </p:cNvSpPr>
+          <p:nvPr>
+            <p:ph idx="1"/>
+          </p:nvPr>
+        </p:nvSpPr>
+        <p:spPr/>
+        <p:txBody>
+          <a:bodyPr/>
+          <a:lstStyle/>
+          <a:p>
+            <a:r>
+              <a:rPr lang="pl-PL" dirty="0" smtClean="0"/>
+              <a:t>Kolejka priorytetowa (struktura zdarzeń)</a:t>
+            </a:r>
+          </a:p>
+          <a:p>
+            <a:r>
+              <a:rPr lang="pl-PL" dirty="0" smtClean="0"/>
+              <a:t>Drzewo AVL (struktura brzegu)</a:t>
+            </a:r>
+          </a:p>
+          <a:p>
+            <a:r>
+              <a:rPr lang="pl-PL" dirty="0" smtClean="0"/>
+              <a:t>Podwójnie łączona lista krawędzi (struktura wyznaczonego już diagramu)</a:t>
+            </a:r>
+          </a:p>
+          <a:p>
+            <a:pPr marL="0" indent="0">
+              <a:buNone/>
+            </a:pPr>
+            <a:endParaRPr lang="pl-PL" dirty="0"/>
+          </a:p>
+        </p:txBody>
+      </p:sp>
+    </p:spTree>
+    <p:extLst>
+      <p:ext uri="{BB962C8B-B14F-4D97-AF65-F5344CB8AC3E}">
+        <p14:creationId xmlns:p14="http://schemas.microsoft.com/office/powerpoint/2010/main" val="3738701036"/>
       </p:ext>
     </p:extLst>
   </p:cSld>
@@ -8902,10 +8885,10 @@
           <p:cNvPr id="1031" name="Rectangle 1030">
             <a:extLst>
               <a:ext uri="{FF2B5EF4-FFF2-40B4-BE49-F238E27FC236}">
-                <a16:creationId xmlns:a16="http://schemas.microsoft.com/office/drawing/2014/main" xmlns="" id="{42A4FC2C-047E-45A5-965D-8E1E3BF09BC6}"/>
+                <a16:creationId xmlns="" xmlns:a16="http://schemas.microsoft.com/office/drawing/2014/main" id="{42A4FC2C-047E-45A5-965D-8E1E3BF09BC6}"/>
               </a:ext>
               <a:ext uri="{C183D7F6-B498-43B3-948B-1728B52AA6E4}">
-                <adec:decorative xmlns:adec="http://schemas.microsoft.com/office/drawing/2017/decorative" xmlns="" val="1"/>
+                <adec:decorative xmlns="" xmlns:adec="http://schemas.microsoft.com/office/drawing/2017/decorative" val="1"/>
               </a:ext>
             </a:extLst>
           </p:cNvPr>
@@ -8915,7 +8898,7 @@
           <p:nvPr>
             <p:extLst>
               <p:ext uri="{386F3935-93C4-4BCD-93E2-E3B085C9AB24}">
-                <p16:designElem xmlns:p16="http://schemas.microsoft.com/office/powerpoint/2015/main" xmlns="" val="1"/>
+                <p16:designElem xmlns="" xmlns:p16="http://schemas.microsoft.com/office/powerpoint/2015/main" val="1"/>
               </p:ext>
             </p:extLst>
           </p:nvPr>
@@ -9057,7 +9040,7 @@
           <p:cNvPr id="1026" name="Picture 2" descr="undefined">
             <a:extLst>
               <a:ext uri="{FF2B5EF4-FFF2-40B4-BE49-F238E27FC236}">
-                <a16:creationId xmlns:a16="http://schemas.microsoft.com/office/drawing/2014/main" xmlns="" id="{A6EAEB65-AD97-1980-35B1-BBE5F711C7A2}"/>
+                <a16:creationId xmlns="" xmlns:a16="http://schemas.microsoft.com/office/drawing/2014/main" id="{A6EAEB65-AD97-1980-35B1-BBE5F711C7A2}"/>
               </a:ext>
             </a:extLst>
           </p:cNvPr>
@@ -9120,6 +9103,363 @@
 </file>
 
 <file path=ppt/slides/slide30.xml><?xml version="1.0" encoding="utf-8"?>
+<p:sld xmlns:a="http://schemas.openxmlformats.org/drawingml/2006/main" xmlns:r="http://schemas.openxmlformats.org/officeDocument/2006/relationships" xmlns:p="http://schemas.openxmlformats.org/presentationml/2006/main">
+  <p:cSld>
+    <p:spTree>
+      <p:nvGrpSpPr>
+        <p:cNvPr id="1" name=""/>
+        <p:cNvGrpSpPr/>
+        <p:nvPr/>
+      </p:nvGrpSpPr>
+      <p:grpSpPr>
+        <a:xfrm>
+          <a:off x="0" y="0"/>
+          <a:ext cx="0" cy="0"/>
+          <a:chOff x="0" y="0"/>
+          <a:chExt cx="0" cy="0"/>
+        </a:xfrm>
+      </p:grpSpPr>
+      <p:sp>
+        <p:nvSpPr>
+          <p:cNvPr id="2" name="Tytuł 1"/>
+          <p:cNvSpPr>
+            <a:spLocks noGrp="1"/>
+          </p:cNvSpPr>
+          <p:nvPr>
+            <p:ph type="title"/>
+          </p:nvPr>
+        </p:nvSpPr>
+        <p:spPr/>
+        <p:txBody>
+          <a:bodyPr/>
+          <a:lstStyle/>
+          <a:p>
+            <a:r>
+              <a:rPr lang="pl-PL" dirty="0" smtClean="0"/>
+              <a:t>Struktura linii brzegowej – drzewo AVL</a:t>
+            </a:r>
+            <a:endParaRPr lang="pl-PL" dirty="0"/>
+          </a:p>
+        </p:txBody>
+      </p:sp>
+      <p:pic>
+        <p:nvPicPr>
+          <p:cNvPr id="4" name="Obraz 3"/>
+          <p:cNvPicPr>
+            <a:picLocks noChangeAspect="1"/>
+          </p:cNvPicPr>
+          <p:nvPr/>
+        </p:nvPicPr>
+        <p:blipFill>
+          <a:blip r:embed="rId2"/>
+          <a:stretch>
+            <a:fillRect/>
+          </a:stretch>
+        </p:blipFill>
+        <p:spPr>
+          <a:xfrm>
+            <a:off x="1002371" y="2953085"/>
+            <a:ext cx="8394670" cy="3363337"/>
+          </a:xfrm>
+          <a:prstGeom prst="rect">
+            <a:avLst/>
+          </a:prstGeom>
+        </p:spPr>
+      </p:pic>
+      <p:sp>
+        <p:nvSpPr>
+          <p:cNvPr id="5" name="Prostokąt 4"/>
+          <p:cNvSpPr/>
+          <p:nvPr/>
+        </p:nvSpPr>
+        <p:spPr>
+          <a:xfrm>
+            <a:off x="1002371" y="1690688"/>
+            <a:ext cx="9305027" cy="2308324"/>
+          </a:xfrm>
+          <a:prstGeom prst="rect">
+            <a:avLst/>
+          </a:prstGeom>
+        </p:spPr>
+        <p:txBody>
+          <a:bodyPr wrap="square">
+            <a:spAutoFit/>
+          </a:bodyPr>
+          <a:lstStyle/>
+          <a:p>
+            <a:r>
+              <a:rPr lang="pl-PL" dirty="0" smtClean="0">
+                <a:latin typeface="+mj-lt"/>
+              </a:rPr>
+              <a:t>Każdy </a:t>
+            </a:r>
+            <a:r>
+              <a:rPr lang="pl-PL" dirty="0">
+                <a:latin typeface="+mj-lt"/>
+              </a:rPr>
+              <a:t>liść zawiera informacje o punkcie, którego łuk jest przez niego reprezentowany. Wewnętrzne węzły drzewa (nie będące liśćmi) zawierają informację o punktach przerwania, reprezentowanych za pomocą krotek zwierających dwa punkty: pierwszy element </a:t>
+            </a:r>
+            <a:r>
+              <a:rPr lang="pl-PL" dirty="0" err="1">
+                <a:latin typeface="+mj-lt"/>
+              </a:rPr>
+              <a:t>krotki</a:t>
+            </a:r>
+            <a:r>
+              <a:rPr lang="pl-PL" dirty="0">
+                <a:latin typeface="+mj-lt"/>
+              </a:rPr>
+              <a:t> zawiera informację o paraboli po lewej stronie, a drugi o paraboli po prawej stronie od punktu przerwania. W praktyce nie przechowujemy w drzewie w jawny sposób informacji o parabolach, a jedynie punkty przerwań w węzłach wewnętrznych i punkty, które reprezentują łuk w liściach. Taka implementacja linii brzegowej pozwala odnaleźć łuk, który zostanie rozdzielony na dwa przy rozpatrywaniu nowego zdarzenia miejscowego w czasie O(log n).</a:t>
+            </a:r>
+          </a:p>
+        </p:txBody>
+      </p:sp>
+    </p:spTree>
+    <p:extLst>
+      <p:ext uri="{BB962C8B-B14F-4D97-AF65-F5344CB8AC3E}">
+        <p14:creationId xmlns:p14="http://schemas.microsoft.com/office/powerpoint/2010/main" val="1121929079"/>
+      </p:ext>
+    </p:extLst>
+  </p:cSld>
+  <p:clrMapOvr>
+    <a:masterClrMapping/>
+  </p:clrMapOvr>
+</p:sld>
+</file>
+
+<file path=ppt/slides/slide31.xml><?xml version="1.0" encoding="utf-8"?>
+<p:sld xmlns:a="http://schemas.openxmlformats.org/drawingml/2006/main" xmlns:r="http://schemas.openxmlformats.org/officeDocument/2006/relationships" xmlns:p="http://schemas.openxmlformats.org/presentationml/2006/main">
+  <p:cSld>
+    <p:bg>
+      <p:bgPr>
+        <a:solidFill>
+          <a:srgbClr val="1F1F1F"/>
+        </a:solidFill>
+        <a:effectLst/>
+      </p:bgPr>
+    </p:bg>
+    <p:spTree>
+      <p:nvGrpSpPr>
+        <p:cNvPr id="1" name=""/>
+        <p:cNvGrpSpPr/>
+        <p:nvPr/>
+      </p:nvGrpSpPr>
+      <p:grpSpPr>
+        <a:xfrm>
+          <a:off x="0" y="0"/>
+          <a:ext cx="0" cy="0"/>
+          <a:chOff x="0" y="0"/>
+          <a:chExt cx="0" cy="0"/>
+        </a:xfrm>
+      </p:grpSpPr>
+      <p:sp>
+        <p:nvSpPr>
+          <p:cNvPr id="2" name="Tytuł 1"/>
+          <p:cNvSpPr>
+            <a:spLocks noGrp="1"/>
+          </p:cNvSpPr>
+          <p:nvPr>
+            <p:ph type="title"/>
+          </p:nvPr>
+        </p:nvSpPr>
+        <p:spPr>
+          <a:xfrm>
+            <a:off x="838200" y="-92075"/>
+            <a:ext cx="10515600" cy="1325563"/>
+          </a:xfrm>
+          <a:solidFill>
+            <a:srgbClr val="1F1F1F"/>
+          </a:solidFill>
+        </p:spPr>
+        <p:txBody>
+          <a:bodyPr/>
+          <a:lstStyle/>
+          <a:p>
+            <a:r>
+              <a:rPr lang="pl-PL" dirty="0" smtClean="0">
+                <a:solidFill>
+                  <a:schemeClr val="bg1"/>
+                </a:solidFill>
+              </a:rPr>
+              <a:t>Dodatkowe metody w drzewie AVL</a:t>
+            </a:r>
+            <a:endParaRPr lang="pl-PL" dirty="0">
+              <a:solidFill>
+                <a:schemeClr val="bg1"/>
+              </a:solidFill>
+            </a:endParaRPr>
+          </a:p>
+        </p:txBody>
+      </p:sp>
+      <p:pic>
+        <p:nvPicPr>
+          <p:cNvPr id="4" name="Obraz 3"/>
+          <p:cNvPicPr>
+            <a:picLocks noChangeAspect="1"/>
+          </p:cNvPicPr>
+          <p:nvPr/>
+        </p:nvPicPr>
+        <p:blipFill>
+          <a:blip r:embed="rId2"/>
+          <a:stretch>
+            <a:fillRect/>
+          </a:stretch>
+        </p:blipFill>
+        <p:spPr>
+          <a:xfrm>
+            <a:off x="3150078" y="1233488"/>
+            <a:ext cx="5157158" cy="2595003"/>
+          </a:xfrm>
+          <a:prstGeom prst="rect">
+            <a:avLst/>
+          </a:prstGeom>
+        </p:spPr>
+      </p:pic>
+      <p:pic>
+        <p:nvPicPr>
+          <p:cNvPr id="5" name="Obraz 4"/>
+          <p:cNvPicPr>
+            <a:picLocks noChangeAspect="1"/>
+          </p:cNvPicPr>
+          <p:nvPr/>
+        </p:nvPicPr>
+        <p:blipFill>
+          <a:blip r:embed="rId3"/>
+          <a:stretch>
+            <a:fillRect/>
+          </a:stretch>
+        </p:blipFill>
+        <p:spPr>
+          <a:xfrm>
+            <a:off x="2917164" y="4044152"/>
+            <a:ext cx="5622985" cy="2616551"/>
+          </a:xfrm>
+          <a:prstGeom prst="rect">
+            <a:avLst/>
+          </a:prstGeom>
+        </p:spPr>
+      </p:pic>
+    </p:spTree>
+    <p:extLst>
+      <p:ext uri="{BB962C8B-B14F-4D97-AF65-F5344CB8AC3E}">
+        <p14:creationId xmlns:p14="http://schemas.microsoft.com/office/powerpoint/2010/main" val="491088759"/>
+      </p:ext>
+    </p:extLst>
+  </p:cSld>
+  <p:clrMapOvr>
+    <a:masterClrMapping/>
+  </p:clrMapOvr>
+  <p:timing>
+    <p:tnLst>
+      <p:par>
+        <p:cTn id="1" dur="indefinite" restart="never" nodeType="tmRoot"/>
+      </p:par>
+    </p:tnLst>
+  </p:timing>
+</p:sld>
+</file>
+
+<file path=ppt/slides/slide32.xml><?xml version="1.0" encoding="utf-8"?>
+<p:sld xmlns:a="http://schemas.openxmlformats.org/drawingml/2006/main" xmlns:r="http://schemas.openxmlformats.org/officeDocument/2006/relationships" xmlns:p="http://schemas.openxmlformats.org/presentationml/2006/main">
+  <p:cSld>
+    <p:bg>
+      <p:bgPr>
+        <a:solidFill>
+          <a:srgbClr val="1F1F1F"/>
+        </a:solidFill>
+        <a:effectLst/>
+      </p:bgPr>
+    </p:bg>
+    <p:spTree>
+      <p:nvGrpSpPr>
+        <p:cNvPr id="1" name=""/>
+        <p:cNvGrpSpPr/>
+        <p:nvPr/>
+      </p:nvGrpSpPr>
+      <p:grpSpPr>
+        <a:xfrm>
+          <a:off x="0" y="0"/>
+          <a:ext cx="0" cy="0"/>
+          <a:chOff x="0" y="0"/>
+          <a:chExt cx="0" cy="0"/>
+        </a:xfrm>
+      </p:grpSpPr>
+      <p:sp>
+        <p:nvSpPr>
+          <p:cNvPr id="2" name="Tytuł 1"/>
+          <p:cNvSpPr>
+            <a:spLocks noGrp="1"/>
+          </p:cNvSpPr>
+          <p:nvPr>
+            <p:ph type="title"/>
+          </p:nvPr>
+        </p:nvSpPr>
+        <p:spPr/>
+        <p:txBody>
+          <a:bodyPr/>
+          <a:lstStyle/>
+          <a:p>
+            <a:r>
+              <a:rPr lang="pl-PL" dirty="0" smtClean="0">
+                <a:solidFill>
+                  <a:schemeClr val="bg1"/>
+                </a:solidFill>
+              </a:rPr>
+              <a:t>Dodatkowe metody w drzewie AVL</a:t>
+            </a:r>
+            <a:endParaRPr lang="pl-PL" dirty="0">
+              <a:solidFill>
+                <a:schemeClr val="bg1"/>
+              </a:solidFill>
+            </a:endParaRPr>
+          </a:p>
+        </p:txBody>
+      </p:sp>
+      <p:pic>
+        <p:nvPicPr>
+          <p:cNvPr id="4" name="Obraz 3"/>
+          <p:cNvPicPr>
+            <a:picLocks noChangeAspect="1"/>
+          </p:cNvPicPr>
+          <p:nvPr/>
+        </p:nvPicPr>
+        <p:blipFill>
+          <a:blip r:embed="rId2"/>
+          <a:stretch>
+            <a:fillRect/>
+          </a:stretch>
+        </p:blipFill>
+        <p:spPr>
+          <a:xfrm>
+            <a:off x="2881402" y="2130274"/>
+            <a:ext cx="6153150" cy="3667125"/>
+          </a:xfrm>
+          <a:prstGeom prst="rect">
+            <a:avLst/>
+          </a:prstGeom>
+        </p:spPr>
+      </p:pic>
+    </p:spTree>
+    <p:extLst>
+      <p:ext uri="{BB962C8B-B14F-4D97-AF65-F5344CB8AC3E}">
+        <p14:creationId xmlns:p14="http://schemas.microsoft.com/office/powerpoint/2010/main" val="602935250"/>
+      </p:ext>
+    </p:extLst>
+  </p:cSld>
+  <p:clrMapOvr>
+    <a:masterClrMapping/>
+  </p:clrMapOvr>
+  <p:timing>
+    <p:tnLst>
+      <p:par>
+        <p:cTn id="1" dur="indefinite" restart="never" nodeType="tmRoot"/>
+      </p:par>
+    </p:tnLst>
+  </p:timing>
+</p:sld>
+</file>
+
+<file path=ppt/slides/slide33.xml><?xml version="1.0" encoding="utf-8"?>
 <p:sld xmlns:a="http://schemas.openxmlformats.org/drawingml/2006/main" xmlns:r="http://schemas.openxmlformats.org/officeDocument/2006/relationships" xmlns:p="http://schemas.openxmlformats.org/presentationml/2006/main">
   <p:cSld>
     <p:bg>
@@ -9424,7 +9764,7 @@
 </p:sld>
 </file>
 
-<file path=ppt/slides/slide31.xml><?xml version="1.0" encoding="utf-8"?>
+<file path=ppt/slides/slide34.xml><?xml version="1.0" encoding="utf-8"?>
 <p:sld xmlns:a="http://schemas.openxmlformats.org/drawingml/2006/main" xmlns:r="http://schemas.openxmlformats.org/officeDocument/2006/relationships" xmlns:p="http://schemas.openxmlformats.org/presentationml/2006/main">
   <p:cSld>
     <p:bg>
@@ -9560,7 +9900,7 @@
 </p:sld>
 </file>
 
-<file path=ppt/slides/slide32.xml><?xml version="1.0" encoding="utf-8"?>
+<file path=ppt/slides/slide35.xml><?xml version="1.0" encoding="utf-8"?>
 <p:sld xmlns:a="http://schemas.openxmlformats.org/drawingml/2006/main" xmlns:r="http://schemas.openxmlformats.org/officeDocument/2006/relationships" xmlns:p="http://schemas.openxmlformats.org/presentationml/2006/main">
   <p:cSld>
     <p:bg>
@@ -9660,7 +10000,7 @@
 </p:sld>
 </file>
 
-<file path=ppt/slides/slide33.xml><?xml version="1.0" encoding="utf-8"?>
+<file path=ppt/slides/slide36.xml><?xml version="1.0" encoding="utf-8"?>
 <p:sld xmlns:a="http://schemas.openxmlformats.org/drawingml/2006/main" xmlns:r="http://schemas.openxmlformats.org/officeDocument/2006/relationships" xmlns:p="http://schemas.openxmlformats.org/presentationml/2006/main">
   <p:cSld>
     <p:bg>
@@ -9768,7 +10108,7 @@
 </p:sld>
 </file>
 
-<file path=ppt/slides/slide34.xml><?xml version="1.0" encoding="utf-8"?>
+<file path=ppt/slides/slide37.xml><?xml version="1.0" encoding="utf-8"?>
 <p:sld xmlns:a="http://schemas.openxmlformats.org/drawingml/2006/main" xmlns:r="http://schemas.openxmlformats.org/officeDocument/2006/relationships" xmlns:p="http://schemas.openxmlformats.org/presentationml/2006/main">
   <p:cSld>
     <p:bg>
@@ -9868,7 +10208,7 @@
 </p:sld>
 </file>
 
-<file path=ppt/slides/slide35.xml><?xml version="1.0" encoding="utf-8"?>
+<file path=ppt/slides/slide38.xml><?xml version="1.0" encoding="utf-8"?>
 <p:sld xmlns:a="http://schemas.openxmlformats.org/drawingml/2006/main" xmlns:r="http://schemas.openxmlformats.org/officeDocument/2006/relationships" xmlns:p="http://schemas.openxmlformats.org/presentationml/2006/main">
   <p:cSld>
     <p:spTree>
@@ -9934,7 +10274,7 @@
 </p:sld>
 </file>
 
-<file path=ppt/slides/slide36.xml><?xml version="1.0" encoding="utf-8"?>
+<file path=ppt/slides/slide39.xml><?xml version="1.0" encoding="utf-8"?>
 <p:sld xmlns:a="http://schemas.openxmlformats.org/drawingml/2006/main" xmlns:r="http://schemas.openxmlformats.org/officeDocument/2006/relationships" xmlns:p="http://schemas.openxmlformats.org/presentationml/2006/main">
   <p:cSld>
     <p:bg>
@@ -10003,237 +10343,6 @@
 </p:sld>
 </file>
 
-<file path=ppt/slides/slide37.xml><?xml version="1.0" encoding="utf-8"?>
-<p:sld xmlns:a="http://schemas.openxmlformats.org/drawingml/2006/main" xmlns:r="http://schemas.openxmlformats.org/officeDocument/2006/relationships" xmlns:p="http://schemas.openxmlformats.org/presentationml/2006/main">
-  <p:cSld>
-    <p:bg>
-      <p:bgPr>
-        <a:solidFill>
-          <a:srgbClr val="1F1F1F"/>
-        </a:solidFill>
-        <a:effectLst/>
-      </p:bgPr>
-    </p:bg>
-    <p:spTree>
-      <p:nvGrpSpPr>
-        <p:cNvPr id="1" name=""/>
-        <p:cNvGrpSpPr/>
-        <p:nvPr/>
-      </p:nvGrpSpPr>
-      <p:grpSpPr>
-        <a:xfrm>
-          <a:off x="0" y="0"/>
-          <a:ext cx="0" cy="0"/>
-          <a:chOff x="0" y="0"/>
-          <a:chExt cx="0" cy="0"/>
-        </a:xfrm>
-      </p:grpSpPr>
-      <p:pic>
-        <p:nvPicPr>
-          <p:cNvPr id="4" name="Obraz 3"/>
-          <p:cNvPicPr>
-            <a:picLocks noChangeAspect="1"/>
-          </p:cNvPicPr>
-          <p:nvPr/>
-        </p:nvPicPr>
-        <p:blipFill>
-          <a:blip r:embed="rId2"/>
-          <a:stretch>
-            <a:fillRect/>
-          </a:stretch>
-        </p:blipFill>
-        <p:spPr>
-          <a:xfrm>
-            <a:off x="110797" y="1464309"/>
-            <a:ext cx="5717785" cy="4310087"/>
-          </a:xfrm>
-          <a:prstGeom prst="rect">
-            <a:avLst/>
-          </a:prstGeom>
-        </p:spPr>
-      </p:pic>
-      <p:pic>
-        <p:nvPicPr>
-          <p:cNvPr id="5" name="Obraz 4"/>
-          <p:cNvPicPr>
-            <a:picLocks noChangeAspect="1"/>
-          </p:cNvPicPr>
-          <p:nvPr/>
-        </p:nvPicPr>
-        <p:blipFill>
-          <a:blip r:embed="rId3"/>
-          <a:stretch>
-            <a:fillRect/>
-          </a:stretch>
-        </p:blipFill>
-        <p:spPr>
-          <a:xfrm>
-            <a:off x="5933739" y="1464309"/>
-            <a:ext cx="6258261" cy="3306099"/>
-          </a:xfrm>
-          <a:prstGeom prst="rect">
-            <a:avLst/>
-          </a:prstGeom>
-        </p:spPr>
-      </p:pic>
-    </p:spTree>
-    <p:extLst>
-      <p:ext uri="{BB962C8B-B14F-4D97-AF65-F5344CB8AC3E}">
-        <p14:creationId xmlns:p14="http://schemas.microsoft.com/office/powerpoint/2010/main" val="709388911"/>
-      </p:ext>
-    </p:extLst>
-  </p:cSld>
-  <p:clrMapOvr>
-    <a:masterClrMapping/>
-  </p:clrMapOvr>
-  <p:timing>
-    <p:tnLst>
-      <p:par>
-        <p:cTn id="1" dur="indefinite" restart="never" nodeType="tmRoot"/>
-      </p:par>
-    </p:tnLst>
-  </p:timing>
-</p:sld>
-</file>
-
-<file path=ppt/slides/slide38.xml><?xml version="1.0" encoding="utf-8"?>
-<p:sld xmlns:a="http://schemas.openxmlformats.org/drawingml/2006/main" xmlns:r="http://schemas.openxmlformats.org/officeDocument/2006/relationships" xmlns:p="http://schemas.openxmlformats.org/presentationml/2006/main">
-  <p:cSld>
-    <p:bg>
-      <p:bgPr>
-        <a:solidFill>
-          <a:srgbClr val="1F1F1F"/>
-        </a:solidFill>
-        <a:effectLst/>
-      </p:bgPr>
-    </p:bg>
-    <p:spTree>
-      <p:nvGrpSpPr>
-        <p:cNvPr id="1" name=""/>
-        <p:cNvGrpSpPr/>
-        <p:nvPr/>
-      </p:nvGrpSpPr>
-      <p:grpSpPr>
-        <a:xfrm>
-          <a:off x="0" y="0"/>
-          <a:ext cx="0" cy="0"/>
-          <a:chOff x="0" y="0"/>
-          <a:chExt cx="0" cy="0"/>
-        </a:xfrm>
-      </p:grpSpPr>
-      <p:pic>
-        <p:nvPicPr>
-          <p:cNvPr id="5" name="Obraz 4"/>
-          <p:cNvPicPr>
-            <a:picLocks noChangeAspect="1"/>
-          </p:cNvPicPr>
-          <p:nvPr/>
-        </p:nvPicPr>
-        <p:blipFill>
-          <a:blip r:embed="rId2"/>
-          <a:stretch>
-            <a:fillRect/>
-          </a:stretch>
-        </p:blipFill>
-        <p:spPr>
-          <a:xfrm>
-            <a:off x="1134136" y="0"/>
-            <a:ext cx="8785042" cy="6858000"/>
-          </a:xfrm>
-          <a:prstGeom prst="rect">
-            <a:avLst/>
-          </a:prstGeom>
-        </p:spPr>
-      </p:pic>
-    </p:spTree>
-    <p:extLst>
-      <p:ext uri="{BB962C8B-B14F-4D97-AF65-F5344CB8AC3E}">
-        <p14:creationId xmlns:p14="http://schemas.microsoft.com/office/powerpoint/2010/main" val="4203588981"/>
-      </p:ext>
-    </p:extLst>
-  </p:cSld>
-  <p:clrMapOvr>
-    <a:masterClrMapping/>
-  </p:clrMapOvr>
-  <p:timing>
-    <p:tnLst>
-      <p:par>
-        <p:cTn id="1" dur="indefinite" restart="never" nodeType="tmRoot"/>
-      </p:par>
-    </p:tnLst>
-  </p:timing>
-</p:sld>
-</file>
-
-<file path=ppt/slides/slide39.xml><?xml version="1.0" encoding="utf-8"?>
-<p:sld xmlns:a="http://schemas.openxmlformats.org/drawingml/2006/main" xmlns:r="http://schemas.openxmlformats.org/officeDocument/2006/relationships" xmlns:p="http://schemas.openxmlformats.org/presentationml/2006/main">
-  <p:cSld>
-    <p:bg>
-      <p:bgPr>
-        <a:solidFill>
-          <a:srgbClr val="1F1F1F"/>
-        </a:solidFill>
-        <a:effectLst/>
-      </p:bgPr>
-    </p:bg>
-    <p:spTree>
-      <p:nvGrpSpPr>
-        <p:cNvPr id="1" name=""/>
-        <p:cNvGrpSpPr/>
-        <p:nvPr/>
-      </p:nvGrpSpPr>
-      <p:grpSpPr>
-        <a:xfrm>
-          <a:off x="0" y="0"/>
-          <a:ext cx="0" cy="0"/>
-          <a:chOff x="0" y="0"/>
-          <a:chExt cx="0" cy="0"/>
-        </a:xfrm>
-      </p:grpSpPr>
-      <p:pic>
-        <p:nvPicPr>
-          <p:cNvPr id="4" name="Obraz 3"/>
-          <p:cNvPicPr>
-            <a:picLocks noChangeAspect="1"/>
-          </p:cNvPicPr>
-          <p:nvPr/>
-        </p:nvPicPr>
-        <p:blipFill>
-          <a:blip r:embed="rId2"/>
-          <a:stretch>
-            <a:fillRect/>
-          </a:stretch>
-        </p:blipFill>
-        <p:spPr>
-          <a:xfrm>
-            <a:off x="2347912" y="581025"/>
-            <a:ext cx="7496175" cy="5695950"/>
-          </a:xfrm>
-          <a:prstGeom prst="rect">
-            <a:avLst/>
-          </a:prstGeom>
-        </p:spPr>
-      </p:pic>
-    </p:spTree>
-    <p:extLst>
-      <p:ext uri="{BB962C8B-B14F-4D97-AF65-F5344CB8AC3E}">
-        <p14:creationId xmlns:p14="http://schemas.microsoft.com/office/powerpoint/2010/main" val="1123035293"/>
-      </p:ext>
-    </p:extLst>
-  </p:cSld>
-  <p:clrMapOvr>
-    <a:masterClrMapping/>
-  </p:clrMapOvr>
-  <p:timing>
-    <p:tnLst>
-      <p:par>
-        <p:cTn id="1" dur="indefinite" restart="never" nodeType="tmRoot"/>
-      </p:par>
-    </p:tnLst>
-  </p:timing>
-</p:sld>
-</file>
-
 <file path=ppt/slides/slide4.xml><?xml version="1.0" encoding="utf-8"?>
 <p:sld xmlns:a="http://schemas.openxmlformats.org/drawingml/2006/main" xmlns:r="http://schemas.openxmlformats.org/officeDocument/2006/relationships" xmlns:p="http://schemas.openxmlformats.org/presentationml/2006/main">
   <p:cSld>
@@ -10264,10 +10373,10 @@
           <p:cNvPr id="2055" name="Rectangle 2054">
             <a:extLst>
               <a:ext uri="{FF2B5EF4-FFF2-40B4-BE49-F238E27FC236}">
-                <a16:creationId xmlns:a16="http://schemas.microsoft.com/office/drawing/2014/main" xmlns="" id="{42A4FC2C-047E-45A5-965D-8E1E3BF09BC6}"/>
+                <a16:creationId xmlns="" xmlns:a16="http://schemas.microsoft.com/office/drawing/2014/main" id="{42A4FC2C-047E-45A5-965D-8E1E3BF09BC6}"/>
               </a:ext>
               <a:ext uri="{C183D7F6-B498-43B3-948B-1728B52AA6E4}">
-                <adec:decorative xmlns:adec="http://schemas.microsoft.com/office/drawing/2017/decorative" xmlns="" val="1"/>
+                <adec:decorative xmlns="" xmlns:adec="http://schemas.microsoft.com/office/drawing/2017/decorative" val="1"/>
               </a:ext>
             </a:extLst>
           </p:cNvPr>
@@ -10277,7 +10386,7 @@
           <p:nvPr>
             <p:extLst>
               <p:ext uri="{386F3935-93C4-4BCD-93E2-E3B085C9AB24}">
-                <p16:designElem xmlns:p16="http://schemas.microsoft.com/office/powerpoint/2015/main" xmlns="" val="1"/>
+                <p16:designElem xmlns="" xmlns:p16="http://schemas.microsoft.com/office/powerpoint/2015/main" val="1"/>
               </p:ext>
             </p:extLst>
           </p:nvPr>
@@ -10419,7 +10528,7 @@
           <p:cNvPr id="2050" name="Picture 2" descr="Voronoi diagram under Manhattan distance">
             <a:extLst>
               <a:ext uri="{FF2B5EF4-FFF2-40B4-BE49-F238E27FC236}">
-                <a16:creationId xmlns:a16="http://schemas.microsoft.com/office/drawing/2014/main" xmlns="" id="{7826ABD4-2A31-1226-F26F-64B83AF32783}"/>
+                <a16:creationId xmlns="" xmlns:a16="http://schemas.microsoft.com/office/drawing/2014/main" id="{7826ABD4-2A31-1226-F26F-64B83AF32783}"/>
               </a:ext>
             </a:extLst>
           </p:cNvPr>
@@ -10522,6 +10631,237 @@
         </p:blipFill>
         <p:spPr>
           <a:xfrm>
+            <a:off x="110797" y="1464309"/>
+            <a:ext cx="5717785" cy="4310087"/>
+          </a:xfrm>
+          <a:prstGeom prst="rect">
+            <a:avLst/>
+          </a:prstGeom>
+        </p:spPr>
+      </p:pic>
+      <p:pic>
+        <p:nvPicPr>
+          <p:cNvPr id="5" name="Obraz 4"/>
+          <p:cNvPicPr>
+            <a:picLocks noChangeAspect="1"/>
+          </p:cNvPicPr>
+          <p:nvPr/>
+        </p:nvPicPr>
+        <p:blipFill>
+          <a:blip r:embed="rId3"/>
+          <a:stretch>
+            <a:fillRect/>
+          </a:stretch>
+        </p:blipFill>
+        <p:spPr>
+          <a:xfrm>
+            <a:off x="5933739" y="1464309"/>
+            <a:ext cx="6258261" cy="3306099"/>
+          </a:xfrm>
+          <a:prstGeom prst="rect">
+            <a:avLst/>
+          </a:prstGeom>
+        </p:spPr>
+      </p:pic>
+    </p:spTree>
+    <p:extLst>
+      <p:ext uri="{BB962C8B-B14F-4D97-AF65-F5344CB8AC3E}">
+        <p14:creationId xmlns:p14="http://schemas.microsoft.com/office/powerpoint/2010/main" val="709388911"/>
+      </p:ext>
+    </p:extLst>
+  </p:cSld>
+  <p:clrMapOvr>
+    <a:masterClrMapping/>
+  </p:clrMapOvr>
+  <p:timing>
+    <p:tnLst>
+      <p:par>
+        <p:cTn id="1" dur="indefinite" restart="never" nodeType="tmRoot"/>
+      </p:par>
+    </p:tnLst>
+  </p:timing>
+</p:sld>
+</file>
+
+<file path=ppt/slides/slide41.xml><?xml version="1.0" encoding="utf-8"?>
+<p:sld xmlns:a="http://schemas.openxmlformats.org/drawingml/2006/main" xmlns:r="http://schemas.openxmlformats.org/officeDocument/2006/relationships" xmlns:p="http://schemas.openxmlformats.org/presentationml/2006/main">
+  <p:cSld>
+    <p:bg>
+      <p:bgPr>
+        <a:solidFill>
+          <a:srgbClr val="1F1F1F"/>
+        </a:solidFill>
+        <a:effectLst/>
+      </p:bgPr>
+    </p:bg>
+    <p:spTree>
+      <p:nvGrpSpPr>
+        <p:cNvPr id="1" name=""/>
+        <p:cNvGrpSpPr/>
+        <p:nvPr/>
+      </p:nvGrpSpPr>
+      <p:grpSpPr>
+        <a:xfrm>
+          <a:off x="0" y="0"/>
+          <a:ext cx="0" cy="0"/>
+          <a:chOff x="0" y="0"/>
+          <a:chExt cx="0" cy="0"/>
+        </a:xfrm>
+      </p:grpSpPr>
+      <p:pic>
+        <p:nvPicPr>
+          <p:cNvPr id="5" name="Obraz 4"/>
+          <p:cNvPicPr>
+            <a:picLocks noChangeAspect="1"/>
+          </p:cNvPicPr>
+          <p:nvPr/>
+        </p:nvPicPr>
+        <p:blipFill>
+          <a:blip r:embed="rId2"/>
+          <a:stretch>
+            <a:fillRect/>
+          </a:stretch>
+        </p:blipFill>
+        <p:spPr>
+          <a:xfrm>
+            <a:off x="1134136" y="0"/>
+            <a:ext cx="8785042" cy="6858000"/>
+          </a:xfrm>
+          <a:prstGeom prst="rect">
+            <a:avLst/>
+          </a:prstGeom>
+        </p:spPr>
+      </p:pic>
+    </p:spTree>
+    <p:extLst>
+      <p:ext uri="{BB962C8B-B14F-4D97-AF65-F5344CB8AC3E}">
+        <p14:creationId xmlns:p14="http://schemas.microsoft.com/office/powerpoint/2010/main" val="4203588981"/>
+      </p:ext>
+    </p:extLst>
+  </p:cSld>
+  <p:clrMapOvr>
+    <a:masterClrMapping/>
+  </p:clrMapOvr>
+  <p:timing>
+    <p:tnLst>
+      <p:par>
+        <p:cTn id="1" dur="indefinite" restart="never" nodeType="tmRoot"/>
+      </p:par>
+    </p:tnLst>
+  </p:timing>
+</p:sld>
+</file>
+
+<file path=ppt/slides/slide42.xml><?xml version="1.0" encoding="utf-8"?>
+<p:sld xmlns:a="http://schemas.openxmlformats.org/drawingml/2006/main" xmlns:r="http://schemas.openxmlformats.org/officeDocument/2006/relationships" xmlns:p="http://schemas.openxmlformats.org/presentationml/2006/main">
+  <p:cSld>
+    <p:bg>
+      <p:bgPr>
+        <a:solidFill>
+          <a:srgbClr val="1F1F1F"/>
+        </a:solidFill>
+        <a:effectLst/>
+      </p:bgPr>
+    </p:bg>
+    <p:spTree>
+      <p:nvGrpSpPr>
+        <p:cNvPr id="1" name=""/>
+        <p:cNvGrpSpPr/>
+        <p:nvPr/>
+      </p:nvGrpSpPr>
+      <p:grpSpPr>
+        <a:xfrm>
+          <a:off x="0" y="0"/>
+          <a:ext cx="0" cy="0"/>
+          <a:chOff x="0" y="0"/>
+          <a:chExt cx="0" cy="0"/>
+        </a:xfrm>
+      </p:grpSpPr>
+      <p:pic>
+        <p:nvPicPr>
+          <p:cNvPr id="4" name="Obraz 3"/>
+          <p:cNvPicPr>
+            <a:picLocks noChangeAspect="1"/>
+          </p:cNvPicPr>
+          <p:nvPr/>
+        </p:nvPicPr>
+        <p:blipFill>
+          <a:blip r:embed="rId2"/>
+          <a:stretch>
+            <a:fillRect/>
+          </a:stretch>
+        </p:blipFill>
+        <p:spPr>
+          <a:xfrm>
+            <a:off x="2347912" y="581025"/>
+            <a:ext cx="7496175" cy="5695950"/>
+          </a:xfrm>
+          <a:prstGeom prst="rect">
+            <a:avLst/>
+          </a:prstGeom>
+        </p:spPr>
+      </p:pic>
+    </p:spTree>
+    <p:extLst>
+      <p:ext uri="{BB962C8B-B14F-4D97-AF65-F5344CB8AC3E}">
+        <p14:creationId xmlns:p14="http://schemas.microsoft.com/office/powerpoint/2010/main" val="1123035293"/>
+      </p:ext>
+    </p:extLst>
+  </p:cSld>
+  <p:clrMapOvr>
+    <a:masterClrMapping/>
+  </p:clrMapOvr>
+  <p:timing>
+    <p:tnLst>
+      <p:par>
+        <p:cTn id="1" dur="indefinite" restart="never" nodeType="tmRoot"/>
+      </p:par>
+    </p:tnLst>
+  </p:timing>
+</p:sld>
+</file>
+
+<file path=ppt/slides/slide43.xml><?xml version="1.0" encoding="utf-8"?>
+<p:sld xmlns:a="http://schemas.openxmlformats.org/drawingml/2006/main" xmlns:r="http://schemas.openxmlformats.org/officeDocument/2006/relationships" xmlns:p="http://schemas.openxmlformats.org/presentationml/2006/main">
+  <p:cSld>
+    <p:bg>
+      <p:bgPr>
+        <a:solidFill>
+          <a:srgbClr val="1F1F1F"/>
+        </a:solidFill>
+        <a:effectLst/>
+      </p:bgPr>
+    </p:bg>
+    <p:spTree>
+      <p:nvGrpSpPr>
+        <p:cNvPr id="1" name=""/>
+        <p:cNvGrpSpPr/>
+        <p:nvPr/>
+      </p:nvGrpSpPr>
+      <p:grpSpPr>
+        <a:xfrm>
+          <a:off x="0" y="0"/>
+          <a:ext cx="0" cy="0"/>
+          <a:chOff x="0" y="0"/>
+          <a:chExt cx="0" cy="0"/>
+        </a:xfrm>
+      </p:grpSpPr>
+      <p:pic>
+        <p:nvPicPr>
+          <p:cNvPr id="4" name="Obraz 3"/>
+          <p:cNvPicPr>
+            <a:picLocks noChangeAspect="1"/>
+          </p:cNvPicPr>
+          <p:nvPr/>
+        </p:nvPicPr>
+        <p:blipFill>
+          <a:blip r:embed="rId2"/>
+          <a:stretch>
+            <a:fillRect/>
+          </a:stretch>
+        </p:blipFill>
+        <p:spPr>
+          <a:xfrm>
             <a:off x="745016" y="338767"/>
             <a:ext cx="9839325" cy="6076950"/>
           </a:xfrm>
@@ -10553,7 +10893,7 @@
 </p:sld>
 </file>
 
-<file path=ppt/slides/slide41.xml><?xml version="1.0" encoding="utf-8"?>
+<file path=ppt/slides/slide44.xml><?xml version="1.0" encoding="utf-8"?>
 <p:sld xmlns:a="http://schemas.openxmlformats.org/drawingml/2006/main" xmlns:r="http://schemas.openxmlformats.org/officeDocument/2006/relationships" xmlns:p="http://schemas.openxmlformats.org/presentationml/2006/main">
   <p:cSld>
     <p:bg>
@@ -10622,7 +10962,7 @@
 </p:sld>
 </file>
 
-<file path=ppt/slides/slide42.xml><?xml version="1.0" encoding="utf-8"?>
+<file path=ppt/slides/slide45.xml><?xml version="1.0" encoding="utf-8"?>
 <p:sld xmlns:a="http://schemas.openxmlformats.org/drawingml/2006/main" xmlns:r="http://schemas.openxmlformats.org/officeDocument/2006/relationships" xmlns:p="http://schemas.openxmlformats.org/presentationml/2006/main">
   <p:cSld>
     <p:spTree>
@@ -10687,7 +11027,7 @@
 </p:sld>
 </file>
 
-<file path=ppt/slides/slide43.xml><?xml version="1.0" encoding="utf-8"?>
+<file path=ppt/slides/slide46.xml><?xml version="1.0" encoding="utf-8"?>
 <p:sld xmlns:a="http://schemas.openxmlformats.org/drawingml/2006/main" xmlns:r="http://schemas.openxmlformats.org/officeDocument/2006/relationships" xmlns:p="http://schemas.openxmlformats.org/presentationml/2006/main">
   <p:cSld>
     <p:spTree>
@@ -10839,7 +11179,7 @@
 </p:sld>
 </file>
 
-<file path=ppt/slides/slide44.xml><?xml version="1.0" encoding="utf-8"?>
+<file path=ppt/slides/slide47.xml><?xml version="1.0" encoding="utf-8"?>
 <p:sld xmlns:a="http://schemas.openxmlformats.org/drawingml/2006/main" xmlns:r="http://schemas.openxmlformats.org/officeDocument/2006/relationships" xmlns:p="http://schemas.openxmlformats.org/presentationml/2006/main">
   <p:cSld>
     <p:bg>
@@ -10908,7 +11248,7 @@
 </p:sld>
 </file>
 
-<file path=ppt/slides/slide45.xml><?xml version="1.0" encoding="utf-8"?>
+<file path=ppt/slides/slide48.xml><?xml version="1.0" encoding="utf-8"?>
 <p:sld xmlns:a="http://schemas.openxmlformats.org/drawingml/2006/main" xmlns:r="http://schemas.openxmlformats.org/officeDocument/2006/relationships" xmlns:p="http://schemas.openxmlformats.org/presentationml/2006/main">
   <p:cSld>
     <p:spTree>
@@ -10969,7 +11309,7 @@
 </p:sld>
 </file>
 
-<file path=ppt/slides/slide46.xml><?xml version="1.0" encoding="utf-8"?>
+<file path=ppt/slides/slide49.xml><?xml version="1.0" encoding="utf-8"?>
 <p:sld xmlns:a="http://schemas.openxmlformats.org/drawingml/2006/main" xmlns:r="http://schemas.openxmlformats.org/officeDocument/2006/relationships" xmlns:p="http://schemas.openxmlformats.org/presentationml/2006/main">
   <p:cSld>
     <p:spTree>
@@ -11030,168 +11370,6 @@
 </p:sld>
 </file>
 
-<file path=ppt/slides/slide47.xml><?xml version="1.0" encoding="utf-8"?>
-<p:sld xmlns:a="http://schemas.openxmlformats.org/drawingml/2006/main" xmlns:r="http://schemas.openxmlformats.org/officeDocument/2006/relationships" xmlns:p="http://schemas.openxmlformats.org/presentationml/2006/main">
-  <p:cSld>
-    <p:spTree>
-      <p:nvGrpSpPr>
-        <p:cNvPr id="1" name=""/>
-        <p:cNvGrpSpPr/>
-        <p:nvPr/>
-      </p:nvGrpSpPr>
-      <p:grpSpPr>
-        <a:xfrm>
-          <a:off x="0" y="0"/>
-          <a:ext cx="0" cy="0"/>
-          <a:chOff x="0" y="0"/>
-          <a:chExt cx="0" cy="0"/>
-        </a:xfrm>
-      </p:grpSpPr>
-      <p:pic>
-        <p:nvPicPr>
-          <p:cNvPr id="4" name="Obraz 3"/>
-          <p:cNvPicPr>
-            <a:picLocks noChangeAspect="1"/>
-          </p:cNvPicPr>
-          <p:nvPr/>
-        </p:nvPicPr>
-        <p:blipFill>
-          <a:blip r:embed="rId2"/>
-          <a:stretch>
-            <a:fillRect/>
-          </a:stretch>
-        </p:blipFill>
-        <p:spPr>
-          <a:xfrm>
-            <a:off x="2681892" y="0"/>
-            <a:ext cx="6828215" cy="6858000"/>
-          </a:xfrm>
-          <a:prstGeom prst="rect">
-            <a:avLst/>
-          </a:prstGeom>
-        </p:spPr>
-      </p:pic>
-    </p:spTree>
-    <p:extLst>
-      <p:ext uri="{BB962C8B-B14F-4D97-AF65-F5344CB8AC3E}">
-        <p14:creationId xmlns:p14="http://schemas.microsoft.com/office/powerpoint/2010/main" val="651073908"/>
-      </p:ext>
-    </p:extLst>
-  </p:cSld>
-  <p:clrMapOvr>
-    <a:masterClrMapping/>
-  </p:clrMapOvr>
-</p:sld>
-</file>
-
-<file path=ppt/slides/slide48.xml><?xml version="1.0" encoding="utf-8"?>
-<p:sld xmlns:a="http://schemas.openxmlformats.org/drawingml/2006/main" xmlns:r="http://schemas.openxmlformats.org/officeDocument/2006/relationships" xmlns:p="http://schemas.openxmlformats.org/presentationml/2006/main">
-  <p:cSld>
-    <p:spTree>
-      <p:nvGrpSpPr>
-        <p:cNvPr id="1" name=""/>
-        <p:cNvGrpSpPr/>
-        <p:nvPr/>
-      </p:nvGrpSpPr>
-      <p:grpSpPr>
-        <a:xfrm>
-          <a:off x="0" y="0"/>
-          <a:ext cx="0" cy="0"/>
-          <a:chOff x="0" y="0"/>
-          <a:chExt cx="0" cy="0"/>
-        </a:xfrm>
-      </p:grpSpPr>
-      <p:pic>
-        <p:nvPicPr>
-          <p:cNvPr id="4" name="Obraz 3"/>
-          <p:cNvPicPr>
-            <a:picLocks noChangeAspect="1"/>
-          </p:cNvPicPr>
-          <p:nvPr/>
-        </p:nvPicPr>
-        <p:blipFill>
-          <a:blip r:embed="rId2"/>
-          <a:stretch>
-            <a:fillRect/>
-          </a:stretch>
-        </p:blipFill>
-        <p:spPr>
-          <a:xfrm>
-            <a:off x="2761100" y="0"/>
-            <a:ext cx="6669800" cy="6858000"/>
-          </a:xfrm>
-          <a:prstGeom prst="rect">
-            <a:avLst/>
-          </a:prstGeom>
-        </p:spPr>
-      </p:pic>
-    </p:spTree>
-    <p:extLst>
-      <p:ext uri="{BB962C8B-B14F-4D97-AF65-F5344CB8AC3E}">
-        <p14:creationId xmlns:p14="http://schemas.microsoft.com/office/powerpoint/2010/main" val="459338862"/>
-      </p:ext>
-    </p:extLst>
-  </p:cSld>
-  <p:clrMapOvr>
-    <a:masterClrMapping/>
-  </p:clrMapOvr>
-</p:sld>
-</file>
-
-<file path=ppt/slides/slide49.xml><?xml version="1.0" encoding="utf-8"?>
-<p:sld xmlns:a="http://schemas.openxmlformats.org/drawingml/2006/main" xmlns:r="http://schemas.openxmlformats.org/officeDocument/2006/relationships" xmlns:p="http://schemas.openxmlformats.org/presentationml/2006/main">
-  <p:cSld>
-    <p:spTree>
-      <p:nvGrpSpPr>
-        <p:cNvPr id="1" name=""/>
-        <p:cNvGrpSpPr/>
-        <p:nvPr/>
-      </p:nvGrpSpPr>
-      <p:grpSpPr>
-        <a:xfrm>
-          <a:off x="0" y="0"/>
-          <a:ext cx="0" cy="0"/>
-          <a:chOff x="0" y="0"/>
-          <a:chExt cx="0" cy="0"/>
-        </a:xfrm>
-      </p:grpSpPr>
-      <p:pic>
-        <p:nvPicPr>
-          <p:cNvPr id="4" name="Obraz 3"/>
-          <p:cNvPicPr>
-            <a:picLocks noChangeAspect="1"/>
-          </p:cNvPicPr>
-          <p:nvPr/>
-        </p:nvPicPr>
-        <p:blipFill>
-          <a:blip r:embed="rId2"/>
-          <a:stretch>
-            <a:fillRect/>
-          </a:stretch>
-        </p:blipFill>
-        <p:spPr>
-          <a:xfrm>
-            <a:off x="2678255" y="0"/>
-            <a:ext cx="6835490" cy="6858000"/>
-          </a:xfrm>
-          <a:prstGeom prst="rect">
-            <a:avLst/>
-          </a:prstGeom>
-        </p:spPr>
-      </p:pic>
-    </p:spTree>
-    <p:extLst>
-      <p:ext uri="{BB962C8B-B14F-4D97-AF65-F5344CB8AC3E}">
-        <p14:creationId xmlns:p14="http://schemas.microsoft.com/office/powerpoint/2010/main" val="1813761033"/>
-      </p:ext>
-    </p:extLst>
-  </p:cSld>
-  <p:clrMapOvr>
-    <a:masterClrMapping/>
-  </p:clrMapOvr>
-</p:sld>
-</file>
-
 <file path=ppt/slides/slide5.xml><?xml version="1.0" encoding="utf-8"?>
 <p:sld xmlns:a="http://schemas.openxmlformats.org/drawingml/2006/main" xmlns:r="http://schemas.openxmlformats.org/officeDocument/2006/relationships" xmlns:p="http://schemas.openxmlformats.org/presentationml/2006/main">
   <p:cSld>
@@ -11214,7 +11392,7 @@
           <p:cNvPr id="2" name="Title 1">
             <a:extLst>
               <a:ext uri="{FF2B5EF4-FFF2-40B4-BE49-F238E27FC236}">
-                <a16:creationId xmlns:a16="http://schemas.microsoft.com/office/drawing/2014/main" xmlns="" id="{5E8BF8CF-D6EE-150B-4226-D68ECE7E9F50}"/>
+                <a16:creationId xmlns="" xmlns:a16="http://schemas.microsoft.com/office/drawing/2014/main" id="{5E8BF8CF-D6EE-150B-4226-D68ECE7E9F50}"/>
               </a:ext>
             </a:extLst>
           </p:cNvPr>
@@ -11250,7 +11428,7 @@
           <p:cNvPr id="3" name="Content Placeholder 2">
             <a:extLst>
               <a:ext uri="{FF2B5EF4-FFF2-40B4-BE49-F238E27FC236}">
-                <a16:creationId xmlns:a16="http://schemas.microsoft.com/office/drawing/2014/main" xmlns="" id="{C0B23861-9E00-0783-04C6-CF20D51468AA}"/>
+                <a16:creationId xmlns="" xmlns:a16="http://schemas.microsoft.com/office/drawing/2014/main" id="{C0B23861-9E00-0783-04C6-CF20D51468AA}"/>
               </a:ext>
             </a:extLst>
           </p:cNvPr>
@@ -11361,6 +11539,168 @@
         </p:blipFill>
         <p:spPr>
           <a:xfrm>
+            <a:off x="2681892" y="0"/>
+            <a:ext cx="6828215" cy="6858000"/>
+          </a:xfrm>
+          <a:prstGeom prst="rect">
+            <a:avLst/>
+          </a:prstGeom>
+        </p:spPr>
+      </p:pic>
+    </p:spTree>
+    <p:extLst>
+      <p:ext uri="{BB962C8B-B14F-4D97-AF65-F5344CB8AC3E}">
+        <p14:creationId xmlns:p14="http://schemas.microsoft.com/office/powerpoint/2010/main" val="651073908"/>
+      </p:ext>
+    </p:extLst>
+  </p:cSld>
+  <p:clrMapOvr>
+    <a:masterClrMapping/>
+  </p:clrMapOvr>
+</p:sld>
+</file>
+
+<file path=ppt/slides/slide51.xml><?xml version="1.0" encoding="utf-8"?>
+<p:sld xmlns:a="http://schemas.openxmlformats.org/drawingml/2006/main" xmlns:r="http://schemas.openxmlformats.org/officeDocument/2006/relationships" xmlns:p="http://schemas.openxmlformats.org/presentationml/2006/main">
+  <p:cSld>
+    <p:spTree>
+      <p:nvGrpSpPr>
+        <p:cNvPr id="1" name=""/>
+        <p:cNvGrpSpPr/>
+        <p:nvPr/>
+      </p:nvGrpSpPr>
+      <p:grpSpPr>
+        <a:xfrm>
+          <a:off x="0" y="0"/>
+          <a:ext cx="0" cy="0"/>
+          <a:chOff x="0" y="0"/>
+          <a:chExt cx="0" cy="0"/>
+        </a:xfrm>
+      </p:grpSpPr>
+      <p:pic>
+        <p:nvPicPr>
+          <p:cNvPr id="4" name="Obraz 3"/>
+          <p:cNvPicPr>
+            <a:picLocks noChangeAspect="1"/>
+          </p:cNvPicPr>
+          <p:nvPr/>
+        </p:nvPicPr>
+        <p:blipFill>
+          <a:blip r:embed="rId2"/>
+          <a:stretch>
+            <a:fillRect/>
+          </a:stretch>
+        </p:blipFill>
+        <p:spPr>
+          <a:xfrm>
+            <a:off x="2761100" y="0"/>
+            <a:ext cx="6669800" cy="6858000"/>
+          </a:xfrm>
+          <a:prstGeom prst="rect">
+            <a:avLst/>
+          </a:prstGeom>
+        </p:spPr>
+      </p:pic>
+    </p:spTree>
+    <p:extLst>
+      <p:ext uri="{BB962C8B-B14F-4D97-AF65-F5344CB8AC3E}">
+        <p14:creationId xmlns:p14="http://schemas.microsoft.com/office/powerpoint/2010/main" val="459338862"/>
+      </p:ext>
+    </p:extLst>
+  </p:cSld>
+  <p:clrMapOvr>
+    <a:masterClrMapping/>
+  </p:clrMapOvr>
+</p:sld>
+</file>
+
+<file path=ppt/slides/slide52.xml><?xml version="1.0" encoding="utf-8"?>
+<p:sld xmlns:a="http://schemas.openxmlformats.org/drawingml/2006/main" xmlns:r="http://schemas.openxmlformats.org/officeDocument/2006/relationships" xmlns:p="http://schemas.openxmlformats.org/presentationml/2006/main">
+  <p:cSld>
+    <p:spTree>
+      <p:nvGrpSpPr>
+        <p:cNvPr id="1" name=""/>
+        <p:cNvGrpSpPr/>
+        <p:nvPr/>
+      </p:nvGrpSpPr>
+      <p:grpSpPr>
+        <a:xfrm>
+          <a:off x="0" y="0"/>
+          <a:ext cx="0" cy="0"/>
+          <a:chOff x="0" y="0"/>
+          <a:chExt cx="0" cy="0"/>
+        </a:xfrm>
+      </p:grpSpPr>
+      <p:pic>
+        <p:nvPicPr>
+          <p:cNvPr id="4" name="Obraz 3"/>
+          <p:cNvPicPr>
+            <a:picLocks noChangeAspect="1"/>
+          </p:cNvPicPr>
+          <p:nvPr/>
+        </p:nvPicPr>
+        <p:blipFill>
+          <a:blip r:embed="rId2"/>
+          <a:stretch>
+            <a:fillRect/>
+          </a:stretch>
+        </p:blipFill>
+        <p:spPr>
+          <a:xfrm>
+            <a:off x="2678255" y="0"/>
+            <a:ext cx="6835490" cy="6858000"/>
+          </a:xfrm>
+          <a:prstGeom prst="rect">
+            <a:avLst/>
+          </a:prstGeom>
+        </p:spPr>
+      </p:pic>
+    </p:spTree>
+    <p:extLst>
+      <p:ext uri="{BB962C8B-B14F-4D97-AF65-F5344CB8AC3E}">
+        <p14:creationId xmlns:p14="http://schemas.microsoft.com/office/powerpoint/2010/main" val="1813761033"/>
+      </p:ext>
+    </p:extLst>
+  </p:cSld>
+  <p:clrMapOvr>
+    <a:masterClrMapping/>
+  </p:clrMapOvr>
+</p:sld>
+</file>
+
+<file path=ppt/slides/slide53.xml><?xml version="1.0" encoding="utf-8"?>
+<p:sld xmlns:a="http://schemas.openxmlformats.org/drawingml/2006/main" xmlns:r="http://schemas.openxmlformats.org/officeDocument/2006/relationships" xmlns:p="http://schemas.openxmlformats.org/presentationml/2006/main">
+  <p:cSld>
+    <p:spTree>
+      <p:nvGrpSpPr>
+        <p:cNvPr id="1" name=""/>
+        <p:cNvGrpSpPr/>
+        <p:nvPr/>
+      </p:nvGrpSpPr>
+      <p:grpSpPr>
+        <a:xfrm>
+          <a:off x="0" y="0"/>
+          <a:ext cx="0" cy="0"/>
+          <a:chOff x="0" y="0"/>
+          <a:chExt cx="0" cy="0"/>
+        </a:xfrm>
+      </p:grpSpPr>
+      <p:pic>
+        <p:nvPicPr>
+          <p:cNvPr id="4" name="Obraz 3"/>
+          <p:cNvPicPr>
+            <a:picLocks noChangeAspect="1"/>
+          </p:cNvPicPr>
+          <p:nvPr/>
+        </p:nvPicPr>
+        <p:blipFill>
+          <a:blip r:embed="rId2"/>
+          <a:stretch>
+            <a:fillRect/>
+          </a:stretch>
+        </p:blipFill>
+        <p:spPr>
+          <a:xfrm>
             <a:off x="2644165" y="0"/>
             <a:ext cx="6903669" cy="6858000"/>
           </a:xfrm>
@@ -11382,7 +11722,7 @@
 </p:sld>
 </file>
 
-<file path=ppt/slides/slide51.xml><?xml version="1.0" encoding="utf-8"?>
+<file path=ppt/slides/slide54.xml><?xml version="1.0" encoding="utf-8"?>
 <p:sld xmlns:a="http://schemas.openxmlformats.org/drawingml/2006/main" xmlns:r="http://schemas.openxmlformats.org/officeDocument/2006/relationships" xmlns:p="http://schemas.openxmlformats.org/presentationml/2006/main">
   <p:cSld>
     <p:spTree>
@@ -11436,7 +11776,7 @@
 </p:sld>
 </file>
 
-<file path=ppt/slides/slide52.xml><?xml version="1.0" encoding="utf-8"?>
+<file path=ppt/slides/slide55.xml><?xml version="1.0" encoding="utf-8"?>
 <p:sld xmlns:a="http://schemas.openxmlformats.org/drawingml/2006/main" xmlns:r="http://schemas.openxmlformats.org/officeDocument/2006/relationships" xmlns:p="http://schemas.openxmlformats.org/presentationml/2006/main">
   <p:cSld>
     <p:spTree>
@@ -11490,7 +11830,7 @@
 </p:sld>
 </file>
 
-<file path=ppt/slides/slide53.xml><?xml version="1.0" encoding="utf-8"?>
+<file path=ppt/slides/slide56.xml><?xml version="1.0" encoding="utf-8"?>
 <p:sld xmlns:a="http://schemas.openxmlformats.org/drawingml/2006/main" xmlns:r="http://schemas.openxmlformats.org/officeDocument/2006/relationships" xmlns:p="http://schemas.openxmlformats.org/presentationml/2006/main">
   <p:cSld>
     <p:spTree>
@@ -12777,7 +13117,7 @@
 </p:sld>
 </file>
 
-<file path=ppt/slides/slide54.xml><?xml version="1.0" encoding="utf-8"?>
+<file path=ppt/slides/slide57.xml><?xml version="1.0" encoding="utf-8"?>
 <p:sld xmlns:a="http://schemas.openxmlformats.org/drawingml/2006/main" xmlns:r="http://schemas.openxmlformats.org/officeDocument/2006/relationships" xmlns:p="http://schemas.openxmlformats.org/presentationml/2006/main">
   <p:cSld>
     <p:spTree>
@@ -12799,7 +13139,7 @@
           <p:cNvPr id="2" name="Title 1">
             <a:extLst>
               <a:ext uri="{FF2B5EF4-FFF2-40B4-BE49-F238E27FC236}">
-                <a16:creationId xmlns:a16="http://schemas.microsoft.com/office/drawing/2014/main" xmlns="" id="{CE2BDAB7-0BBD-13D6-DE9D-E1CD87C26286}"/>
+                <a16:creationId xmlns="" xmlns:a16="http://schemas.microsoft.com/office/drawing/2014/main" id="{CE2BDAB7-0BBD-13D6-DE9D-E1CD87C26286}"/>
               </a:ext>
             </a:extLst>
           </p:cNvPr>
@@ -12853,7 +13193,7 @@
           <p:cNvPr id="3" name="Content Placeholder 2">
             <a:extLst>
               <a:ext uri="{FF2B5EF4-FFF2-40B4-BE49-F238E27FC236}">
-                <a16:creationId xmlns:a16="http://schemas.microsoft.com/office/drawing/2014/main" xmlns="" id="{5CE53849-7EDA-FBE9-039F-D3D7487DE1FA}"/>
+                <a16:creationId xmlns="" xmlns:a16="http://schemas.microsoft.com/office/drawing/2014/main" id="{5CE53849-7EDA-FBE9-039F-D3D7487DE1FA}"/>
               </a:ext>
             </a:extLst>
           </p:cNvPr>
@@ -13091,10 +13431,10 @@
           <p:cNvPr id="10" name="Down Arrow 7">
             <a:extLst>
               <a:ext uri="{FF2B5EF4-FFF2-40B4-BE49-F238E27FC236}">
-                <a16:creationId xmlns:a16="http://schemas.microsoft.com/office/drawing/2014/main" xmlns="" id="{D4771268-CB57-404A-9271-370EB28F6090}"/>
+                <a16:creationId xmlns="" xmlns:a16="http://schemas.microsoft.com/office/drawing/2014/main" id="{D4771268-CB57-404A-9271-370EB28F6090}"/>
               </a:ext>
               <a:ext uri="{C183D7F6-B498-43B3-948B-1728B52AA6E4}">
-                <adec:decorative xmlns:adec="http://schemas.microsoft.com/office/drawing/2017/decorative" xmlns="" val="1"/>
+                <adec:decorative xmlns="" xmlns:adec="http://schemas.microsoft.com/office/drawing/2017/decorative" val="1"/>
               </a:ext>
             </a:extLst>
           </p:cNvPr>
@@ -13104,7 +13444,7 @@
           <p:nvPr>
             <p:extLst>
               <p:ext uri="{386F3935-93C4-4BCD-93E2-E3B085C9AB24}">
-                <p16:designElem xmlns:p16="http://schemas.microsoft.com/office/powerpoint/2015/main" xmlns="" val="1"/>
+                <p16:designElem xmlns="" xmlns:p16="http://schemas.microsoft.com/office/powerpoint/2015/main" val="1"/>
               </p:ext>
             </p:extLst>
           </p:nvPr>
@@ -13157,7 +13497,7 @@
           <p:cNvPr id="2" name="Title 1">
             <a:extLst>
               <a:ext uri="{FF2B5EF4-FFF2-40B4-BE49-F238E27FC236}">
-                <a16:creationId xmlns:a16="http://schemas.microsoft.com/office/drawing/2014/main" xmlns="" id="{5B47F663-7008-31DA-930F-CCB482A936B7}"/>
+                <a16:creationId xmlns="" xmlns:a16="http://schemas.microsoft.com/office/drawing/2014/main" id="{5B47F663-7008-31DA-930F-CCB482A936B7}"/>
               </a:ext>
             </a:extLst>
           </p:cNvPr>
@@ -13201,7 +13541,7 @@
           <p:cNvPr id="5" name="Content Placeholder 4">
             <a:extLst>
               <a:ext uri="{FF2B5EF4-FFF2-40B4-BE49-F238E27FC236}">
-                <a16:creationId xmlns:a16="http://schemas.microsoft.com/office/drawing/2014/main" xmlns="" id="{4F908E6C-1B3B-CA87-25B8-E4E1AB151B08}"/>
+                <a16:creationId xmlns="" xmlns:a16="http://schemas.microsoft.com/office/drawing/2014/main" id="{4F908E6C-1B3B-CA87-25B8-E4E1AB151B08}"/>
               </a:ext>
             </a:extLst>
           </p:cNvPr>
@@ -13278,10 +13618,10 @@
           <p:cNvPr id="10" name="Down Arrow 7">
             <a:extLst>
               <a:ext uri="{FF2B5EF4-FFF2-40B4-BE49-F238E27FC236}">
-                <a16:creationId xmlns:a16="http://schemas.microsoft.com/office/drawing/2014/main" xmlns="" id="{D4771268-CB57-404A-9271-370EB28F6090}"/>
+                <a16:creationId xmlns="" xmlns:a16="http://schemas.microsoft.com/office/drawing/2014/main" id="{D4771268-CB57-404A-9271-370EB28F6090}"/>
               </a:ext>
               <a:ext uri="{C183D7F6-B498-43B3-948B-1728B52AA6E4}">
-                <adec:decorative xmlns:adec="http://schemas.microsoft.com/office/drawing/2017/decorative" xmlns="" val="1"/>
+                <adec:decorative xmlns="" xmlns:adec="http://schemas.microsoft.com/office/drawing/2017/decorative" val="1"/>
               </a:ext>
             </a:extLst>
           </p:cNvPr>
@@ -13291,7 +13631,7 @@
           <p:nvPr>
             <p:extLst>
               <p:ext uri="{386F3935-93C4-4BCD-93E2-E3B085C9AB24}">
-                <p16:designElem xmlns:p16="http://schemas.microsoft.com/office/powerpoint/2015/main" xmlns="" val="1"/>
+                <p16:designElem xmlns="" xmlns:p16="http://schemas.microsoft.com/office/powerpoint/2015/main" val="1"/>
               </p:ext>
             </p:extLst>
           </p:nvPr>
@@ -13344,7 +13684,7 @@
           <p:cNvPr id="2" name="Title 1">
             <a:extLst>
               <a:ext uri="{FF2B5EF4-FFF2-40B4-BE49-F238E27FC236}">
-                <a16:creationId xmlns:a16="http://schemas.microsoft.com/office/drawing/2014/main" xmlns="" id="{AC86753C-8459-8402-D097-7C0CCA92A6D9}"/>
+                <a16:creationId xmlns="" xmlns:a16="http://schemas.microsoft.com/office/drawing/2014/main" id="{AC86753C-8459-8402-D097-7C0CCA92A6D9}"/>
               </a:ext>
             </a:extLst>
           </p:cNvPr>
@@ -13418,7 +13758,7 @@
           <p:cNvPr id="5" name="Content Placeholder 5">
             <a:extLst>
               <a:ext uri="{FF2B5EF4-FFF2-40B4-BE49-F238E27FC236}">
-                <a16:creationId xmlns:a16="http://schemas.microsoft.com/office/drawing/2014/main" xmlns="" id="{583DC926-2B06-4207-8504-F8D013365702}"/>
+                <a16:creationId xmlns="" xmlns:a16="http://schemas.microsoft.com/office/drawing/2014/main" id="{583DC926-2B06-4207-8504-F8D013365702}"/>
               </a:ext>
             </a:extLst>
           </p:cNvPr>
@@ -13487,7 +13827,7 @@
           <p:cNvPr id="2" name="Title 1">
             <a:extLst>
               <a:ext uri="{FF2B5EF4-FFF2-40B4-BE49-F238E27FC236}">
-                <a16:creationId xmlns:a16="http://schemas.microsoft.com/office/drawing/2014/main" xmlns="" id="{2463D552-8041-61C8-B164-21301F4134F6}"/>
+                <a16:creationId xmlns="" xmlns:a16="http://schemas.microsoft.com/office/drawing/2014/main" id="{2463D552-8041-61C8-B164-21301F4134F6}"/>
               </a:ext>
             </a:extLst>
           </p:cNvPr>
@@ -13515,7 +13855,7 @@
           <p:cNvPr id="3" name="Subtitle 2">
             <a:extLst>
               <a:ext uri="{FF2B5EF4-FFF2-40B4-BE49-F238E27FC236}">
-                <a16:creationId xmlns:a16="http://schemas.microsoft.com/office/drawing/2014/main" xmlns="" id="{BEB9D3B4-C5F2-E997-AF58-C5859552FA21}"/>
+                <a16:creationId xmlns="" xmlns:a16="http://schemas.microsoft.com/office/drawing/2014/main" id="{BEB9D3B4-C5F2-E997-AF58-C5859552FA21}"/>
               </a:ext>
             </a:extLst>
           </p:cNvPr>
@@ -13585,7 +13925,7 @@
           <p:cNvPr id="5" name="Content Placeholder 4">
             <a:extLst>
               <a:ext uri="{FF2B5EF4-FFF2-40B4-BE49-F238E27FC236}">
-                <a16:creationId xmlns:a16="http://schemas.microsoft.com/office/drawing/2014/main" xmlns="" id="{FD9A6ED2-0545-9B8B-1FE1-0E1BECECB185}"/>
+                <a16:creationId xmlns="" xmlns:a16="http://schemas.microsoft.com/office/drawing/2014/main" id="{FD9A6ED2-0545-9B8B-1FE1-0E1BECECB185}"/>
               </a:ext>
             </a:extLst>
           </p:cNvPr>

</xml_diff>